<commit_message>
Nachbereitung der Projektstrukturerarbeitung für das Researchprojekt
</commit_message>
<xml_diff>
--- a/portfolio/research newsfeed/Erarbeitung der Projektstruktur.pptx
+++ b/portfolio/research newsfeed/Erarbeitung der Projektstruktur.pptx
@@ -5,10 +5,10 @@
     <p:sldMasterId id="2147483733" r:id="rId1"/>
   </p:sldMasterIdLst>
   <p:notesMasterIdLst>
-    <p:notesMasterId r:id="rId14"/>
+    <p:notesMasterId r:id="rId9"/>
   </p:notesMasterIdLst>
   <p:handoutMasterIdLst>
-    <p:handoutMasterId r:id="rId15"/>
+    <p:handoutMasterId r:id="rId10"/>
   </p:handoutMasterIdLst>
   <p:sldIdLst>
     <p:sldId id="437" r:id="rId2"/>
@@ -17,12 +17,7 @@
     <p:sldId id="440" r:id="rId5"/>
     <p:sldId id="455" r:id="rId6"/>
     <p:sldId id="442" r:id="rId7"/>
-    <p:sldId id="449" r:id="rId8"/>
-    <p:sldId id="452" r:id="rId9"/>
-    <p:sldId id="450" r:id="rId10"/>
-    <p:sldId id="451" r:id="rId11"/>
-    <p:sldId id="453" r:id="rId12"/>
-    <p:sldId id="454" r:id="rId13"/>
+    <p:sldId id="454" r:id="rId8"/>
   </p:sldIdLst>
   <p:sldSz cx="12195175" cy="6858000"/>
   <p:notesSz cx="6858000" cy="9144000"/>
@@ -9467,299 +9462,6 @@
 </p:sld>
 </file>
 
-<file path=ppt/slides/slide10.xml><?xml version="1.0" encoding="utf-8"?>
-<p:sld xmlns:a="http://schemas.openxmlformats.org/drawingml/2006/main" xmlns:r="http://schemas.openxmlformats.org/officeDocument/2006/relationships" xmlns:p="http://schemas.openxmlformats.org/presentationml/2006/main">
-  <p:cSld>
-    <p:spTree>
-      <p:nvGrpSpPr>
-        <p:cNvPr id="1" name=""/>
-        <p:cNvGrpSpPr/>
-        <p:nvPr/>
-      </p:nvGrpSpPr>
-      <p:grpSpPr>
-        <a:xfrm>
-          <a:off x="0" y="0"/>
-          <a:ext cx="0" cy="0"/>
-          <a:chOff x="0" y="0"/>
-          <a:chExt cx="0" cy="0"/>
-        </a:xfrm>
-      </p:grpSpPr>
-      <p:sp>
-        <p:nvSpPr>
-          <p:cNvPr id="2" name="Text Placeholder 1"/>
-          <p:cNvSpPr>
-            <a:spLocks noGrp="1"/>
-          </p:cNvSpPr>
-          <p:nvPr>
-            <p:ph type="body" sz="quarter" idx="10"/>
-          </p:nvPr>
-        </p:nvSpPr>
-        <p:spPr/>
-        <p:txBody>
-          <a:bodyPr/>
-          <a:lstStyle/>
-          <a:p>
-            <a:endParaRPr lang="de-DE" dirty="0"/>
-          </a:p>
-        </p:txBody>
-      </p:sp>
-      <p:sp>
-        <p:nvSpPr>
-          <p:cNvPr id="3" name="Title 2"/>
-          <p:cNvSpPr>
-            <a:spLocks noGrp="1"/>
-          </p:cNvSpPr>
-          <p:nvPr>
-            <p:ph type="title"/>
-          </p:nvPr>
-        </p:nvSpPr>
-        <p:spPr/>
-        <p:txBody>
-          <a:bodyPr/>
-          <a:lstStyle/>
-          <a:p>
-            <a:r>
-              <a:rPr lang="de-DE" dirty="0"/>
-              <a:t>Netzplan wird im Nachhinein erstellt - Ergebnis</a:t>
-            </a:r>
-          </a:p>
-        </p:txBody>
-      </p:sp>
-      <p:pic>
-        <p:nvPicPr>
-          <p:cNvPr id="5" name="Picture 4">
-            <a:hlinkClick r:id="rId2" action="ppaction://hlinkfile"/>
-          </p:cNvPr>
-          <p:cNvPicPr>
-            <a:picLocks noChangeAspect="1"/>
-          </p:cNvPicPr>
-          <p:nvPr/>
-        </p:nvPicPr>
-        <p:blipFill>
-          <a:blip r:embed="rId3"/>
-          <a:stretch>
-            <a:fillRect/>
-          </a:stretch>
-        </p:blipFill>
-        <p:spPr>
-          <a:xfrm>
-            <a:off x="503999" y="1620000"/>
-            <a:ext cx="5768176" cy="4716000"/>
-          </a:xfrm>
-          <a:prstGeom prst="rect">
-            <a:avLst/>
-          </a:prstGeom>
-        </p:spPr>
-      </p:pic>
-    </p:spTree>
-    <p:extLst>
-      <p:ext uri="{BB962C8B-B14F-4D97-AF65-F5344CB8AC3E}">
-        <p14:creationId xmlns:p14="http://schemas.microsoft.com/office/powerpoint/2010/main" val="1660557324"/>
-      </p:ext>
-    </p:extLst>
-  </p:cSld>
-  <p:clrMapOvr>
-    <a:masterClrMapping/>
-  </p:clrMapOvr>
-</p:sld>
-</file>
-
-<file path=ppt/slides/slide11.xml><?xml version="1.0" encoding="utf-8"?>
-<p:sld xmlns:a="http://schemas.openxmlformats.org/drawingml/2006/main" xmlns:r="http://schemas.openxmlformats.org/officeDocument/2006/relationships" xmlns:p="http://schemas.openxmlformats.org/presentationml/2006/main">
-  <p:cSld>
-    <p:spTree>
-      <p:nvGrpSpPr>
-        <p:cNvPr id="1" name=""/>
-        <p:cNvGrpSpPr/>
-        <p:nvPr/>
-      </p:nvGrpSpPr>
-      <p:grpSpPr>
-        <a:xfrm>
-          <a:off x="0" y="0"/>
-          <a:ext cx="0" cy="0"/>
-          <a:chOff x="0" y="0"/>
-          <a:chExt cx="0" cy="0"/>
-        </a:xfrm>
-      </p:grpSpPr>
-      <p:sp>
-        <p:nvSpPr>
-          <p:cNvPr id="2" name="Text Placeholder 1"/>
-          <p:cNvSpPr>
-            <a:spLocks noGrp="1"/>
-          </p:cNvSpPr>
-          <p:nvPr>
-            <p:ph type="body" sz="quarter" idx="10"/>
-          </p:nvPr>
-        </p:nvSpPr>
-        <p:spPr/>
-        <p:txBody>
-          <a:bodyPr/>
-          <a:lstStyle/>
-          <a:p>
-            <a:endParaRPr lang="de-DE" dirty="0"/>
-          </a:p>
-        </p:txBody>
-      </p:sp>
-      <p:pic>
-        <p:nvPicPr>
-          <p:cNvPr id="4" name="Picture 3"/>
-          <p:cNvPicPr>
-            <a:picLocks noChangeAspect="1"/>
-          </p:cNvPicPr>
-          <p:nvPr/>
-        </p:nvPicPr>
-        <p:blipFill>
-          <a:blip r:embed="rId2"/>
-          <a:stretch>
-            <a:fillRect/>
-          </a:stretch>
-        </p:blipFill>
-        <p:spPr>
-          <a:xfrm>
-            <a:off x="473857" y="2301486"/>
-            <a:ext cx="11246759" cy="2477547"/>
-          </a:xfrm>
-          <a:prstGeom prst="rect">
-            <a:avLst/>
-          </a:prstGeom>
-        </p:spPr>
-      </p:pic>
-      <p:sp>
-        <p:nvSpPr>
-          <p:cNvPr id="3" name="Title 2"/>
-          <p:cNvSpPr>
-            <a:spLocks noGrp="1"/>
-          </p:cNvSpPr>
-          <p:nvPr>
-            <p:ph type="title"/>
-          </p:nvPr>
-        </p:nvSpPr>
-        <p:spPr/>
-        <p:txBody>
-          <a:bodyPr/>
-          <a:lstStyle/>
-          <a:p>
-            <a:r>
-              <a:rPr lang="de-DE" dirty="0"/>
-              <a:t>Balkendiagramm – Wenn Dauer festgelegt</a:t>
-            </a:r>
-          </a:p>
-        </p:txBody>
-      </p:sp>
-    </p:spTree>
-    <p:extLst>
-      <p:ext uri="{BB962C8B-B14F-4D97-AF65-F5344CB8AC3E}">
-        <p14:creationId xmlns:p14="http://schemas.microsoft.com/office/powerpoint/2010/main" val="4244349697"/>
-      </p:ext>
-    </p:extLst>
-  </p:cSld>
-  <p:clrMapOvr>
-    <a:masterClrMapping/>
-  </p:clrMapOvr>
-</p:sld>
-</file>
-
-<file path=ppt/slides/slide12.xml><?xml version="1.0" encoding="utf-8"?>
-<p:sld xmlns:a="http://schemas.openxmlformats.org/drawingml/2006/main" xmlns:r="http://schemas.openxmlformats.org/officeDocument/2006/relationships" xmlns:p="http://schemas.openxmlformats.org/presentationml/2006/main">
-  <p:cSld>
-    <p:spTree>
-      <p:nvGrpSpPr>
-        <p:cNvPr id="1" name=""/>
-        <p:cNvGrpSpPr/>
-        <p:nvPr/>
-      </p:nvGrpSpPr>
-      <p:grpSpPr>
-        <a:xfrm>
-          <a:off x="0" y="0"/>
-          <a:ext cx="0" cy="0"/>
-          <a:chOff x="0" y="0"/>
-          <a:chExt cx="0" cy="0"/>
-        </a:xfrm>
-      </p:grpSpPr>
-      <p:sp>
-        <p:nvSpPr>
-          <p:cNvPr id="2" name="Text Placeholder 1"/>
-          <p:cNvSpPr>
-            <a:spLocks noGrp="1"/>
-          </p:cNvSpPr>
-          <p:nvPr>
-            <p:ph type="body" sz="quarter" idx="10"/>
-          </p:nvPr>
-        </p:nvSpPr>
-        <p:spPr/>
-        <p:txBody>
-          <a:bodyPr/>
-          <a:lstStyle/>
-          <a:p>
-            <a:pPr marL="342900" indent="-342900">
-              <a:buFont typeface="Arial" panose="020B0604020202020204" pitchFamily="34" charset="0"/>
-              <a:buChar char="•"/>
-            </a:pPr>
-            <a:r>
-              <a:rPr lang="de-DE" dirty="0"/>
-              <a:t>Ergebnisse stelle ich zur Verfügung</a:t>
-            </a:r>
-          </a:p>
-          <a:p>
-            <a:pPr marL="342900" indent="-342900">
-              <a:buFont typeface="Arial" panose="020B0604020202020204" pitchFamily="34" charset="0"/>
-              <a:buChar char="•"/>
-            </a:pPr>
-            <a:r>
-              <a:rPr lang="de-DE" dirty="0"/>
-              <a:t>Follow </a:t>
-            </a:r>
-            <a:r>
-              <a:rPr lang="de-DE" dirty="0" err="1"/>
-              <a:t>Up</a:t>
-            </a:r>
-            <a:r>
-              <a:rPr lang="de-DE" dirty="0"/>
-              <a:t> Meeting</a:t>
-            </a:r>
-          </a:p>
-        </p:txBody>
-      </p:sp>
-      <p:sp>
-        <p:nvSpPr>
-          <p:cNvPr id="3" name="Title 2"/>
-          <p:cNvSpPr>
-            <a:spLocks noGrp="1"/>
-          </p:cNvSpPr>
-          <p:nvPr>
-            <p:ph type="title"/>
-          </p:nvPr>
-        </p:nvSpPr>
-        <p:spPr/>
-        <p:txBody>
-          <a:bodyPr/>
-          <a:lstStyle/>
-          <a:p>
-            <a:r>
-              <a:rPr lang="de-DE" dirty="0"/>
-              <a:t>Follow </a:t>
-            </a:r>
-            <a:r>
-              <a:rPr lang="de-DE" dirty="0" err="1"/>
-              <a:t>Up</a:t>
-            </a:r>
-            <a:endParaRPr lang="de-DE" dirty="0"/>
-          </a:p>
-        </p:txBody>
-      </p:sp>
-    </p:spTree>
-    <p:extLst>
-      <p:ext uri="{BB962C8B-B14F-4D97-AF65-F5344CB8AC3E}">
-        <p14:creationId xmlns:p14="http://schemas.microsoft.com/office/powerpoint/2010/main" val="2315294091"/>
-      </p:ext>
-    </p:extLst>
-  </p:cSld>
-  <p:clrMapOvr>
-    <a:masterClrMapping/>
-  </p:clrMapOvr>
-</p:sld>
-</file>
-
 <file path=ppt/slides/slide2.xml><?xml version="1.0" encoding="utf-8"?>
 <p:sld xmlns:a="http://schemas.openxmlformats.org/drawingml/2006/main" xmlns:r="http://schemas.openxmlformats.org/officeDocument/2006/relationships" xmlns:p="http://schemas.openxmlformats.org/presentationml/2006/main">
   <p:cSld>
@@ -10478,13 +10180,8 @@
           <a:p>
             <a:r>
               <a:rPr lang="de-DE" dirty="0"/>
-              <a:t>Auszug Protokoll - </a:t>
-            </a:r>
-            <a:r>
-              <a:rPr lang="de-DE" dirty="0"/>
-              <a:t>08.03.2018</a:t>
-            </a:r>
-            <a:endParaRPr lang="de-DE" dirty="0"/>
+              <a:t>Auszug Protokoll - 08.03.2018</a:t>
+            </a:r>
           </a:p>
         </p:txBody>
       </p:sp>
@@ -10531,9 +10228,107 @@
         <p:spPr/>
         <p:txBody>
           <a:bodyPr>
-            <a:normAutofit/>
+            <a:normAutofit fontScale="55000" lnSpcReduction="20000"/>
           </a:bodyPr>
           <a:lstStyle/>
+          <a:p>
+            <a:r>
+              <a:rPr lang="de-DE" b="1" dirty="0"/>
+              <a:t>Lastenheft</a:t>
+            </a:r>
+            <a:r>
+              <a:rPr lang="de-DE" dirty="0"/>
+              <a:t> </a:t>
+            </a:r>
+          </a:p>
+          <a:p>
+            <a:pPr fontAlgn="ctr"/>
+            <a:r>
+              <a:rPr lang="de-DE" dirty="0"/>
+              <a:t>Welche Produkte/Lösungen/Anwendungen für Mitarbeiter von Unternehmen gibt es am Markte (Information und Interaktion) Bsp. MS </a:t>
+            </a:r>
+            <a:r>
+              <a:rPr lang="de-DE" dirty="0" err="1"/>
+              <a:t>Staffhub</a:t>
+            </a:r>
+            <a:endParaRPr lang="de-DE" dirty="0"/>
+          </a:p>
+          <a:p>
+            <a:pPr fontAlgn="ctr"/>
+            <a:r>
+              <a:rPr lang="de-DE" dirty="0"/>
+              <a:t>Welche Anreize schaffen die Anwendungen für die Mitarbeiter diese zu benutzen</a:t>
+            </a:r>
+          </a:p>
+          <a:p>
+            <a:pPr fontAlgn="ctr"/>
+            <a:r>
+              <a:rPr lang="de-DE" dirty="0"/>
+              <a:t>Gibt es bereits Umfragefunktionalitäten</a:t>
+            </a:r>
+          </a:p>
+          <a:p>
+            <a:pPr fontAlgn="ctr"/>
+            <a:r>
+              <a:rPr lang="de-DE" dirty="0"/>
+              <a:t>Gibt es die Möglichkeit Inhalt von PulseShift (bspw. Über eine API) einzubinden? Wie flexibel sind diese Anwendungen und welchen Freiraum bieten sie dabei um auf die Umfrage abzuspringen?</a:t>
+            </a:r>
+          </a:p>
+          <a:p>
+            <a:pPr fontAlgn="ctr"/>
+            <a:r>
+              <a:rPr lang="de-DE" dirty="0"/>
+              <a:t>Welche Referenzkunden gibt es, die Offline-Mitarbeiter beschäftigen?</a:t>
+            </a:r>
+          </a:p>
+          <a:p>
+            <a:pPr fontAlgn="ctr"/>
+            <a:r>
+              <a:rPr lang="de-DE" dirty="0"/>
+              <a:t>Was kostet es (sekundär relevant)</a:t>
+            </a:r>
+          </a:p>
+          <a:p>
+            <a:r>
+              <a:rPr lang="de-DE" dirty="0"/>
+              <a:t> </a:t>
+            </a:r>
+          </a:p>
+          <a:p>
+            <a:r>
+              <a:rPr lang="de-DE" b="1" dirty="0"/>
+              <a:t>Pflichtenheft</a:t>
+            </a:r>
+            <a:endParaRPr lang="de-DE" dirty="0"/>
+          </a:p>
+          <a:p>
+            <a:pPr fontAlgn="ctr"/>
+            <a:r>
+              <a:rPr lang="de-DE" dirty="0"/>
+              <a:t>Anwendungen ausfindig machen durch Webresearch</a:t>
+            </a:r>
+          </a:p>
+          <a:p>
+            <a:pPr fontAlgn="ctr"/>
+            <a:r>
+              <a:rPr lang="de-DE" dirty="0"/>
+              <a:t>Webresearch + Demo -&gt; 2+3</a:t>
+            </a:r>
+          </a:p>
+          <a:p>
+            <a:pPr fontAlgn="ctr"/>
+            <a:r>
+              <a:rPr lang="de-DE" dirty="0"/>
+              <a:t>Technische API, Link, … -&gt; Tabellenübersicht</a:t>
+            </a:r>
+          </a:p>
+          <a:p>
+            <a:pPr fontAlgn="ctr"/>
+            <a:r>
+              <a:rPr lang="de-DE" dirty="0"/>
+              <a:t>Referenzkunden Detail</a:t>
+            </a:r>
+          </a:p>
           <a:p>
             <a:endParaRPr lang="de-DE" dirty="0"/>
           </a:p>
@@ -10797,28 +10592,47 @@
           <a:bodyPr/>
           <a:lstStyle/>
           <a:p>
-            <a:endParaRPr lang="de-DE" b="1" dirty="0"/>
-          </a:p>
-          <a:p>
-            <a:endParaRPr lang="de-DE" b="1" dirty="0"/>
-          </a:p>
-          <a:p>
-            <a:endParaRPr lang="de-DE" b="1" dirty="0"/>
-          </a:p>
-          <a:p>
-            <a:r>
-              <a:rPr lang="de-DE" b="1" dirty="0"/>
-              <a:t>Nur der Inhalt, nicht WER oder WIE LANGE?</a:t>
-            </a:r>
-          </a:p>
-          <a:p>
-            <a:endParaRPr lang="de-DE" b="1" dirty="0"/>
-          </a:p>
-          <a:p>
-            <a:r>
-              <a:rPr lang="de-DE" b="1" dirty="0"/>
-              <a:t>=&gt; Gemeinsam in Excel auf Basis von Pflichtenheft, Lastenheft und EPKs</a:t>
-            </a:r>
+            <a:pPr marL="342900" indent="-342900">
+              <a:buFont typeface="Arial" panose="020B0604020202020204" pitchFamily="34" charset="0"/>
+              <a:buChar char="•"/>
+            </a:pPr>
+            <a:r>
+              <a:rPr lang="de-DE" dirty="0"/>
+              <a:t>Ergebnisse stelle ich zur Verfügung</a:t>
+            </a:r>
+          </a:p>
+          <a:p>
+            <a:pPr marL="342900" indent="-342900">
+              <a:buFont typeface="Arial" panose="020B0604020202020204" pitchFamily="34" charset="0"/>
+              <a:buChar char="•"/>
+            </a:pPr>
+            <a:r>
+              <a:rPr lang="de-DE" dirty="0"/>
+              <a:t>Jason legt die Basis für die weitere Recherche</a:t>
+            </a:r>
+          </a:p>
+          <a:p>
+            <a:pPr marL="342900" indent="-342900">
+              <a:buFont typeface="Arial" panose="020B0604020202020204" pitchFamily="34" charset="0"/>
+              <a:buChar char="•"/>
+            </a:pPr>
+            <a:r>
+              <a:rPr lang="de-DE" dirty="0"/>
+              <a:t>Julia legt vorerst den Fokus vorerst auf die </a:t>
+            </a:r>
+            <a:r>
+              <a:rPr lang="de-DE" dirty="0" err="1"/>
+              <a:t>Lunchapp</a:t>
+            </a:r>
+            <a:r>
+              <a:rPr lang="de-DE" dirty="0"/>
+              <a:t> und wird spätestens am 9.3 voll zum </a:t>
+            </a:r>
+            <a:r>
+              <a:rPr lang="de-DE"/>
+              <a:t>Research stoßen</a:t>
+            </a:r>
+            <a:endParaRPr lang="de-DE" dirty="0"/>
           </a:p>
         </p:txBody>
       </p:sp>
@@ -10839,4446 +10653,20 @@
           <a:p>
             <a:r>
               <a:rPr lang="de-DE" dirty="0"/>
-              <a:t>Definieren der Arbeitspakete</a:t>
-            </a:r>
+              <a:t>Follow </a:t>
+            </a:r>
+            <a:r>
+              <a:rPr lang="de-DE" dirty="0" err="1"/>
+              <a:t>Up</a:t>
+            </a:r>
+            <a:endParaRPr lang="de-DE" dirty="0"/>
           </a:p>
         </p:txBody>
       </p:sp>
     </p:spTree>
     <p:extLst>
       <p:ext uri="{BB962C8B-B14F-4D97-AF65-F5344CB8AC3E}">
-        <p14:creationId xmlns:p14="http://schemas.microsoft.com/office/powerpoint/2010/main" val="682636785"/>
-      </p:ext>
-    </p:extLst>
-  </p:cSld>
-  <p:clrMapOvr>
-    <a:masterClrMapping/>
-  </p:clrMapOvr>
-</p:sld>
-</file>
-
-<file path=ppt/slides/slide8.xml><?xml version="1.0" encoding="utf-8"?>
-<p:sld xmlns:a="http://schemas.openxmlformats.org/drawingml/2006/main" xmlns:r="http://schemas.openxmlformats.org/officeDocument/2006/relationships" xmlns:p="http://schemas.openxmlformats.org/presentationml/2006/main">
-  <p:cSld>
-    <p:spTree>
-      <p:nvGrpSpPr>
-        <p:cNvPr id="1" name=""/>
-        <p:cNvGrpSpPr/>
-        <p:nvPr/>
-      </p:nvGrpSpPr>
-      <p:grpSpPr>
-        <a:xfrm>
-          <a:off x="0" y="0"/>
-          <a:ext cx="0" cy="0"/>
-          <a:chOff x="0" y="0"/>
-          <a:chExt cx="0" cy="0"/>
-        </a:xfrm>
-      </p:grpSpPr>
-      <p:sp>
-        <p:nvSpPr>
-          <p:cNvPr id="2" name="Text Placeholder 1"/>
-          <p:cNvSpPr>
-            <a:spLocks noGrp="1"/>
-          </p:cNvSpPr>
-          <p:nvPr>
-            <p:ph type="body" sz="quarter" idx="10"/>
-          </p:nvPr>
-        </p:nvSpPr>
-        <p:spPr/>
-        <p:txBody>
-          <a:bodyPr/>
-          <a:lstStyle/>
-          <a:p>
-            <a:r>
-              <a:rPr lang="de-DE" b="1" dirty="0"/>
-              <a:t>Ist das jetzt sinnvoll?</a:t>
-            </a:r>
-          </a:p>
-          <a:p>
-            <a:r>
-              <a:rPr lang="de-DE" b="1" dirty="0"/>
-              <a:t>Ergebnis:</a:t>
-            </a:r>
-          </a:p>
-        </p:txBody>
-      </p:sp>
-      <p:sp>
-        <p:nvSpPr>
-          <p:cNvPr id="3" name="Title 2"/>
-          <p:cNvSpPr>
-            <a:spLocks noGrp="1"/>
-          </p:cNvSpPr>
-          <p:nvPr>
-            <p:ph type="title"/>
-          </p:nvPr>
-        </p:nvSpPr>
-        <p:spPr/>
-        <p:txBody>
-          <a:bodyPr/>
-          <a:lstStyle/>
-          <a:p>
-            <a:r>
-              <a:rPr lang="de-DE" dirty="0"/>
-              <a:t>Abstimmen über Dauer</a:t>
-            </a:r>
-          </a:p>
-        </p:txBody>
-      </p:sp>
-    </p:spTree>
-    <p:extLst>
-      <p:ext uri="{BB962C8B-B14F-4D97-AF65-F5344CB8AC3E}">
-        <p14:creationId xmlns:p14="http://schemas.microsoft.com/office/powerpoint/2010/main" val="575880838"/>
-      </p:ext>
-    </p:extLst>
-  </p:cSld>
-  <p:clrMapOvr>
-    <a:masterClrMapping/>
-  </p:clrMapOvr>
-</p:sld>
-</file>
-
-<file path=ppt/slides/slide9.xml><?xml version="1.0" encoding="utf-8"?>
-<p:sld xmlns:a="http://schemas.openxmlformats.org/drawingml/2006/main" xmlns:r="http://schemas.openxmlformats.org/officeDocument/2006/relationships" xmlns:p="http://schemas.openxmlformats.org/presentationml/2006/main">
-  <p:cSld>
-    <p:spTree>
-      <p:nvGrpSpPr>
-        <p:cNvPr id="1" name=""/>
-        <p:cNvGrpSpPr/>
-        <p:nvPr/>
-      </p:nvGrpSpPr>
-      <p:grpSpPr>
-        <a:xfrm>
-          <a:off x="0" y="0"/>
-          <a:ext cx="0" cy="0"/>
-          <a:chOff x="0" y="0"/>
-          <a:chExt cx="0" cy="0"/>
-        </a:xfrm>
-      </p:grpSpPr>
-      <p:sp>
-        <p:nvSpPr>
-          <p:cNvPr id="2" name="Text Placeholder 1"/>
-          <p:cNvSpPr>
-            <a:spLocks noGrp="1"/>
-          </p:cNvSpPr>
-          <p:nvPr>
-            <p:ph type="body" sz="quarter" idx="10"/>
-          </p:nvPr>
-        </p:nvSpPr>
-        <p:spPr/>
-        <p:txBody>
-          <a:bodyPr/>
-          <a:lstStyle/>
-          <a:p>
-            <a:endParaRPr lang="de-DE" dirty="0"/>
-          </a:p>
-        </p:txBody>
-      </p:sp>
-      <p:sp>
-        <p:nvSpPr>
-          <p:cNvPr id="3" name="Title 2"/>
-          <p:cNvSpPr>
-            <a:spLocks noGrp="1"/>
-          </p:cNvSpPr>
-          <p:nvPr>
-            <p:ph type="title"/>
-          </p:nvPr>
-        </p:nvSpPr>
-        <p:spPr/>
-        <p:txBody>
-          <a:bodyPr/>
-          <a:lstStyle/>
-          <a:p>
-            <a:r>
-              <a:rPr lang="de-DE" dirty="0"/>
-              <a:t>Vorgangsliste aus den Arbeitspaketen erstellen - Ergebnis</a:t>
-            </a:r>
-          </a:p>
-        </p:txBody>
-      </p:sp>
-      <p:graphicFrame>
-        <p:nvGraphicFramePr>
-          <p:cNvPr id="4" name="Table 3"/>
-          <p:cNvGraphicFramePr>
-            <a:graphicFrameLocks noGrp="1"/>
-          </p:cNvGraphicFramePr>
-          <p:nvPr>
-            <p:extLst>
-              <p:ext uri="{D42A27DB-BD31-4B8C-83A1-F6EECF244321}">
-                <p14:modId xmlns:p14="http://schemas.microsoft.com/office/powerpoint/2010/main" val="3806411188"/>
-              </p:ext>
-            </p:extLst>
-          </p:nvPr>
-        </p:nvGraphicFramePr>
-        <p:xfrm>
-          <a:off x="503998" y="1619992"/>
-          <a:ext cx="11186478" cy="4716013"/>
-        </p:xfrm>
-        <a:graphic>
-          <a:graphicData uri="http://schemas.openxmlformats.org/drawingml/2006/table">
-            <a:tbl>
-              <a:tblPr/>
-              <a:tblGrid>
-                <a:gridCol w="775002">
-                  <a:extLst>
-                    <a:ext uri="{9D8B030D-6E8A-4147-A177-3AD203B41FA5}">
-                      <a16:colId xmlns:a16="http://schemas.microsoft.com/office/drawing/2014/main" val="3381181844"/>
-                    </a:ext>
-                  </a:extLst>
-                </a:gridCol>
-                <a:gridCol w="5677348">
-                  <a:extLst>
-                    <a:ext uri="{9D8B030D-6E8A-4147-A177-3AD203B41FA5}">
-                      <a16:colId xmlns:a16="http://schemas.microsoft.com/office/drawing/2014/main" val="2295096588"/>
-                    </a:ext>
-                  </a:extLst>
-                </a:gridCol>
-                <a:gridCol w="1393805">
-                  <a:extLst>
-                    <a:ext uri="{9D8B030D-6E8A-4147-A177-3AD203B41FA5}">
-                      <a16:colId xmlns:a16="http://schemas.microsoft.com/office/drawing/2014/main" val="3471821630"/>
-                    </a:ext>
-                  </a:extLst>
-                </a:gridCol>
-                <a:gridCol w="1946518">
-                  <a:extLst>
-                    <a:ext uri="{9D8B030D-6E8A-4147-A177-3AD203B41FA5}">
-                      <a16:colId xmlns:a16="http://schemas.microsoft.com/office/drawing/2014/main" val="4286377272"/>
-                    </a:ext>
-                  </a:extLst>
-                </a:gridCol>
-                <a:gridCol w="1393805">
-                  <a:extLst>
-                    <a:ext uri="{9D8B030D-6E8A-4147-A177-3AD203B41FA5}">
-                      <a16:colId xmlns:a16="http://schemas.microsoft.com/office/drawing/2014/main" val="1541934383"/>
-                    </a:ext>
-                  </a:extLst>
-                </a:gridCol>
-              </a:tblGrid>
-              <a:tr h="264796">
-                <a:tc>
-                  <a:txBody>
-                    <a:bodyPr/>
-                    <a:lstStyle/>
-                    <a:p>
-                      <a:pPr algn="l" fontAlgn="b"/>
-                      <a:r>
-                        <a:rPr lang="de-DE" sz="1100" b="1" i="0" u="none" strike="noStrike">
-                          <a:solidFill>
-                            <a:srgbClr val="FFFFFF"/>
-                          </a:solidFill>
-                          <a:effectLst/>
-                          <a:latin typeface="Calibri" panose="020F0502020204030204" pitchFamily="34" charset="0"/>
-                        </a:rPr>
-                        <a:t>Nr.</a:t>
-                      </a:r>
-                    </a:p>
-                  </a:txBody>
-                  <a:tcPr marL="9525" marR="9525" marT="9525" marB="0" anchor="b">
-                    <a:lnL w="6350" cap="flat" cmpd="sng" algn="ctr">
-                      <a:solidFill>
-                        <a:srgbClr val="8EA9DB"/>
-                      </a:solidFill>
-                      <a:prstDash val="solid"/>
-                      <a:round/>
-                      <a:headEnd type="none" w="med" len="med"/>
-                      <a:tailEnd type="none" w="med" len="med"/>
-                    </a:lnL>
-                    <a:lnR>
-                      <a:noFill/>
-                    </a:lnR>
-                    <a:lnT w="6350" cap="flat" cmpd="sng" algn="ctr">
-                      <a:solidFill>
-                        <a:srgbClr val="8EA9DB"/>
-                      </a:solidFill>
-                      <a:prstDash val="solid"/>
-                      <a:round/>
-                      <a:headEnd type="none" w="med" len="med"/>
-                      <a:tailEnd type="none" w="med" len="med"/>
-                    </a:lnT>
-                    <a:lnB w="6350" cap="flat" cmpd="sng" algn="ctr">
-                      <a:solidFill>
-                        <a:srgbClr val="8EA9DB"/>
-                      </a:solidFill>
-                      <a:prstDash val="solid"/>
-                      <a:round/>
-                      <a:headEnd type="none" w="med" len="med"/>
-                      <a:tailEnd type="none" w="med" len="med"/>
-                    </a:lnB>
-                    <a:solidFill>
-                      <a:srgbClr val="4472C4"/>
-                    </a:solidFill>
-                  </a:tcPr>
-                </a:tc>
-                <a:tc>
-                  <a:txBody>
-                    <a:bodyPr/>
-                    <a:lstStyle/>
-                    <a:p>
-                      <a:pPr algn="l" fontAlgn="b"/>
-                      <a:r>
-                        <a:rPr lang="de-DE" sz="1100" b="1" i="0" u="none" strike="noStrike" dirty="0">
-                          <a:solidFill>
-                            <a:srgbClr val="FFFFFF"/>
-                          </a:solidFill>
-                          <a:effectLst/>
-                          <a:latin typeface="Calibri" panose="020F0502020204030204" pitchFamily="34" charset="0"/>
-                        </a:rPr>
-                        <a:t>Name</a:t>
-                      </a:r>
-                    </a:p>
-                  </a:txBody>
-                  <a:tcPr marL="9525" marR="9525" marT="9525" marB="0" anchor="b">
-                    <a:lnL>
-                      <a:noFill/>
-                    </a:lnL>
-                    <a:lnR>
-                      <a:noFill/>
-                    </a:lnR>
-                    <a:lnT w="6350" cap="flat" cmpd="sng" algn="ctr">
-                      <a:solidFill>
-                        <a:srgbClr val="8EA9DB"/>
-                      </a:solidFill>
-                      <a:prstDash val="solid"/>
-                      <a:round/>
-                      <a:headEnd type="none" w="med" len="med"/>
-                      <a:tailEnd type="none" w="med" len="med"/>
-                    </a:lnT>
-                    <a:lnB w="6350" cap="flat" cmpd="sng" algn="ctr">
-                      <a:solidFill>
-                        <a:srgbClr val="8EA9DB"/>
-                      </a:solidFill>
-                      <a:prstDash val="solid"/>
-                      <a:round/>
-                      <a:headEnd type="none" w="med" len="med"/>
-                      <a:tailEnd type="none" w="med" len="med"/>
-                    </a:lnB>
-                    <a:solidFill>
-                      <a:srgbClr val="4472C4"/>
-                    </a:solidFill>
-                  </a:tcPr>
-                </a:tc>
-                <a:tc>
-                  <a:txBody>
-                    <a:bodyPr/>
-                    <a:lstStyle/>
-                    <a:p>
-                      <a:pPr algn="l" fontAlgn="b"/>
-                      <a:r>
-                        <a:rPr lang="de-DE" sz="1100" b="1" i="0" u="none" strike="noStrike">
-                          <a:solidFill>
-                            <a:srgbClr val="FFFFFF"/>
-                          </a:solidFill>
-                          <a:effectLst/>
-                          <a:latin typeface="Calibri" panose="020F0502020204030204" pitchFamily="34" charset="0"/>
-                        </a:rPr>
-                        <a:t>Vorgänger</a:t>
-                      </a:r>
-                    </a:p>
-                  </a:txBody>
-                  <a:tcPr marL="9525" marR="9525" marT="9525" marB="0" anchor="b">
-                    <a:lnL>
-                      <a:noFill/>
-                    </a:lnL>
-                    <a:lnR>
-                      <a:noFill/>
-                    </a:lnR>
-                    <a:lnT w="6350" cap="flat" cmpd="sng" algn="ctr">
-                      <a:solidFill>
-                        <a:srgbClr val="8EA9DB"/>
-                      </a:solidFill>
-                      <a:prstDash val="solid"/>
-                      <a:round/>
-                      <a:headEnd type="none" w="med" len="med"/>
-                      <a:tailEnd type="none" w="med" len="med"/>
-                    </a:lnT>
-                    <a:lnB w="6350" cap="flat" cmpd="sng" algn="ctr">
-                      <a:solidFill>
-                        <a:srgbClr val="8EA9DB"/>
-                      </a:solidFill>
-                      <a:prstDash val="solid"/>
-                      <a:round/>
-                      <a:headEnd type="none" w="med" len="med"/>
-                      <a:tailEnd type="none" w="med" len="med"/>
-                    </a:lnB>
-                    <a:solidFill>
-                      <a:srgbClr val="4472C4"/>
-                    </a:solidFill>
-                  </a:tcPr>
-                </a:tc>
-                <a:tc>
-                  <a:txBody>
-                    <a:bodyPr/>
-                    <a:lstStyle/>
-                    <a:p>
-                      <a:pPr algn="l" fontAlgn="b"/>
-                      <a:r>
-                        <a:rPr lang="de-DE" sz="1100" b="1" i="0" u="none" strike="noStrike">
-                          <a:solidFill>
-                            <a:srgbClr val="FFFFFF"/>
-                          </a:solidFill>
-                          <a:effectLst/>
-                          <a:latin typeface="Calibri" panose="020F0502020204030204" pitchFamily="34" charset="0"/>
-                        </a:rPr>
-                        <a:t>Nachfolger</a:t>
-                      </a:r>
-                    </a:p>
-                  </a:txBody>
-                  <a:tcPr marL="9525" marR="9525" marT="9525" marB="0" anchor="b">
-                    <a:lnL>
-                      <a:noFill/>
-                    </a:lnL>
-                    <a:lnR>
-                      <a:noFill/>
-                    </a:lnR>
-                    <a:lnT w="6350" cap="flat" cmpd="sng" algn="ctr">
-                      <a:solidFill>
-                        <a:srgbClr val="8EA9DB"/>
-                      </a:solidFill>
-                      <a:prstDash val="solid"/>
-                      <a:round/>
-                      <a:headEnd type="none" w="med" len="med"/>
-                      <a:tailEnd type="none" w="med" len="med"/>
-                    </a:lnT>
-                    <a:lnB w="6350" cap="flat" cmpd="sng" algn="ctr">
-                      <a:solidFill>
-                        <a:srgbClr val="8EA9DB"/>
-                      </a:solidFill>
-                      <a:prstDash val="solid"/>
-                      <a:round/>
-                      <a:headEnd type="none" w="med" len="med"/>
-                      <a:tailEnd type="none" w="med" len="med"/>
-                    </a:lnB>
-                    <a:solidFill>
-                      <a:srgbClr val="4472C4"/>
-                    </a:solidFill>
-                  </a:tcPr>
-                </a:tc>
-                <a:tc>
-                  <a:txBody>
-                    <a:bodyPr/>
-                    <a:lstStyle/>
-                    <a:p>
-                      <a:pPr algn="l" fontAlgn="b"/>
-                      <a:r>
-                        <a:rPr lang="de-DE" sz="1100" b="1" i="0" u="none" strike="noStrike">
-                          <a:solidFill>
-                            <a:srgbClr val="FFFFFF"/>
-                          </a:solidFill>
-                          <a:effectLst/>
-                          <a:latin typeface="Calibri" panose="020F0502020204030204" pitchFamily="34" charset="0"/>
-                        </a:rPr>
-                        <a:t>Dauer</a:t>
-                      </a:r>
-                    </a:p>
-                  </a:txBody>
-                  <a:tcPr marL="9525" marR="9525" marT="9525" marB="0" anchor="b">
-                    <a:lnL>
-                      <a:noFill/>
-                    </a:lnL>
-                    <a:lnR w="6350" cap="flat" cmpd="sng" algn="ctr">
-                      <a:solidFill>
-                        <a:srgbClr val="8EA9DB"/>
-                      </a:solidFill>
-                      <a:prstDash val="solid"/>
-                      <a:round/>
-                      <a:headEnd type="none" w="med" len="med"/>
-                      <a:tailEnd type="none" w="med" len="med"/>
-                    </a:lnR>
-                    <a:lnT w="6350" cap="flat" cmpd="sng" algn="ctr">
-                      <a:solidFill>
-                        <a:srgbClr val="8EA9DB"/>
-                      </a:solidFill>
-                      <a:prstDash val="solid"/>
-                      <a:round/>
-                      <a:headEnd type="none" w="med" len="med"/>
-                      <a:tailEnd type="none" w="med" len="med"/>
-                    </a:lnT>
-                    <a:lnB w="6350" cap="flat" cmpd="sng" algn="ctr">
-                      <a:solidFill>
-                        <a:srgbClr val="8EA9DB"/>
-                      </a:solidFill>
-                      <a:prstDash val="solid"/>
-                      <a:round/>
-                      <a:headEnd type="none" w="med" len="med"/>
-                      <a:tailEnd type="none" w="med" len="med"/>
-                    </a:lnB>
-                    <a:solidFill>
-                      <a:srgbClr val="4472C4"/>
-                    </a:solidFill>
-                  </a:tcPr>
-                </a:tc>
-                <a:extLst>
-                  <a:ext uri="{0D108BD9-81ED-4DB2-BD59-A6C34878D82A}">
-                    <a16:rowId xmlns:a16="http://schemas.microsoft.com/office/drawing/2014/main" val="3678723692"/>
-                  </a:ext>
-                </a:extLst>
-              </a:tr>
-              <a:tr h="264796">
-                <a:tc>
-                  <a:txBody>
-                    <a:bodyPr/>
-                    <a:lstStyle/>
-                    <a:p>
-                      <a:pPr algn="r" fontAlgn="b"/>
-                      <a:r>
-                        <a:rPr lang="de-DE" sz="1100" b="0" i="0" u="none" strike="noStrike">
-                          <a:solidFill>
-                            <a:srgbClr val="000000"/>
-                          </a:solidFill>
-                          <a:effectLst/>
-                          <a:latin typeface="Calibri" panose="020F0502020204030204" pitchFamily="34" charset="0"/>
-                        </a:rPr>
-                        <a:t>1</a:t>
-                      </a:r>
-                    </a:p>
-                  </a:txBody>
-                  <a:tcPr marL="9525" marR="9525" marT="9525" marB="0" anchor="b">
-                    <a:lnL w="6350" cap="flat" cmpd="sng" algn="ctr">
-                      <a:solidFill>
-                        <a:srgbClr val="8EA9DB"/>
-                      </a:solidFill>
-                      <a:prstDash val="solid"/>
-                      <a:round/>
-                      <a:headEnd type="none" w="med" len="med"/>
-                      <a:tailEnd type="none" w="med" len="med"/>
-                    </a:lnL>
-                    <a:lnR>
-                      <a:noFill/>
-                    </a:lnR>
-                    <a:lnT w="6350" cap="flat" cmpd="sng" algn="ctr">
-                      <a:solidFill>
-                        <a:srgbClr val="8EA9DB"/>
-                      </a:solidFill>
-                      <a:prstDash val="solid"/>
-                      <a:round/>
-                      <a:headEnd type="none" w="med" len="med"/>
-                      <a:tailEnd type="none" w="med" len="med"/>
-                    </a:lnT>
-                    <a:lnB w="6350" cap="flat" cmpd="sng" algn="ctr">
-                      <a:solidFill>
-                        <a:srgbClr val="8EA9DB"/>
-                      </a:solidFill>
-                      <a:prstDash val="solid"/>
-                      <a:round/>
-                      <a:headEnd type="none" w="med" len="med"/>
-                      <a:tailEnd type="none" w="med" len="med"/>
-                    </a:lnB>
-                    <a:solidFill>
-                      <a:srgbClr val="D9E1F2"/>
-                    </a:solidFill>
-                  </a:tcPr>
-                </a:tc>
-                <a:tc>
-                  <a:txBody>
-                    <a:bodyPr/>
-                    <a:lstStyle/>
-                    <a:p>
-                      <a:pPr algn="l" fontAlgn="b"/>
-                      <a:r>
-                        <a:rPr lang="de-DE" sz="1100" b="0" i="0" u="none" strike="noStrike">
-                          <a:solidFill>
-                            <a:srgbClr val="000000"/>
-                          </a:solidFill>
-                          <a:effectLst/>
-                          <a:latin typeface="Calibri" panose="020F0502020204030204" pitchFamily="34" charset="0"/>
-                        </a:rPr>
-                        <a:t>Einarbeitung</a:t>
-                      </a:r>
-                    </a:p>
-                  </a:txBody>
-                  <a:tcPr marL="9525" marR="9525" marT="9525" marB="0" anchor="b">
-                    <a:lnL>
-                      <a:noFill/>
-                    </a:lnL>
-                    <a:lnR>
-                      <a:noFill/>
-                    </a:lnR>
-                    <a:lnT w="6350" cap="flat" cmpd="sng" algn="ctr">
-                      <a:solidFill>
-                        <a:srgbClr val="8EA9DB"/>
-                      </a:solidFill>
-                      <a:prstDash val="solid"/>
-                      <a:round/>
-                      <a:headEnd type="none" w="med" len="med"/>
-                      <a:tailEnd type="none" w="med" len="med"/>
-                    </a:lnT>
-                    <a:lnB w="6350" cap="flat" cmpd="sng" algn="ctr">
-                      <a:solidFill>
-                        <a:srgbClr val="8EA9DB"/>
-                      </a:solidFill>
-                      <a:prstDash val="solid"/>
-                      <a:round/>
-                      <a:headEnd type="none" w="med" len="med"/>
-                      <a:tailEnd type="none" w="med" len="med"/>
-                    </a:lnB>
-                    <a:solidFill>
-                      <a:srgbClr val="D9E1F2"/>
-                    </a:solidFill>
-                  </a:tcPr>
-                </a:tc>
-                <a:tc>
-                  <a:txBody>
-                    <a:bodyPr/>
-                    <a:lstStyle/>
-                    <a:p>
-                      <a:pPr algn="l" fontAlgn="b"/>
-                      <a:endParaRPr lang="de-DE" sz="1100" b="0" i="0" u="none" strike="noStrike">
-                        <a:solidFill>
-                          <a:srgbClr val="000000"/>
-                        </a:solidFill>
-                        <a:effectLst/>
-                        <a:latin typeface="Calibri" panose="020F0502020204030204" pitchFamily="34" charset="0"/>
-                      </a:endParaRPr>
-                    </a:p>
-                  </a:txBody>
-                  <a:tcPr marL="9525" marR="9525" marT="9525" marB="0" anchor="b">
-                    <a:lnL>
-                      <a:noFill/>
-                    </a:lnL>
-                    <a:lnR>
-                      <a:noFill/>
-                    </a:lnR>
-                    <a:lnT w="6350" cap="flat" cmpd="sng" algn="ctr">
-                      <a:solidFill>
-                        <a:srgbClr val="8EA9DB"/>
-                      </a:solidFill>
-                      <a:prstDash val="solid"/>
-                      <a:round/>
-                      <a:headEnd type="none" w="med" len="med"/>
-                      <a:tailEnd type="none" w="med" len="med"/>
-                    </a:lnT>
-                    <a:lnB w="6350" cap="flat" cmpd="sng" algn="ctr">
-                      <a:solidFill>
-                        <a:srgbClr val="8EA9DB"/>
-                      </a:solidFill>
-                      <a:prstDash val="solid"/>
-                      <a:round/>
-                      <a:headEnd type="none" w="med" len="med"/>
-                      <a:tailEnd type="none" w="med" len="med"/>
-                    </a:lnB>
-                    <a:solidFill>
-                      <a:srgbClr val="D9E1F2"/>
-                    </a:solidFill>
-                  </a:tcPr>
-                </a:tc>
-                <a:tc>
-                  <a:txBody>
-                    <a:bodyPr/>
-                    <a:lstStyle/>
-                    <a:p>
-                      <a:pPr algn="l" fontAlgn="b"/>
-                      <a:r>
-                        <a:rPr lang="de-DE" sz="1100" b="0" i="0" u="none" strike="noStrike">
-                          <a:solidFill>
-                            <a:srgbClr val="000000"/>
-                          </a:solidFill>
-                          <a:effectLst/>
-                          <a:latin typeface="Calibri" panose="020F0502020204030204" pitchFamily="34" charset="0"/>
-                        </a:rPr>
-                        <a:t>2 3</a:t>
-                      </a:r>
-                    </a:p>
-                  </a:txBody>
-                  <a:tcPr marL="9525" marR="9525" marT="9525" marB="0" anchor="b">
-                    <a:lnL>
-                      <a:noFill/>
-                    </a:lnL>
-                    <a:lnR>
-                      <a:noFill/>
-                    </a:lnR>
-                    <a:lnT w="6350" cap="flat" cmpd="sng" algn="ctr">
-                      <a:solidFill>
-                        <a:srgbClr val="8EA9DB"/>
-                      </a:solidFill>
-                      <a:prstDash val="solid"/>
-                      <a:round/>
-                      <a:headEnd type="none" w="med" len="med"/>
-                      <a:tailEnd type="none" w="med" len="med"/>
-                    </a:lnT>
-                    <a:lnB w="6350" cap="flat" cmpd="sng" algn="ctr">
-                      <a:solidFill>
-                        <a:srgbClr val="8EA9DB"/>
-                      </a:solidFill>
-                      <a:prstDash val="solid"/>
-                      <a:round/>
-                      <a:headEnd type="none" w="med" len="med"/>
-                      <a:tailEnd type="none" w="med" len="med"/>
-                    </a:lnB>
-                    <a:solidFill>
-                      <a:srgbClr val="D9E1F2"/>
-                    </a:solidFill>
-                  </a:tcPr>
-                </a:tc>
-                <a:tc>
-                  <a:txBody>
-                    <a:bodyPr/>
-                    <a:lstStyle/>
-                    <a:p>
-                      <a:pPr algn="l" fontAlgn="b"/>
-                      <a:endParaRPr lang="de-DE" sz="1100" b="0" i="0" u="none" strike="noStrike">
-                        <a:solidFill>
-                          <a:srgbClr val="000000"/>
-                        </a:solidFill>
-                        <a:effectLst/>
-                        <a:latin typeface="Calibri" panose="020F0502020204030204" pitchFamily="34" charset="0"/>
-                      </a:endParaRPr>
-                    </a:p>
-                  </a:txBody>
-                  <a:tcPr marL="9525" marR="9525" marT="9525" marB="0" anchor="b">
-                    <a:lnL>
-                      <a:noFill/>
-                    </a:lnL>
-                    <a:lnR w="6350" cap="flat" cmpd="sng" algn="ctr">
-                      <a:solidFill>
-                        <a:srgbClr val="8EA9DB"/>
-                      </a:solidFill>
-                      <a:prstDash val="solid"/>
-                      <a:round/>
-                      <a:headEnd type="none" w="med" len="med"/>
-                      <a:tailEnd type="none" w="med" len="med"/>
-                    </a:lnR>
-                    <a:lnT w="6350" cap="flat" cmpd="sng" algn="ctr">
-                      <a:solidFill>
-                        <a:srgbClr val="8EA9DB"/>
-                      </a:solidFill>
-                      <a:prstDash val="solid"/>
-                      <a:round/>
-                      <a:headEnd type="none" w="med" len="med"/>
-                      <a:tailEnd type="none" w="med" len="med"/>
-                    </a:lnT>
-                    <a:lnB w="6350" cap="flat" cmpd="sng" algn="ctr">
-                      <a:solidFill>
-                        <a:srgbClr val="8EA9DB"/>
-                      </a:solidFill>
-                      <a:prstDash val="solid"/>
-                      <a:round/>
-                      <a:headEnd type="none" w="med" len="med"/>
-                      <a:tailEnd type="none" w="med" len="med"/>
-                    </a:lnB>
-                    <a:solidFill>
-                      <a:srgbClr val="D9E1F2"/>
-                    </a:solidFill>
-                  </a:tcPr>
-                </a:tc>
-                <a:extLst>
-                  <a:ext uri="{0D108BD9-81ED-4DB2-BD59-A6C34878D82A}">
-                    <a16:rowId xmlns:a16="http://schemas.microsoft.com/office/drawing/2014/main" val="1572911390"/>
-                  </a:ext>
-                </a:extLst>
-              </a:tr>
-              <a:tr h="479277">
-                <a:tc>
-                  <a:txBody>
-                    <a:bodyPr/>
-                    <a:lstStyle/>
-                    <a:p>
-                      <a:pPr algn="r" fontAlgn="b"/>
-                      <a:r>
-                        <a:rPr lang="de-DE" sz="1100" b="0" i="0" u="none" strike="noStrike">
-                          <a:solidFill>
-                            <a:srgbClr val="000000"/>
-                          </a:solidFill>
-                          <a:effectLst/>
-                          <a:latin typeface="Calibri" panose="020F0502020204030204" pitchFamily="34" charset="0"/>
-                        </a:rPr>
-                        <a:t>2</a:t>
-                      </a:r>
-                    </a:p>
-                  </a:txBody>
-                  <a:tcPr marL="9525" marR="9525" marT="9525" marB="0" anchor="b">
-                    <a:lnL w="6350" cap="flat" cmpd="sng" algn="ctr">
-                      <a:solidFill>
-                        <a:srgbClr val="8EA9DB"/>
-                      </a:solidFill>
-                      <a:prstDash val="solid"/>
-                      <a:round/>
-                      <a:headEnd type="none" w="med" len="med"/>
-                      <a:tailEnd type="none" w="med" len="med"/>
-                    </a:lnL>
-                    <a:lnR>
-                      <a:noFill/>
-                    </a:lnR>
-                    <a:lnT w="6350" cap="flat" cmpd="sng" algn="ctr">
-                      <a:solidFill>
-                        <a:srgbClr val="8EA9DB"/>
-                      </a:solidFill>
-                      <a:prstDash val="solid"/>
-                      <a:round/>
-                      <a:headEnd type="none" w="med" len="med"/>
-                      <a:tailEnd type="none" w="med" len="med"/>
-                    </a:lnT>
-                    <a:lnB w="6350" cap="flat" cmpd="sng" algn="ctr">
-                      <a:solidFill>
-                        <a:srgbClr val="8EA9DB"/>
-                      </a:solidFill>
-                      <a:prstDash val="solid"/>
-                      <a:round/>
-                      <a:headEnd type="none" w="med" len="med"/>
-                      <a:tailEnd type="none" w="med" len="med"/>
-                    </a:lnB>
-                  </a:tcPr>
-                </a:tc>
-                <a:tc>
-                  <a:txBody>
-                    <a:bodyPr/>
-                    <a:lstStyle/>
-                    <a:p>
-                      <a:pPr algn="l" fontAlgn="b"/>
-                      <a:r>
-                        <a:rPr lang="de-DE" sz="1100" b="0" i="0" u="none" strike="noStrike">
-                          <a:solidFill>
-                            <a:srgbClr val="000000"/>
-                          </a:solidFill>
-                          <a:effectLst/>
-                          <a:latin typeface="Calibri" panose="020F0502020204030204" pitchFamily="34" charset="0"/>
-                        </a:rPr>
-                        <a:t>Datenmodell erarbeiten (Konzept) + mit Daten füllen</a:t>
-                      </a:r>
-                    </a:p>
-                  </a:txBody>
-                  <a:tcPr marL="9525" marR="9525" marT="9525" marB="0" anchor="b">
-                    <a:lnL>
-                      <a:noFill/>
-                    </a:lnL>
-                    <a:lnR>
-                      <a:noFill/>
-                    </a:lnR>
-                    <a:lnT w="6350" cap="flat" cmpd="sng" algn="ctr">
-                      <a:solidFill>
-                        <a:srgbClr val="8EA9DB"/>
-                      </a:solidFill>
-                      <a:prstDash val="solid"/>
-                      <a:round/>
-                      <a:headEnd type="none" w="med" len="med"/>
-                      <a:tailEnd type="none" w="med" len="med"/>
-                    </a:lnT>
-                    <a:lnB w="6350" cap="flat" cmpd="sng" algn="ctr">
-                      <a:solidFill>
-                        <a:srgbClr val="8EA9DB"/>
-                      </a:solidFill>
-                      <a:prstDash val="solid"/>
-                      <a:round/>
-                      <a:headEnd type="none" w="med" len="med"/>
-                      <a:tailEnd type="none" w="med" len="med"/>
-                    </a:lnB>
-                  </a:tcPr>
-                </a:tc>
-                <a:tc>
-                  <a:txBody>
-                    <a:bodyPr/>
-                    <a:lstStyle/>
-                    <a:p>
-                      <a:pPr algn="l" fontAlgn="b"/>
-                      <a:r>
-                        <a:rPr lang="de-DE" sz="1100" b="0" i="0" u="none" strike="noStrike">
-                          <a:solidFill>
-                            <a:srgbClr val="000000"/>
-                          </a:solidFill>
-                          <a:effectLst/>
-                          <a:latin typeface="Calibri" panose="020F0502020204030204" pitchFamily="34" charset="0"/>
-                        </a:rPr>
-                        <a:t>1</a:t>
-                      </a:r>
-                    </a:p>
-                  </a:txBody>
-                  <a:tcPr marL="9525" marR="9525" marT="9525" marB="0" anchor="b">
-                    <a:lnL>
-                      <a:noFill/>
-                    </a:lnL>
-                    <a:lnR>
-                      <a:noFill/>
-                    </a:lnR>
-                    <a:lnT w="6350" cap="flat" cmpd="sng" algn="ctr">
-                      <a:solidFill>
-                        <a:srgbClr val="8EA9DB"/>
-                      </a:solidFill>
-                      <a:prstDash val="solid"/>
-                      <a:round/>
-                      <a:headEnd type="none" w="med" len="med"/>
-                      <a:tailEnd type="none" w="med" len="med"/>
-                    </a:lnT>
-                    <a:lnB w="6350" cap="flat" cmpd="sng" algn="ctr">
-                      <a:solidFill>
-                        <a:srgbClr val="8EA9DB"/>
-                      </a:solidFill>
-                      <a:prstDash val="solid"/>
-                      <a:round/>
-                      <a:headEnd type="none" w="med" len="med"/>
-                      <a:tailEnd type="none" w="med" len="med"/>
-                    </a:lnB>
-                  </a:tcPr>
-                </a:tc>
-                <a:tc>
-                  <a:txBody>
-                    <a:bodyPr/>
-                    <a:lstStyle/>
-                    <a:p>
-                      <a:pPr algn="l" fontAlgn="b"/>
-                      <a:r>
-                        <a:rPr lang="de-DE" sz="1100" b="0" i="0" u="none" strike="noStrike">
-                          <a:solidFill>
-                            <a:srgbClr val="000000"/>
-                          </a:solidFill>
-                          <a:effectLst/>
-                          <a:latin typeface="Calibri" panose="020F0502020204030204" pitchFamily="34" charset="0"/>
-                        </a:rPr>
-                        <a:t>6</a:t>
-                      </a:r>
-                    </a:p>
-                  </a:txBody>
-                  <a:tcPr marL="9525" marR="9525" marT="9525" marB="0" anchor="b">
-                    <a:lnL>
-                      <a:noFill/>
-                    </a:lnL>
-                    <a:lnR>
-                      <a:noFill/>
-                    </a:lnR>
-                    <a:lnT w="6350" cap="flat" cmpd="sng" algn="ctr">
-                      <a:solidFill>
-                        <a:srgbClr val="8EA9DB"/>
-                      </a:solidFill>
-                      <a:prstDash val="solid"/>
-                      <a:round/>
-                      <a:headEnd type="none" w="med" len="med"/>
-                      <a:tailEnd type="none" w="med" len="med"/>
-                    </a:lnT>
-                    <a:lnB w="6350" cap="flat" cmpd="sng" algn="ctr">
-                      <a:solidFill>
-                        <a:srgbClr val="8EA9DB"/>
-                      </a:solidFill>
-                      <a:prstDash val="solid"/>
-                      <a:round/>
-                      <a:headEnd type="none" w="med" len="med"/>
-                      <a:tailEnd type="none" w="med" len="med"/>
-                    </a:lnB>
-                  </a:tcPr>
-                </a:tc>
-                <a:tc>
-                  <a:txBody>
-                    <a:bodyPr/>
-                    <a:lstStyle/>
-                    <a:p>
-                      <a:pPr algn="l" fontAlgn="b"/>
-                      <a:endParaRPr lang="de-DE" sz="1100" b="0" i="0" u="none" strike="noStrike">
-                        <a:solidFill>
-                          <a:srgbClr val="000000"/>
-                        </a:solidFill>
-                        <a:effectLst/>
-                        <a:latin typeface="Calibri" panose="020F0502020204030204" pitchFamily="34" charset="0"/>
-                      </a:endParaRPr>
-                    </a:p>
-                  </a:txBody>
-                  <a:tcPr marL="9525" marR="9525" marT="9525" marB="0" anchor="b">
-                    <a:lnL>
-                      <a:noFill/>
-                    </a:lnL>
-                    <a:lnR w="6350" cap="flat" cmpd="sng" algn="ctr">
-                      <a:solidFill>
-                        <a:srgbClr val="8EA9DB"/>
-                      </a:solidFill>
-                      <a:prstDash val="solid"/>
-                      <a:round/>
-                      <a:headEnd type="none" w="med" len="med"/>
-                      <a:tailEnd type="none" w="med" len="med"/>
-                    </a:lnR>
-                    <a:lnT w="6350" cap="flat" cmpd="sng" algn="ctr">
-                      <a:solidFill>
-                        <a:srgbClr val="8EA9DB"/>
-                      </a:solidFill>
-                      <a:prstDash val="solid"/>
-                      <a:round/>
-                      <a:headEnd type="none" w="med" len="med"/>
-                      <a:tailEnd type="none" w="med" len="med"/>
-                    </a:lnT>
-                    <a:lnB w="6350" cap="flat" cmpd="sng" algn="ctr">
-                      <a:solidFill>
-                        <a:srgbClr val="8EA9DB"/>
-                      </a:solidFill>
-                      <a:prstDash val="solid"/>
-                      <a:round/>
-                      <a:headEnd type="none" w="med" len="med"/>
-                      <a:tailEnd type="none" w="med" len="med"/>
-                    </a:lnB>
-                  </a:tcPr>
-                </a:tc>
-                <a:extLst>
-                  <a:ext uri="{0D108BD9-81ED-4DB2-BD59-A6C34878D82A}">
-                    <a16:rowId xmlns:a16="http://schemas.microsoft.com/office/drawing/2014/main" val="1646329260"/>
-                  </a:ext>
-                </a:extLst>
-              </a:tr>
-              <a:tr h="264796">
-                <a:tc>
-                  <a:txBody>
-                    <a:bodyPr/>
-                    <a:lstStyle/>
-                    <a:p>
-                      <a:pPr algn="r" fontAlgn="b"/>
-                      <a:r>
-                        <a:rPr lang="de-DE" sz="1100" b="0" i="0" u="none" strike="noStrike">
-                          <a:solidFill>
-                            <a:srgbClr val="000000"/>
-                          </a:solidFill>
-                          <a:effectLst/>
-                          <a:latin typeface="Calibri" panose="020F0502020204030204" pitchFamily="34" charset="0"/>
-                        </a:rPr>
-                        <a:t>3</a:t>
-                      </a:r>
-                    </a:p>
-                  </a:txBody>
-                  <a:tcPr marL="9525" marR="9525" marT="9525" marB="0" anchor="b">
-                    <a:lnL w="6350" cap="flat" cmpd="sng" algn="ctr">
-                      <a:solidFill>
-                        <a:srgbClr val="8EA9DB"/>
-                      </a:solidFill>
-                      <a:prstDash val="solid"/>
-                      <a:round/>
-                      <a:headEnd type="none" w="med" len="med"/>
-                      <a:tailEnd type="none" w="med" len="med"/>
-                    </a:lnL>
-                    <a:lnR>
-                      <a:noFill/>
-                    </a:lnR>
-                    <a:lnT w="6350" cap="flat" cmpd="sng" algn="ctr">
-                      <a:solidFill>
-                        <a:srgbClr val="8EA9DB"/>
-                      </a:solidFill>
-                      <a:prstDash val="solid"/>
-                      <a:round/>
-                      <a:headEnd type="none" w="med" len="med"/>
-                      <a:tailEnd type="none" w="med" len="med"/>
-                    </a:lnT>
-                    <a:lnB w="6350" cap="flat" cmpd="sng" algn="ctr">
-                      <a:solidFill>
-                        <a:srgbClr val="8EA9DB"/>
-                      </a:solidFill>
-                      <a:prstDash val="solid"/>
-                      <a:round/>
-                      <a:headEnd type="none" w="med" len="med"/>
-                      <a:tailEnd type="none" w="med" len="med"/>
-                    </a:lnB>
-                    <a:solidFill>
-                      <a:srgbClr val="D9E1F2"/>
-                    </a:solidFill>
-                  </a:tcPr>
-                </a:tc>
-                <a:tc>
-                  <a:txBody>
-                    <a:bodyPr/>
-                    <a:lstStyle/>
-                    <a:p>
-                      <a:pPr algn="l" fontAlgn="b"/>
-                      <a:r>
-                        <a:rPr lang="de-DE" sz="1100" b="0" i="0" u="none" strike="noStrike">
-                          <a:solidFill>
-                            <a:srgbClr val="000000"/>
-                          </a:solidFill>
-                          <a:effectLst/>
-                          <a:latin typeface="Calibri" panose="020F0502020204030204" pitchFamily="34" charset="0"/>
-                        </a:rPr>
-                        <a:t>Komponenten definieren</a:t>
-                      </a:r>
-                    </a:p>
-                  </a:txBody>
-                  <a:tcPr marL="9525" marR="9525" marT="9525" marB="0" anchor="b">
-                    <a:lnL>
-                      <a:noFill/>
-                    </a:lnL>
-                    <a:lnR>
-                      <a:noFill/>
-                    </a:lnR>
-                    <a:lnT w="6350" cap="flat" cmpd="sng" algn="ctr">
-                      <a:solidFill>
-                        <a:srgbClr val="8EA9DB"/>
-                      </a:solidFill>
-                      <a:prstDash val="solid"/>
-                      <a:round/>
-                      <a:headEnd type="none" w="med" len="med"/>
-                      <a:tailEnd type="none" w="med" len="med"/>
-                    </a:lnT>
-                    <a:lnB w="6350" cap="flat" cmpd="sng" algn="ctr">
-                      <a:solidFill>
-                        <a:srgbClr val="8EA9DB"/>
-                      </a:solidFill>
-                      <a:prstDash val="solid"/>
-                      <a:round/>
-                      <a:headEnd type="none" w="med" len="med"/>
-                      <a:tailEnd type="none" w="med" len="med"/>
-                    </a:lnB>
-                    <a:solidFill>
-                      <a:srgbClr val="D9E1F2"/>
-                    </a:solidFill>
-                  </a:tcPr>
-                </a:tc>
-                <a:tc>
-                  <a:txBody>
-                    <a:bodyPr/>
-                    <a:lstStyle/>
-                    <a:p>
-                      <a:pPr algn="l" fontAlgn="b"/>
-                      <a:r>
-                        <a:rPr lang="de-DE" sz="1100" b="0" i="0" u="none" strike="noStrike">
-                          <a:solidFill>
-                            <a:srgbClr val="000000"/>
-                          </a:solidFill>
-                          <a:effectLst/>
-                          <a:latin typeface="Calibri" panose="020F0502020204030204" pitchFamily="34" charset="0"/>
-                        </a:rPr>
-                        <a:t>1</a:t>
-                      </a:r>
-                    </a:p>
-                  </a:txBody>
-                  <a:tcPr marL="9525" marR="9525" marT="9525" marB="0" anchor="b">
-                    <a:lnL>
-                      <a:noFill/>
-                    </a:lnL>
-                    <a:lnR>
-                      <a:noFill/>
-                    </a:lnR>
-                    <a:lnT w="6350" cap="flat" cmpd="sng" algn="ctr">
-                      <a:solidFill>
-                        <a:srgbClr val="8EA9DB"/>
-                      </a:solidFill>
-                      <a:prstDash val="solid"/>
-                      <a:round/>
-                      <a:headEnd type="none" w="med" len="med"/>
-                      <a:tailEnd type="none" w="med" len="med"/>
-                    </a:lnT>
-                    <a:lnB w="6350" cap="flat" cmpd="sng" algn="ctr">
-                      <a:solidFill>
-                        <a:srgbClr val="8EA9DB"/>
-                      </a:solidFill>
-                      <a:prstDash val="solid"/>
-                      <a:round/>
-                      <a:headEnd type="none" w="med" len="med"/>
-                      <a:tailEnd type="none" w="med" len="med"/>
-                    </a:lnB>
-                    <a:solidFill>
-                      <a:srgbClr val="D9E1F2"/>
-                    </a:solidFill>
-                  </a:tcPr>
-                </a:tc>
-                <a:tc>
-                  <a:txBody>
-                    <a:bodyPr/>
-                    <a:lstStyle/>
-                    <a:p>
-                      <a:pPr algn="l" fontAlgn="b"/>
-                      <a:r>
-                        <a:rPr lang="de-DE" sz="1100" b="0" i="0" u="none" strike="noStrike">
-                          <a:solidFill>
-                            <a:srgbClr val="000000"/>
-                          </a:solidFill>
-                          <a:effectLst/>
-                          <a:latin typeface="Calibri" panose="020F0502020204030204" pitchFamily="34" charset="0"/>
-                        </a:rPr>
-                        <a:t>4</a:t>
-                      </a:r>
-                    </a:p>
-                  </a:txBody>
-                  <a:tcPr marL="9525" marR="9525" marT="9525" marB="0" anchor="b">
-                    <a:lnL>
-                      <a:noFill/>
-                    </a:lnL>
-                    <a:lnR>
-                      <a:noFill/>
-                    </a:lnR>
-                    <a:lnT w="6350" cap="flat" cmpd="sng" algn="ctr">
-                      <a:solidFill>
-                        <a:srgbClr val="8EA9DB"/>
-                      </a:solidFill>
-                      <a:prstDash val="solid"/>
-                      <a:round/>
-                      <a:headEnd type="none" w="med" len="med"/>
-                      <a:tailEnd type="none" w="med" len="med"/>
-                    </a:lnT>
-                    <a:lnB w="6350" cap="flat" cmpd="sng" algn="ctr">
-                      <a:solidFill>
-                        <a:srgbClr val="8EA9DB"/>
-                      </a:solidFill>
-                      <a:prstDash val="solid"/>
-                      <a:round/>
-                      <a:headEnd type="none" w="med" len="med"/>
-                      <a:tailEnd type="none" w="med" len="med"/>
-                    </a:lnB>
-                    <a:solidFill>
-                      <a:srgbClr val="D9E1F2"/>
-                    </a:solidFill>
-                  </a:tcPr>
-                </a:tc>
-                <a:tc>
-                  <a:txBody>
-                    <a:bodyPr/>
-                    <a:lstStyle/>
-                    <a:p>
-                      <a:pPr algn="l" fontAlgn="b"/>
-                      <a:endParaRPr lang="de-DE" sz="1100" b="0" i="0" u="none" strike="noStrike">
-                        <a:solidFill>
-                          <a:srgbClr val="000000"/>
-                        </a:solidFill>
-                        <a:effectLst/>
-                        <a:latin typeface="Calibri" panose="020F0502020204030204" pitchFamily="34" charset="0"/>
-                      </a:endParaRPr>
-                    </a:p>
-                  </a:txBody>
-                  <a:tcPr marL="9525" marR="9525" marT="9525" marB="0" anchor="b">
-                    <a:lnL>
-                      <a:noFill/>
-                    </a:lnL>
-                    <a:lnR w="6350" cap="flat" cmpd="sng" algn="ctr">
-                      <a:solidFill>
-                        <a:srgbClr val="8EA9DB"/>
-                      </a:solidFill>
-                      <a:prstDash val="solid"/>
-                      <a:round/>
-                      <a:headEnd type="none" w="med" len="med"/>
-                      <a:tailEnd type="none" w="med" len="med"/>
-                    </a:lnR>
-                    <a:lnT w="6350" cap="flat" cmpd="sng" algn="ctr">
-                      <a:solidFill>
-                        <a:srgbClr val="8EA9DB"/>
-                      </a:solidFill>
-                      <a:prstDash val="solid"/>
-                      <a:round/>
-                      <a:headEnd type="none" w="med" len="med"/>
-                      <a:tailEnd type="none" w="med" len="med"/>
-                    </a:lnT>
-                    <a:lnB w="6350" cap="flat" cmpd="sng" algn="ctr">
-                      <a:solidFill>
-                        <a:srgbClr val="8EA9DB"/>
-                      </a:solidFill>
-                      <a:prstDash val="solid"/>
-                      <a:round/>
-                      <a:headEnd type="none" w="med" len="med"/>
-                      <a:tailEnd type="none" w="med" len="med"/>
-                    </a:lnB>
-                    <a:solidFill>
-                      <a:srgbClr val="D9E1F2"/>
-                    </a:solidFill>
-                  </a:tcPr>
-                </a:tc>
-                <a:extLst>
-                  <a:ext uri="{0D108BD9-81ED-4DB2-BD59-A6C34878D82A}">
-                    <a16:rowId xmlns:a16="http://schemas.microsoft.com/office/drawing/2014/main" val="1236543414"/>
-                  </a:ext>
-                </a:extLst>
-              </a:tr>
-              <a:tr h="264796">
-                <a:tc>
-                  <a:txBody>
-                    <a:bodyPr/>
-                    <a:lstStyle/>
-                    <a:p>
-                      <a:pPr algn="r" fontAlgn="b"/>
-                      <a:r>
-                        <a:rPr lang="de-DE" sz="1100" b="0" i="0" u="none" strike="noStrike">
-                          <a:solidFill>
-                            <a:srgbClr val="000000"/>
-                          </a:solidFill>
-                          <a:effectLst/>
-                          <a:latin typeface="Calibri" panose="020F0502020204030204" pitchFamily="34" charset="0"/>
-                        </a:rPr>
-                        <a:t>4</a:t>
-                      </a:r>
-                    </a:p>
-                  </a:txBody>
-                  <a:tcPr marL="9525" marR="9525" marT="9525" marB="0" anchor="b">
-                    <a:lnL w="6350" cap="flat" cmpd="sng" algn="ctr">
-                      <a:solidFill>
-                        <a:srgbClr val="8EA9DB"/>
-                      </a:solidFill>
-                      <a:prstDash val="solid"/>
-                      <a:round/>
-                      <a:headEnd type="none" w="med" len="med"/>
-                      <a:tailEnd type="none" w="med" len="med"/>
-                    </a:lnL>
-                    <a:lnR>
-                      <a:noFill/>
-                    </a:lnR>
-                    <a:lnT w="6350" cap="flat" cmpd="sng" algn="ctr">
-                      <a:solidFill>
-                        <a:srgbClr val="8EA9DB"/>
-                      </a:solidFill>
-                      <a:prstDash val="solid"/>
-                      <a:round/>
-                      <a:headEnd type="none" w="med" len="med"/>
-                      <a:tailEnd type="none" w="med" len="med"/>
-                    </a:lnT>
-                    <a:lnB w="6350" cap="flat" cmpd="sng" algn="ctr">
-                      <a:solidFill>
-                        <a:srgbClr val="8EA9DB"/>
-                      </a:solidFill>
-                      <a:prstDash val="solid"/>
-                      <a:round/>
-                      <a:headEnd type="none" w="med" len="med"/>
-                      <a:tailEnd type="none" w="med" len="med"/>
-                    </a:lnB>
-                  </a:tcPr>
-                </a:tc>
-                <a:tc>
-                  <a:txBody>
-                    <a:bodyPr/>
-                    <a:lstStyle/>
-                    <a:p>
-                      <a:pPr algn="l" fontAlgn="b"/>
-                      <a:r>
-                        <a:rPr lang="de-DE" sz="1100" b="0" i="0" u="none" strike="noStrike">
-                          <a:solidFill>
-                            <a:srgbClr val="000000"/>
-                          </a:solidFill>
-                          <a:effectLst/>
-                          <a:latin typeface="Calibri" panose="020F0502020204030204" pitchFamily="34" charset="0"/>
-                        </a:rPr>
-                        <a:t>Komponenten anlegen (Rahmen  keine Details)</a:t>
-                      </a:r>
-                    </a:p>
-                  </a:txBody>
-                  <a:tcPr marL="9525" marR="9525" marT="9525" marB="0" anchor="b">
-                    <a:lnL>
-                      <a:noFill/>
-                    </a:lnL>
-                    <a:lnR>
-                      <a:noFill/>
-                    </a:lnR>
-                    <a:lnT w="6350" cap="flat" cmpd="sng" algn="ctr">
-                      <a:solidFill>
-                        <a:srgbClr val="8EA9DB"/>
-                      </a:solidFill>
-                      <a:prstDash val="solid"/>
-                      <a:round/>
-                      <a:headEnd type="none" w="med" len="med"/>
-                      <a:tailEnd type="none" w="med" len="med"/>
-                    </a:lnT>
-                    <a:lnB w="6350" cap="flat" cmpd="sng" algn="ctr">
-                      <a:solidFill>
-                        <a:srgbClr val="8EA9DB"/>
-                      </a:solidFill>
-                      <a:prstDash val="solid"/>
-                      <a:round/>
-                      <a:headEnd type="none" w="med" len="med"/>
-                      <a:tailEnd type="none" w="med" len="med"/>
-                    </a:lnB>
-                  </a:tcPr>
-                </a:tc>
-                <a:tc>
-                  <a:txBody>
-                    <a:bodyPr/>
-                    <a:lstStyle/>
-                    <a:p>
-                      <a:pPr algn="l" fontAlgn="b"/>
-                      <a:r>
-                        <a:rPr lang="de-DE" sz="1100" b="0" i="0" u="none" strike="noStrike">
-                          <a:solidFill>
-                            <a:srgbClr val="000000"/>
-                          </a:solidFill>
-                          <a:effectLst/>
-                          <a:latin typeface="Calibri" panose="020F0502020204030204" pitchFamily="34" charset="0"/>
-                        </a:rPr>
-                        <a:t>3</a:t>
-                      </a:r>
-                    </a:p>
-                  </a:txBody>
-                  <a:tcPr marL="9525" marR="9525" marT="9525" marB="0" anchor="b">
-                    <a:lnL>
-                      <a:noFill/>
-                    </a:lnL>
-                    <a:lnR>
-                      <a:noFill/>
-                    </a:lnR>
-                    <a:lnT w="6350" cap="flat" cmpd="sng" algn="ctr">
-                      <a:solidFill>
-                        <a:srgbClr val="8EA9DB"/>
-                      </a:solidFill>
-                      <a:prstDash val="solid"/>
-                      <a:round/>
-                      <a:headEnd type="none" w="med" len="med"/>
-                      <a:tailEnd type="none" w="med" len="med"/>
-                    </a:lnT>
-                    <a:lnB w="6350" cap="flat" cmpd="sng" algn="ctr">
-                      <a:solidFill>
-                        <a:srgbClr val="8EA9DB"/>
-                      </a:solidFill>
-                      <a:prstDash val="solid"/>
-                      <a:round/>
-                      <a:headEnd type="none" w="med" len="med"/>
-                      <a:tailEnd type="none" w="med" len="med"/>
-                    </a:lnB>
-                  </a:tcPr>
-                </a:tc>
-                <a:tc>
-                  <a:txBody>
-                    <a:bodyPr/>
-                    <a:lstStyle/>
-                    <a:p>
-                      <a:pPr algn="l" fontAlgn="b"/>
-                      <a:r>
-                        <a:rPr lang="de-DE" sz="1100" b="0" i="0" u="none" strike="noStrike">
-                          <a:solidFill>
-                            <a:srgbClr val="000000"/>
-                          </a:solidFill>
-                          <a:effectLst/>
-                          <a:latin typeface="Calibri" panose="020F0502020204030204" pitchFamily="34" charset="0"/>
-                        </a:rPr>
-                        <a:t>5 6 8 9 10 11 13</a:t>
-                      </a:r>
-                    </a:p>
-                  </a:txBody>
-                  <a:tcPr marL="9525" marR="9525" marT="9525" marB="0" anchor="b">
-                    <a:lnL>
-                      <a:noFill/>
-                    </a:lnL>
-                    <a:lnR>
-                      <a:noFill/>
-                    </a:lnR>
-                    <a:lnT w="6350" cap="flat" cmpd="sng" algn="ctr">
-                      <a:solidFill>
-                        <a:srgbClr val="8EA9DB"/>
-                      </a:solidFill>
-                      <a:prstDash val="solid"/>
-                      <a:round/>
-                      <a:headEnd type="none" w="med" len="med"/>
-                      <a:tailEnd type="none" w="med" len="med"/>
-                    </a:lnT>
-                    <a:lnB w="6350" cap="flat" cmpd="sng" algn="ctr">
-                      <a:solidFill>
-                        <a:srgbClr val="8EA9DB"/>
-                      </a:solidFill>
-                      <a:prstDash val="solid"/>
-                      <a:round/>
-                      <a:headEnd type="none" w="med" len="med"/>
-                      <a:tailEnd type="none" w="med" len="med"/>
-                    </a:lnB>
-                  </a:tcPr>
-                </a:tc>
-                <a:tc>
-                  <a:txBody>
-                    <a:bodyPr/>
-                    <a:lstStyle/>
-                    <a:p>
-                      <a:pPr algn="l" fontAlgn="b"/>
-                      <a:endParaRPr lang="de-DE" sz="1100" b="0" i="0" u="none" strike="noStrike">
-                        <a:solidFill>
-                          <a:srgbClr val="000000"/>
-                        </a:solidFill>
-                        <a:effectLst/>
-                        <a:latin typeface="Calibri" panose="020F0502020204030204" pitchFamily="34" charset="0"/>
-                      </a:endParaRPr>
-                    </a:p>
-                  </a:txBody>
-                  <a:tcPr marL="9525" marR="9525" marT="9525" marB="0" anchor="b">
-                    <a:lnL>
-                      <a:noFill/>
-                    </a:lnL>
-                    <a:lnR w="6350" cap="flat" cmpd="sng" algn="ctr">
-                      <a:solidFill>
-                        <a:srgbClr val="8EA9DB"/>
-                      </a:solidFill>
-                      <a:prstDash val="solid"/>
-                      <a:round/>
-                      <a:headEnd type="none" w="med" len="med"/>
-                      <a:tailEnd type="none" w="med" len="med"/>
-                    </a:lnR>
-                    <a:lnT w="6350" cap="flat" cmpd="sng" algn="ctr">
-                      <a:solidFill>
-                        <a:srgbClr val="8EA9DB"/>
-                      </a:solidFill>
-                      <a:prstDash val="solid"/>
-                      <a:round/>
-                      <a:headEnd type="none" w="med" len="med"/>
-                      <a:tailEnd type="none" w="med" len="med"/>
-                    </a:lnT>
-                    <a:lnB w="6350" cap="flat" cmpd="sng" algn="ctr">
-                      <a:solidFill>
-                        <a:srgbClr val="8EA9DB"/>
-                      </a:solidFill>
-                      <a:prstDash val="solid"/>
-                      <a:round/>
-                      <a:headEnd type="none" w="med" len="med"/>
-                      <a:tailEnd type="none" w="med" len="med"/>
-                    </a:lnB>
-                  </a:tcPr>
-                </a:tc>
-                <a:extLst>
-                  <a:ext uri="{0D108BD9-81ED-4DB2-BD59-A6C34878D82A}">
-                    <a16:rowId xmlns:a16="http://schemas.microsoft.com/office/drawing/2014/main" val="3577215210"/>
-                  </a:ext>
-                </a:extLst>
-              </a:tr>
-              <a:tr h="264796">
-                <a:tc>
-                  <a:txBody>
-                    <a:bodyPr/>
-                    <a:lstStyle/>
-                    <a:p>
-                      <a:pPr algn="r" fontAlgn="b"/>
-                      <a:r>
-                        <a:rPr lang="de-DE" sz="1100" b="0" i="0" u="none" strike="noStrike">
-                          <a:solidFill>
-                            <a:srgbClr val="000000"/>
-                          </a:solidFill>
-                          <a:effectLst/>
-                          <a:latin typeface="Calibri" panose="020F0502020204030204" pitchFamily="34" charset="0"/>
-                        </a:rPr>
-                        <a:t>5</a:t>
-                      </a:r>
-                    </a:p>
-                  </a:txBody>
-                  <a:tcPr marL="9525" marR="9525" marT="9525" marB="0" anchor="b">
-                    <a:lnL w="6350" cap="flat" cmpd="sng" algn="ctr">
-                      <a:solidFill>
-                        <a:srgbClr val="8EA9DB"/>
-                      </a:solidFill>
-                      <a:prstDash val="solid"/>
-                      <a:round/>
-                      <a:headEnd type="none" w="med" len="med"/>
-                      <a:tailEnd type="none" w="med" len="med"/>
-                    </a:lnL>
-                    <a:lnR>
-                      <a:noFill/>
-                    </a:lnR>
-                    <a:lnT w="6350" cap="flat" cmpd="sng" algn="ctr">
-                      <a:solidFill>
-                        <a:srgbClr val="8EA9DB"/>
-                      </a:solidFill>
-                      <a:prstDash val="solid"/>
-                      <a:round/>
-                      <a:headEnd type="none" w="med" len="med"/>
-                      <a:tailEnd type="none" w="med" len="med"/>
-                    </a:lnT>
-                    <a:lnB w="6350" cap="flat" cmpd="sng" algn="ctr">
-                      <a:solidFill>
-                        <a:srgbClr val="8EA9DB"/>
-                      </a:solidFill>
-                      <a:prstDash val="solid"/>
-                      <a:round/>
-                      <a:headEnd type="none" w="med" len="med"/>
-                      <a:tailEnd type="none" w="med" len="med"/>
-                    </a:lnB>
-                    <a:solidFill>
-                      <a:srgbClr val="D9E1F2"/>
-                    </a:solidFill>
-                  </a:tcPr>
-                </a:tc>
-                <a:tc>
-                  <a:txBody>
-                    <a:bodyPr/>
-                    <a:lstStyle/>
-                    <a:p>
-                      <a:pPr algn="l" fontAlgn="b"/>
-                      <a:r>
-                        <a:rPr lang="de-DE" sz="1100" b="0" i="0" u="none" strike="noStrike">
-                          <a:solidFill>
-                            <a:srgbClr val="000000"/>
-                          </a:solidFill>
-                          <a:effectLst/>
-                          <a:latin typeface="Calibri" panose="020F0502020204030204" pitchFamily="34" charset="0"/>
-                        </a:rPr>
-                        <a:t>Navigation implementieren</a:t>
-                      </a:r>
-                    </a:p>
-                  </a:txBody>
-                  <a:tcPr marL="9525" marR="9525" marT="9525" marB="0" anchor="b">
-                    <a:lnL>
-                      <a:noFill/>
-                    </a:lnL>
-                    <a:lnR>
-                      <a:noFill/>
-                    </a:lnR>
-                    <a:lnT w="6350" cap="flat" cmpd="sng" algn="ctr">
-                      <a:solidFill>
-                        <a:srgbClr val="8EA9DB"/>
-                      </a:solidFill>
-                      <a:prstDash val="solid"/>
-                      <a:round/>
-                      <a:headEnd type="none" w="med" len="med"/>
-                      <a:tailEnd type="none" w="med" len="med"/>
-                    </a:lnT>
-                    <a:lnB w="6350" cap="flat" cmpd="sng" algn="ctr">
-                      <a:solidFill>
-                        <a:srgbClr val="8EA9DB"/>
-                      </a:solidFill>
-                      <a:prstDash val="solid"/>
-                      <a:round/>
-                      <a:headEnd type="none" w="med" len="med"/>
-                      <a:tailEnd type="none" w="med" len="med"/>
-                    </a:lnB>
-                    <a:solidFill>
-                      <a:srgbClr val="D9E1F2"/>
-                    </a:solidFill>
-                  </a:tcPr>
-                </a:tc>
-                <a:tc>
-                  <a:txBody>
-                    <a:bodyPr/>
-                    <a:lstStyle/>
-                    <a:p>
-                      <a:pPr algn="l" fontAlgn="b"/>
-                      <a:r>
-                        <a:rPr lang="de-DE" sz="1100" b="0" i="0" u="none" strike="noStrike">
-                          <a:solidFill>
-                            <a:srgbClr val="000000"/>
-                          </a:solidFill>
-                          <a:effectLst/>
-                          <a:latin typeface="Calibri" panose="020F0502020204030204" pitchFamily="34" charset="0"/>
-                        </a:rPr>
-                        <a:t>4</a:t>
-                      </a:r>
-                    </a:p>
-                  </a:txBody>
-                  <a:tcPr marL="9525" marR="9525" marT="9525" marB="0" anchor="b">
-                    <a:lnL>
-                      <a:noFill/>
-                    </a:lnL>
-                    <a:lnR>
-                      <a:noFill/>
-                    </a:lnR>
-                    <a:lnT w="6350" cap="flat" cmpd="sng" algn="ctr">
-                      <a:solidFill>
-                        <a:srgbClr val="8EA9DB"/>
-                      </a:solidFill>
-                      <a:prstDash val="solid"/>
-                      <a:round/>
-                      <a:headEnd type="none" w="med" len="med"/>
-                      <a:tailEnd type="none" w="med" len="med"/>
-                    </a:lnT>
-                    <a:lnB w="6350" cap="flat" cmpd="sng" algn="ctr">
-                      <a:solidFill>
-                        <a:srgbClr val="8EA9DB"/>
-                      </a:solidFill>
-                      <a:prstDash val="solid"/>
-                      <a:round/>
-                      <a:headEnd type="none" w="med" len="med"/>
-                      <a:tailEnd type="none" w="med" len="med"/>
-                    </a:lnB>
-                    <a:solidFill>
-                      <a:srgbClr val="D9E1F2"/>
-                    </a:solidFill>
-                  </a:tcPr>
-                </a:tc>
-                <a:tc>
-                  <a:txBody>
-                    <a:bodyPr/>
-                    <a:lstStyle/>
-                    <a:p>
-                      <a:pPr algn="l" fontAlgn="b"/>
-                      <a:endParaRPr lang="de-DE" sz="1100" b="0" i="0" u="none" strike="noStrike">
-                        <a:solidFill>
-                          <a:srgbClr val="000000"/>
-                        </a:solidFill>
-                        <a:effectLst/>
-                        <a:latin typeface="Calibri" panose="020F0502020204030204" pitchFamily="34" charset="0"/>
-                      </a:endParaRPr>
-                    </a:p>
-                  </a:txBody>
-                  <a:tcPr marL="9525" marR="9525" marT="9525" marB="0" anchor="b">
-                    <a:lnL>
-                      <a:noFill/>
-                    </a:lnL>
-                    <a:lnR>
-                      <a:noFill/>
-                    </a:lnR>
-                    <a:lnT w="6350" cap="flat" cmpd="sng" algn="ctr">
-                      <a:solidFill>
-                        <a:srgbClr val="8EA9DB"/>
-                      </a:solidFill>
-                      <a:prstDash val="solid"/>
-                      <a:round/>
-                      <a:headEnd type="none" w="med" len="med"/>
-                      <a:tailEnd type="none" w="med" len="med"/>
-                    </a:lnT>
-                    <a:lnB w="6350" cap="flat" cmpd="sng" algn="ctr">
-                      <a:solidFill>
-                        <a:srgbClr val="8EA9DB"/>
-                      </a:solidFill>
-                      <a:prstDash val="solid"/>
-                      <a:round/>
-                      <a:headEnd type="none" w="med" len="med"/>
-                      <a:tailEnd type="none" w="med" len="med"/>
-                    </a:lnB>
-                    <a:solidFill>
-                      <a:srgbClr val="D9E1F2"/>
-                    </a:solidFill>
-                  </a:tcPr>
-                </a:tc>
-                <a:tc>
-                  <a:txBody>
-                    <a:bodyPr/>
-                    <a:lstStyle/>
-                    <a:p>
-                      <a:pPr algn="l" fontAlgn="b"/>
-                      <a:endParaRPr lang="de-DE" sz="1100" b="0" i="0" u="none" strike="noStrike">
-                        <a:solidFill>
-                          <a:srgbClr val="000000"/>
-                        </a:solidFill>
-                        <a:effectLst/>
-                        <a:latin typeface="Calibri" panose="020F0502020204030204" pitchFamily="34" charset="0"/>
-                      </a:endParaRPr>
-                    </a:p>
-                  </a:txBody>
-                  <a:tcPr marL="9525" marR="9525" marT="9525" marB="0" anchor="b">
-                    <a:lnL>
-                      <a:noFill/>
-                    </a:lnL>
-                    <a:lnR w="6350" cap="flat" cmpd="sng" algn="ctr">
-                      <a:solidFill>
-                        <a:srgbClr val="8EA9DB"/>
-                      </a:solidFill>
-                      <a:prstDash val="solid"/>
-                      <a:round/>
-                      <a:headEnd type="none" w="med" len="med"/>
-                      <a:tailEnd type="none" w="med" len="med"/>
-                    </a:lnR>
-                    <a:lnT w="6350" cap="flat" cmpd="sng" algn="ctr">
-                      <a:solidFill>
-                        <a:srgbClr val="8EA9DB"/>
-                      </a:solidFill>
-                      <a:prstDash val="solid"/>
-                      <a:round/>
-                      <a:headEnd type="none" w="med" len="med"/>
-                      <a:tailEnd type="none" w="med" len="med"/>
-                    </a:lnT>
-                    <a:lnB w="6350" cap="flat" cmpd="sng" algn="ctr">
-                      <a:solidFill>
-                        <a:srgbClr val="8EA9DB"/>
-                      </a:solidFill>
-                      <a:prstDash val="solid"/>
-                      <a:round/>
-                      <a:headEnd type="none" w="med" len="med"/>
-                      <a:tailEnd type="none" w="med" len="med"/>
-                    </a:lnB>
-                    <a:solidFill>
-                      <a:srgbClr val="D9E1F2"/>
-                    </a:solidFill>
-                  </a:tcPr>
-                </a:tc>
-                <a:extLst>
-                  <a:ext uri="{0D108BD9-81ED-4DB2-BD59-A6C34878D82A}">
-                    <a16:rowId xmlns:a16="http://schemas.microsoft.com/office/drawing/2014/main" val="3486996500"/>
-                  </a:ext>
-                </a:extLst>
-              </a:tr>
-              <a:tr h="264796">
-                <a:tc>
-                  <a:txBody>
-                    <a:bodyPr/>
-                    <a:lstStyle/>
-                    <a:p>
-                      <a:pPr algn="r" fontAlgn="b"/>
-                      <a:r>
-                        <a:rPr lang="de-DE" sz="1100" b="0" i="0" u="none" strike="noStrike">
-                          <a:solidFill>
-                            <a:srgbClr val="000000"/>
-                          </a:solidFill>
-                          <a:effectLst/>
-                          <a:latin typeface="Calibri" panose="020F0502020204030204" pitchFamily="34" charset="0"/>
-                        </a:rPr>
-                        <a:t>6</a:t>
-                      </a:r>
-                    </a:p>
-                  </a:txBody>
-                  <a:tcPr marL="9525" marR="9525" marT="9525" marB="0" anchor="b">
-                    <a:lnL w="6350" cap="flat" cmpd="sng" algn="ctr">
-                      <a:solidFill>
-                        <a:srgbClr val="8EA9DB"/>
-                      </a:solidFill>
-                      <a:prstDash val="solid"/>
-                      <a:round/>
-                      <a:headEnd type="none" w="med" len="med"/>
-                      <a:tailEnd type="none" w="med" len="med"/>
-                    </a:lnL>
-                    <a:lnR>
-                      <a:noFill/>
-                    </a:lnR>
-                    <a:lnT w="6350" cap="flat" cmpd="sng" algn="ctr">
-                      <a:solidFill>
-                        <a:srgbClr val="8EA9DB"/>
-                      </a:solidFill>
-                      <a:prstDash val="solid"/>
-                      <a:round/>
-                      <a:headEnd type="none" w="med" len="med"/>
-                      <a:tailEnd type="none" w="med" len="med"/>
-                    </a:lnT>
-                    <a:lnB w="6350" cap="flat" cmpd="sng" algn="ctr">
-                      <a:solidFill>
-                        <a:srgbClr val="8EA9DB"/>
-                      </a:solidFill>
-                      <a:prstDash val="solid"/>
-                      <a:round/>
-                      <a:headEnd type="none" w="med" len="med"/>
-                      <a:tailEnd type="none" w="med" len="med"/>
-                    </a:lnB>
-                  </a:tcPr>
-                </a:tc>
-                <a:tc>
-                  <a:txBody>
-                    <a:bodyPr/>
-                    <a:lstStyle/>
-                    <a:p>
-                      <a:pPr algn="l" fontAlgn="b"/>
-                      <a:r>
-                        <a:rPr lang="de-DE" sz="1100" b="0" i="0" u="none" strike="noStrike">
-                          <a:solidFill>
-                            <a:srgbClr val="000000"/>
-                          </a:solidFill>
-                          <a:effectLst/>
-                          <a:latin typeface="Calibri" panose="020F0502020204030204" pitchFamily="34" charset="0"/>
-                        </a:rPr>
-                        <a:t>Lunchliste implementieren (ohne draufdrücken)</a:t>
-                      </a:r>
-                    </a:p>
-                  </a:txBody>
-                  <a:tcPr marL="9525" marR="9525" marT="9525" marB="0" anchor="b">
-                    <a:lnL>
-                      <a:noFill/>
-                    </a:lnL>
-                    <a:lnR>
-                      <a:noFill/>
-                    </a:lnR>
-                    <a:lnT w="6350" cap="flat" cmpd="sng" algn="ctr">
-                      <a:solidFill>
-                        <a:srgbClr val="8EA9DB"/>
-                      </a:solidFill>
-                      <a:prstDash val="solid"/>
-                      <a:round/>
-                      <a:headEnd type="none" w="med" len="med"/>
-                      <a:tailEnd type="none" w="med" len="med"/>
-                    </a:lnT>
-                    <a:lnB w="6350" cap="flat" cmpd="sng" algn="ctr">
-                      <a:solidFill>
-                        <a:srgbClr val="8EA9DB"/>
-                      </a:solidFill>
-                      <a:prstDash val="solid"/>
-                      <a:round/>
-                      <a:headEnd type="none" w="med" len="med"/>
-                      <a:tailEnd type="none" w="med" len="med"/>
-                    </a:lnB>
-                  </a:tcPr>
-                </a:tc>
-                <a:tc>
-                  <a:txBody>
-                    <a:bodyPr/>
-                    <a:lstStyle/>
-                    <a:p>
-                      <a:pPr algn="l" fontAlgn="b"/>
-                      <a:r>
-                        <a:rPr lang="de-DE" sz="1100" b="0" i="0" u="none" strike="noStrike">
-                          <a:solidFill>
-                            <a:srgbClr val="000000"/>
-                          </a:solidFill>
-                          <a:effectLst/>
-                          <a:latin typeface="Calibri" panose="020F0502020204030204" pitchFamily="34" charset="0"/>
-                        </a:rPr>
-                        <a:t>2 4</a:t>
-                      </a:r>
-                    </a:p>
-                  </a:txBody>
-                  <a:tcPr marL="9525" marR="9525" marT="9525" marB="0" anchor="b">
-                    <a:lnL>
-                      <a:noFill/>
-                    </a:lnL>
-                    <a:lnR>
-                      <a:noFill/>
-                    </a:lnR>
-                    <a:lnT w="6350" cap="flat" cmpd="sng" algn="ctr">
-                      <a:solidFill>
-                        <a:srgbClr val="8EA9DB"/>
-                      </a:solidFill>
-                      <a:prstDash val="solid"/>
-                      <a:round/>
-                      <a:headEnd type="none" w="med" len="med"/>
-                      <a:tailEnd type="none" w="med" len="med"/>
-                    </a:lnT>
-                    <a:lnB w="6350" cap="flat" cmpd="sng" algn="ctr">
-                      <a:solidFill>
-                        <a:srgbClr val="8EA9DB"/>
-                      </a:solidFill>
-                      <a:prstDash val="solid"/>
-                      <a:round/>
-                      <a:headEnd type="none" w="med" len="med"/>
-                      <a:tailEnd type="none" w="med" len="med"/>
-                    </a:lnB>
-                  </a:tcPr>
-                </a:tc>
-                <a:tc>
-                  <a:txBody>
-                    <a:bodyPr/>
-                    <a:lstStyle/>
-                    <a:p>
-                      <a:pPr algn="l" fontAlgn="b"/>
-                      <a:r>
-                        <a:rPr lang="de-DE" sz="1100" b="0" i="0" u="none" strike="noStrike">
-                          <a:solidFill>
-                            <a:srgbClr val="000000"/>
-                          </a:solidFill>
-                          <a:effectLst/>
-                          <a:latin typeface="Calibri" panose="020F0502020204030204" pitchFamily="34" charset="0"/>
-                        </a:rPr>
-                        <a:t>7 12</a:t>
-                      </a:r>
-                    </a:p>
-                  </a:txBody>
-                  <a:tcPr marL="9525" marR="9525" marT="9525" marB="0" anchor="b">
-                    <a:lnL>
-                      <a:noFill/>
-                    </a:lnL>
-                    <a:lnR>
-                      <a:noFill/>
-                    </a:lnR>
-                    <a:lnT w="6350" cap="flat" cmpd="sng" algn="ctr">
-                      <a:solidFill>
-                        <a:srgbClr val="8EA9DB"/>
-                      </a:solidFill>
-                      <a:prstDash val="solid"/>
-                      <a:round/>
-                      <a:headEnd type="none" w="med" len="med"/>
-                      <a:tailEnd type="none" w="med" len="med"/>
-                    </a:lnT>
-                    <a:lnB w="6350" cap="flat" cmpd="sng" algn="ctr">
-                      <a:solidFill>
-                        <a:srgbClr val="8EA9DB"/>
-                      </a:solidFill>
-                      <a:prstDash val="solid"/>
-                      <a:round/>
-                      <a:headEnd type="none" w="med" len="med"/>
-                      <a:tailEnd type="none" w="med" len="med"/>
-                    </a:lnB>
-                  </a:tcPr>
-                </a:tc>
-                <a:tc>
-                  <a:txBody>
-                    <a:bodyPr/>
-                    <a:lstStyle/>
-                    <a:p>
-                      <a:pPr algn="l" fontAlgn="b"/>
-                      <a:endParaRPr lang="de-DE" sz="1100" b="0" i="0" u="none" strike="noStrike">
-                        <a:solidFill>
-                          <a:srgbClr val="000000"/>
-                        </a:solidFill>
-                        <a:effectLst/>
-                        <a:latin typeface="Calibri" panose="020F0502020204030204" pitchFamily="34" charset="0"/>
-                      </a:endParaRPr>
-                    </a:p>
-                  </a:txBody>
-                  <a:tcPr marL="9525" marR="9525" marT="9525" marB="0" anchor="b">
-                    <a:lnL>
-                      <a:noFill/>
-                    </a:lnL>
-                    <a:lnR w="6350" cap="flat" cmpd="sng" algn="ctr">
-                      <a:solidFill>
-                        <a:srgbClr val="8EA9DB"/>
-                      </a:solidFill>
-                      <a:prstDash val="solid"/>
-                      <a:round/>
-                      <a:headEnd type="none" w="med" len="med"/>
-                      <a:tailEnd type="none" w="med" len="med"/>
-                    </a:lnR>
-                    <a:lnT w="6350" cap="flat" cmpd="sng" algn="ctr">
-                      <a:solidFill>
-                        <a:srgbClr val="8EA9DB"/>
-                      </a:solidFill>
-                      <a:prstDash val="solid"/>
-                      <a:round/>
-                      <a:headEnd type="none" w="med" len="med"/>
-                      <a:tailEnd type="none" w="med" len="med"/>
-                    </a:lnT>
-                    <a:lnB w="6350" cap="flat" cmpd="sng" algn="ctr">
-                      <a:solidFill>
-                        <a:srgbClr val="8EA9DB"/>
-                      </a:solidFill>
-                      <a:prstDash val="solid"/>
-                      <a:round/>
-                      <a:headEnd type="none" w="med" len="med"/>
-                      <a:tailEnd type="none" w="med" len="med"/>
-                    </a:lnB>
-                  </a:tcPr>
-                </a:tc>
-                <a:extLst>
-                  <a:ext uri="{0D108BD9-81ED-4DB2-BD59-A6C34878D82A}">
-                    <a16:rowId xmlns:a16="http://schemas.microsoft.com/office/drawing/2014/main" val="4091407876"/>
-                  </a:ext>
-                </a:extLst>
-              </a:tr>
-              <a:tr h="264796">
-                <a:tc>
-                  <a:txBody>
-                    <a:bodyPr/>
-                    <a:lstStyle/>
-                    <a:p>
-                      <a:pPr algn="r" fontAlgn="b"/>
-                      <a:r>
-                        <a:rPr lang="de-DE" sz="1100" b="0" i="0" u="none" strike="noStrike">
-                          <a:solidFill>
-                            <a:srgbClr val="000000"/>
-                          </a:solidFill>
-                          <a:effectLst/>
-                          <a:latin typeface="Calibri" panose="020F0502020204030204" pitchFamily="34" charset="0"/>
-                        </a:rPr>
-                        <a:t>7</a:t>
-                      </a:r>
-                    </a:p>
-                  </a:txBody>
-                  <a:tcPr marL="9525" marR="9525" marT="9525" marB="0" anchor="b">
-                    <a:lnL w="6350" cap="flat" cmpd="sng" algn="ctr">
-                      <a:solidFill>
-                        <a:srgbClr val="8EA9DB"/>
-                      </a:solidFill>
-                      <a:prstDash val="solid"/>
-                      <a:round/>
-                      <a:headEnd type="none" w="med" len="med"/>
-                      <a:tailEnd type="none" w="med" len="med"/>
-                    </a:lnL>
-                    <a:lnR>
-                      <a:noFill/>
-                    </a:lnR>
-                    <a:lnT w="6350" cap="flat" cmpd="sng" algn="ctr">
-                      <a:solidFill>
-                        <a:srgbClr val="8EA9DB"/>
-                      </a:solidFill>
-                      <a:prstDash val="solid"/>
-                      <a:round/>
-                      <a:headEnd type="none" w="med" len="med"/>
-                      <a:tailEnd type="none" w="med" len="med"/>
-                    </a:lnT>
-                    <a:lnB w="6350" cap="flat" cmpd="sng" algn="ctr">
-                      <a:solidFill>
-                        <a:srgbClr val="8EA9DB"/>
-                      </a:solidFill>
-                      <a:prstDash val="solid"/>
-                      <a:round/>
-                      <a:headEnd type="none" w="med" len="med"/>
-                      <a:tailEnd type="none" w="med" len="med"/>
-                    </a:lnB>
-                    <a:solidFill>
-                      <a:srgbClr val="D9E1F2"/>
-                    </a:solidFill>
-                  </a:tcPr>
-                </a:tc>
-                <a:tc>
-                  <a:txBody>
-                    <a:bodyPr/>
-                    <a:lstStyle/>
-                    <a:p>
-                      <a:pPr algn="l" fontAlgn="b"/>
-                      <a:r>
-                        <a:rPr lang="de-DE" sz="1100" b="0" i="0" u="none" strike="noStrike">
-                          <a:solidFill>
-                            <a:srgbClr val="000000"/>
-                          </a:solidFill>
-                          <a:effectLst/>
-                          <a:latin typeface="Calibri" panose="020F0502020204030204" pitchFamily="34" charset="0"/>
-                        </a:rPr>
-                        <a:t>Lunchdetails implementieren</a:t>
-                      </a:r>
-                    </a:p>
-                  </a:txBody>
-                  <a:tcPr marL="9525" marR="9525" marT="9525" marB="0" anchor="b">
-                    <a:lnL>
-                      <a:noFill/>
-                    </a:lnL>
-                    <a:lnR>
-                      <a:noFill/>
-                    </a:lnR>
-                    <a:lnT w="6350" cap="flat" cmpd="sng" algn="ctr">
-                      <a:solidFill>
-                        <a:srgbClr val="8EA9DB"/>
-                      </a:solidFill>
-                      <a:prstDash val="solid"/>
-                      <a:round/>
-                      <a:headEnd type="none" w="med" len="med"/>
-                      <a:tailEnd type="none" w="med" len="med"/>
-                    </a:lnT>
-                    <a:lnB w="6350" cap="flat" cmpd="sng" algn="ctr">
-                      <a:solidFill>
-                        <a:srgbClr val="8EA9DB"/>
-                      </a:solidFill>
-                      <a:prstDash val="solid"/>
-                      <a:round/>
-                      <a:headEnd type="none" w="med" len="med"/>
-                      <a:tailEnd type="none" w="med" len="med"/>
-                    </a:lnB>
-                    <a:solidFill>
-                      <a:srgbClr val="D9E1F2"/>
-                    </a:solidFill>
-                  </a:tcPr>
-                </a:tc>
-                <a:tc>
-                  <a:txBody>
-                    <a:bodyPr/>
-                    <a:lstStyle/>
-                    <a:p>
-                      <a:pPr algn="l" fontAlgn="b"/>
-                      <a:r>
-                        <a:rPr lang="de-DE" sz="1100" b="0" i="0" u="none" strike="noStrike">
-                          <a:solidFill>
-                            <a:srgbClr val="000000"/>
-                          </a:solidFill>
-                          <a:effectLst/>
-                          <a:latin typeface="Calibri" panose="020F0502020204030204" pitchFamily="34" charset="0"/>
-                        </a:rPr>
-                        <a:t>6</a:t>
-                      </a:r>
-                    </a:p>
-                  </a:txBody>
-                  <a:tcPr marL="9525" marR="9525" marT="9525" marB="0" anchor="b">
-                    <a:lnL>
-                      <a:noFill/>
-                    </a:lnL>
-                    <a:lnR>
-                      <a:noFill/>
-                    </a:lnR>
-                    <a:lnT w="6350" cap="flat" cmpd="sng" algn="ctr">
-                      <a:solidFill>
-                        <a:srgbClr val="8EA9DB"/>
-                      </a:solidFill>
-                      <a:prstDash val="solid"/>
-                      <a:round/>
-                      <a:headEnd type="none" w="med" len="med"/>
-                      <a:tailEnd type="none" w="med" len="med"/>
-                    </a:lnT>
-                    <a:lnB w="6350" cap="flat" cmpd="sng" algn="ctr">
-                      <a:solidFill>
-                        <a:srgbClr val="8EA9DB"/>
-                      </a:solidFill>
-                      <a:prstDash val="solid"/>
-                      <a:round/>
-                      <a:headEnd type="none" w="med" len="med"/>
-                      <a:tailEnd type="none" w="med" len="med"/>
-                    </a:lnB>
-                    <a:solidFill>
-                      <a:srgbClr val="D9E1F2"/>
-                    </a:solidFill>
-                  </a:tcPr>
-                </a:tc>
-                <a:tc>
-                  <a:txBody>
-                    <a:bodyPr/>
-                    <a:lstStyle/>
-                    <a:p>
-                      <a:pPr algn="l" fontAlgn="b"/>
-                      <a:r>
-                        <a:rPr lang="de-DE" sz="1100" b="0" i="0" u="none" strike="noStrike">
-                          <a:solidFill>
-                            <a:srgbClr val="000000"/>
-                          </a:solidFill>
-                          <a:effectLst/>
-                          <a:latin typeface="Calibri" panose="020F0502020204030204" pitchFamily="34" charset="0"/>
-                        </a:rPr>
-                        <a:t>14</a:t>
-                      </a:r>
-                    </a:p>
-                  </a:txBody>
-                  <a:tcPr marL="9525" marR="9525" marT="9525" marB="0" anchor="b">
-                    <a:lnL>
-                      <a:noFill/>
-                    </a:lnL>
-                    <a:lnR>
-                      <a:noFill/>
-                    </a:lnR>
-                    <a:lnT w="6350" cap="flat" cmpd="sng" algn="ctr">
-                      <a:solidFill>
-                        <a:srgbClr val="8EA9DB"/>
-                      </a:solidFill>
-                      <a:prstDash val="solid"/>
-                      <a:round/>
-                      <a:headEnd type="none" w="med" len="med"/>
-                      <a:tailEnd type="none" w="med" len="med"/>
-                    </a:lnT>
-                    <a:lnB w="6350" cap="flat" cmpd="sng" algn="ctr">
-                      <a:solidFill>
-                        <a:srgbClr val="8EA9DB"/>
-                      </a:solidFill>
-                      <a:prstDash val="solid"/>
-                      <a:round/>
-                      <a:headEnd type="none" w="med" len="med"/>
-                      <a:tailEnd type="none" w="med" len="med"/>
-                    </a:lnB>
-                    <a:solidFill>
-                      <a:srgbClr val="D9E1F2"/>
-                    </a:solidFill>
-                  </a:tcPr>
-                </a:tc>
-                <a:tc>
-                  <a:txBody>
-                    <a:bodyPr/>
-                    <a:lstStyle/>
-                    <a:p>
-                      <a:pPr algn="l" fontAlgn="b"/>
-                      <a:endParaRPr lang="de-DE" sz="1100" b="0" i="0" u="none" strike="noStrike">
-                        <a:solidFill>
-                          <a:srgbClr val="000000"/>
-                        </a:solidFill>
-                        <a:effectLst/>
-                        <a:latin typeface="Calibri" panose="020F0502020204030204" pitchFamily="34" charset="0"/>
-                      </a:endParaRPr>
-                    </a:p>
-                  </a:txBody>
-                  <a:tcPr marL="9525" marR="9525" marT="9525" marB="0" anchor="b">
-                    <a:lnL>
-                      <a:noFill/>
-                    </a:lnL>
-                    <a:lnR w="6350" cap="flat" cmpd="sng" algn="ctr">
-                      <a:solidFill>
-                        <a:srgbClr val="8EA9DB"/>
-                      </a:solidFill>
-                      <a:prstDash val="solid"/>
-                      <a:round/>
-                      <a:headEnd type="none" w="med" len="med"/>
-                      <a:tailEnd type="none" w="med" len="med"/>
-                    </a:lnR>
-                    <a:lnT w="6350" cap="flat" cmpd="sng" algn="ctr">
-                      <a:solidFill>
-                        <a:srgbClr val="8EA9DB"/>
-                      </a:solidFill>
-                      <a:prstDash val="solid"/>
-                      <a:round/>
-                      <a:headEnd type="none" w="med" len="med"/>
-                      <a:tailEnd type="none" w="med" len="med"/>
-                    </a:lnT>
-                    <a:lnB w="6350" cap="flat" cmpd="sng" algn="ctr">
-                      <a:solidFill>
-                        <a:srgbClr val="8EA9DB"/>
-                      </a:solidFill>
-                      <a:prstDash val="solid"/>
-                      <a:round/>
-                      <a:headEnd type="none" w="med" len="med"/>
-                      <a:tailEnd type="none" w="med" len="med"/>
-                    </a:lnB>
-                    <a:solidFill>
-                      <a:srgbClr val="D9E1F2"/>
-                    </a:solidFill>
-                  </a:tcPr>
-                </a:tc>
-                <a:extLst>
-                  <a:ext uri="{0D108BD9-81ED-4DB2-BD59-A6C34878D82A}">
-                    <a16:rowId xmlns:a16="http://schemas.microsoft.com/office/drawing/2014/main" val="1615540197"/>
-                  </a:ext>
-                </a:extLst>
-              </a:tr>
-              <a:tr h="264796">
-                <a:tc>
-                  <a:txBody>
-                    <a:bodyPr/>
-                    <a:lstStyle/>
-                    <a:p>
-                      <a:pPr algn="r" fontAlgn="b"/>
-                      <a:r>
-                        <a:rPr lang="de-DE" sz="1100" b="0" i="0" u="none" strike="noStrike">
-                          <a:solidFill>
-                            <a:srgbClr val="000000"/>
-                          </a:solidFill>
-                          <a:effectLst/>
-                          <a:latin typeface="Calibri" panose="020F0502020204030204" pitchFamily="34" charset="0"/>
-                        </a:rPr>
-                        <a:t>8</a:t>
-                      </a:r>
-                    </a:p>
-                  </a:txBody>
-                  <a:tcPr marL="9525" marR="9525" marT="9525" marB="0" anchor="b">
-                    <a:lnL w="6350" cap="flat" cmpd="sng" algn="ctr">
-                      <a:solidFill>
-                        <a:srgbClr val="8EA9DB"/>
-                      </a:solidFill>
-                      <a:prstDash val="solid"/>
-                      <a:round/>
-                      <a:headEnd type="none" w="med" len="med"/>
-                      <a:tailEnd type="none" w="med" len="med"/>
-                    </a:lnL>
-                    <a:lnR>
-                      <a:noFill/>
-                    </a:lnR>
-                    <a:lnT w="6350" cap="flat" cmpd="sng" algn="ctr">
-                      <a:solidFill>
-                        <a:srgbClr val="8EA9DB"/>
-                      </a:solidFill>
-                      <a:prstDash val="solid"/>
-                      <a:round/>
-                      <a:headEnd type="none" w="med" len="med"/>
-                      <a:tailEnd type="none" w="med" len="med"/>
-                    </a:lnT>
-                    <a:lnB w="6350" cap="flat" cmpd="sng" algn="ctr">
-                      <a:solidFill>
-                        <a:srgbClr val="8EA9DB"/>
-                      </a:solidFill>
-                      <a:prstDash val="solid"/>
-                      <a:round/>
-                      <a:headEnd type="none" w="med" len="med"/>
-                      <a:tailEnd type="none" w="med" len="med"/>
-                    </a:lnB>
-                  </a:tcPr>
-                </a:tc>
-                <a:tc>
-                  <a:txBody>
-                    <a:bodyPr/>
-                    <a:lstStyle/>
-                    <a:p>
-                      <a:pPr algn="l" fontAlgn="b"/>
-                      <a:r>
-                        <a:rPr lang="de-DE" sz="1100" b="0" i="0" u="none" strike="noStrike">
-                          <a:solidFill>
-                            <a:srgbClr val="000000"/>
-                          </a:solidFill>
-                          <a:effectLst/>
-                          <a:latin typeface="Calibri" panose="020F0502020204030204" pitchFamily="34" charset="0"/>
-                        </a:rPr>
-                        <a:t>Teile Banner</a:t>
-                      </a:r>
-                    </a:p>
-                  </a:txBody>
-                  <a:tcPr marL="9525" marR="9525" marT="9525" marB="0" anchor="b">
-                    <a:lnL>
-                      <a:noFill/>
-                    </a:lnL>
-                    <a:lnR>
-                      <a:noFill/>
-                    </a:lnR>
-                    <a:lnT w="6350" cap="flat" cmpd="sng" algn="ctr">
-                      <a:solidFill>
-                        <a:srgbClr val="8EA9DB"/>
-                      </a:solidFill>
-                      <a:prstDash val="solid"/>
-                      <a:round/>
-                      <a:headEnd type="none" w="med" len="med"/>
-                      <a:tailEnd type="none" w="med" len="med"/>
-                    </a:lnT>
-                    <a:lnB w="6350" cap="flat" cmpd="sng" algn="ctr">
-                      <a:solidFill>
-                        <a:srgbClr val="8EA9DB"/>
-                      </a:solidFill>
-                      <a:prstDash val="solid"/>
-                      <a:round/>
-                      <a:headEnd type="none" w="med" len="med"/>
-                      <a:tailEnd type="none" w="med" len="med"/>
-                    </a:lnB>
-                  </a:tcPr>
-                </a:tc>
-                <a:tc>
-                  <a:txBody>
-                    <a:bodyPr/>
-                    <a:lstStyle/>
-                    <a:p>
-                      <a:pPr algn="l" fontAlgn="b"/>
-                      <a:r>
-                        <a:rPr lang="de-DE" sz="1100" b="0" i="0" u="none" strike="noStrike">
-                          <a:solidFill>
-                            <a:srgbClr val="000000"/>
-                          </a:solidFill>
-                          <a:effectLst/>
-                          <a:latin typeface="Calibri" panose="020F0502020204030204" pitchFamily="34" charset="0"/>
-                        </a:rPr>
-                        <a:t>4</a:t>
-                      </a:r>
-                    </a:p>
-                  </a:txBody>
-                  <a:tcPr marL="9525" marR="9525" marT="9525" marB="0" anchor="b">
-                    <a:lnL>
-                      <a:noFill/>
-                    </a:lnL>
-                    <a:lnR>
-                      <a:noFill/>
-                    </a:lnR>
-                    <a:lnT w="6350" cap="flat" cmpd="sng" algn="ctr">
-                      <a:solidFill>
-                        <a:srgbClr val="8EA9DB"/>
-                      </a:solidFill>
-                      <a:prstDash val="solid"/>
-                      <a:round/>
-                      <a:headEnd type="none" w="med" len="med"/>
-                      <a:tailEnd type="none" w="med" len="med"/>
-                    </a:lnT>
-                    <a:lnB w="6350" cap="flat" cmpd="sng" algn="ctr">
-                      <a:solidFill>
-                        <a:srgbClr val="8EA9DB"/>
-                      </a:solidFill>
-                      <a:prstDash val="solid"/>
-                      <a:round/>
-                      <a:headEnd type="none" w="med" len="med"/>
-                      <a:tailEnd type="none" w="med" len="med"/>
-                    </a:lnB>
-                  </a:tcPr>
-                </a:tc>
-                <a:tc>
-                  <a:txBody>
-                    <a:bodyPr/>
-                    <a:lstStyle/>
-                    <a:p>
-                      <a:pPr algn="l" fontAlgn="b"/>
-                      <a:r>
-                        <a:rPr lang="de-DE" sz="1100" b="0" i="0" u="none" strike="noStrike">
-                          <a:solidFill>
-                            <a:srgbClr val="000000"/>
-                          </a:solidFill>
-                          <a:effectLst/>
-                          <a:latin typeface="Calibri" panose="020F0502020204030204" pitchFamily="34" charset="0"/>
-                        </a:rPr>
-                        <a:t>15</a:t>
-                      </a:r>
-                    </a:p>
-                  </a:txBody>
-                  <a:tcPr marL="9525" marR="9525" marT="9525" marB="0" anchor="b">
-                    <a:lnL>
-                      <a:noFill/>
-                    </a:lnL>
-                    <a:lnR>
-                      <a:noFill/>
-                    </a:lnR>
-                    <a:lnT w="6350" cap="flat" cmpd="sng" algn="ctr">
-                      <a:solidFill>
-                        <a:srgbClr val="8EA9DB"/>
-                      </a:solidFill>
-                      <a:prstDash val="solid"/>
-                      <a:round/>
-                      <a:headEnd type="none" w="med" len="med"/>
-                      <a:tailEnd type="none" w="med" len="med"/>
-                    </a:lnT>
-                    <a:lnB w="6350" cap="flat" cmpd="sng" algn="ctr">
-                      <a:solidFill>
-                        <a:srgbClr val="8EA9DB"/>
-                      </a:solidFill>
-                      <a:prstDash val="solid"/>
-                      <a:round/>
-                      <a:headEnd type="none" w="med" len="med"/>
-                      <a:tailEnd type="none" w="med" len="med"/>
-                    </a:lnB>
-                  </a:tcPr>
-                </a:tc>
-                <a:tc>
-                  <a:txBody>
-                    <a:bodyPr/>
-                    <a:lstStyle/>
-                    <a:p>
-                      <a:pPr algn="l" fontAlgn="b"/>
-                      <a:endParaRPr lang="de-DE" sz="1100" b="0" i="0" u="none" strike="noStrike">
-                        <a:solidFill>
-                          <a:srgbClr val="000000"/>
-                        </a:solidFill>
-                        <a:effectLst/>
-                        <a:latin typeface="Calibri" panose="020F0502020204030204" pitchFamily="34" charset="0"/>
-                      </a:endParaRPr>
-                    </a:p>
-                  </a:txBody>
-                  <a:tcPr marL="9525" marR="9525" marT="9525" marB="0" anchor="b">
-                    <a:lnL>
-                      <a:noFill/>
-                    </a:lnL>
-                    <a:lnR w="6350" cap="flat" cmpd="sng" algn="ctr">
-                      <a:solidFill>
-                        <a:srgbClr val="8EA9DB"/>
-                      </a:solidFill>
-                      <a:prstDash val="solid"/>
-                      <a:round/>
-                      <a:headEnd type="none" w="med" len="med"/>
-                      <a:tailEnd type="none" w="med" len="med"/>
-                    </a:lnR>
-                    <a:lnT w="6350" cap="flat" cmpd="sng" algn="ctr">
-                      <a:solidFill>
-                        <a:srgbClr val="8EA9DB"/>
-                      </a:solidFill>
-                      <a:prstDash val="solid"/>
-                      <a:round/>
-                      <a:headEnd type="none" w="med" len="med"/>
-                      <a:tailEnd type="none" w="med" len="med"/>
-                    </a:lnT>
-                    <a:lnB w="6350" cap="flat" cmpd="sng" algn="ctr">
-                      <a:solidFill>
-                        <a:srgbClr val="8EA9DB"/>
-                      </a:solidFill>
-                      <a:prstDash val="solid"/>
-                      <a:round/>
-                      <a:headEnd type="none" w="med" len="med"/>
-                      <a:tailEnd type="none" w="med" len="med"/>
-                    </a:lnB>
-                  </a:tcPr>
-                </a:tc>
-                <a:extLst>
-                  <a:ext uri="{0D108BD9-81ED-4DB2-BD59-A6C34878D82A}">
-                    <a16:rowId xmlns:a16="http://schemas.microsoft.com/office/drawing/2014/main" val="1065742702"/>
-                  </a:ext>
-                </a:extLst>
-              </a:tr>
-              <a:tr h="264796">
-                <a:tc>
-                  <a:txBody>
-                    <a:bodyPr/>
-                    <a:lstStyle/>
-                    <a:p>
-                      <a:pPr algn="r" fontAlgn="b"/>
-                      <a:r>
-                        <a:rPr lang="de-DE" sz="1100" b="0" i="0" u="none" strike="noStrike">
-                          <a:solidFill>
-                            <a:srgbClr val="000000"/>
-                          </a:solidFill>
-                          <a:effectLst/>
-                          <a:latin typeface="Calibri" panose="020F0502020204030204" pitchFamily="34" charset="0"/>
-                        </a:rPr>
-                        <a:t>9</a:t>
-                      </a:r>
-                    </a:p>
-                  </a:txBody>
-                  <a:tcPr marL="9525" marR="9525" marT="9525" marB="0" anchor="b">
-                    <a:lnL w="6350" cap="flat" cmpd="sng" algn="ctr">
-                      <a:solidFill>
-                        <a:srgbClr val="8EA9DB"/>
-                      </a:solidFill>
-                      <a:prstDash val="solid"/>
-                      <a:round/>
-                      <a:headEnd type="none" w="med" len="med"/>
-                      <a:tailEnd type="none" w="med" len="med"/>
-                    </a:lnL>
-                    <a:lnR>
-                      <a:noFill/>
-                    </a:lnR>
-                    <a:lnT w="6350" cap="flat" cmpd="sng" algn="ctr">
-                      <a:solidFill>
-                        <a:srgbClr val="8EA9DB"/>
-                      </a:solidFill>
-                      <a:prstDash val="solid"/>
-                      <a:round/>
-                      <a:headEnd type="none" w="med" len="med"/>
-                      <a:tailEnd type="none" w="med" len="med"/>
-                    </a:lnT>
-                    <a:lnB w="6350" cap="flat" cmpd="sng" algn="ctr">
-                      <a:solidFill>
-                        <a:srgbClr val="8EA9DB"/>
-                      </a:solidFill>
-                      <a:prstDash val="solid"/>
-                      <a:round/>
-                      <a:headEnd type="none" w="med" len="med"/>
-                      <a:tailEnd type="none" w="med" len="med"/>
-                    </a:lnB>
-                    <a:solidFill>
-                      <a:srgbClr val="D9E1F2"/>
-                    </a:solidFill>
-                  </a:tcPr>
-                </a:tc>
-                <a:tc>
-                  <a:txBody>
-                    <a:bodyPr/>
-                    <a:lstStyle/>
-                    <a:p>
-                      <a:pPr algn="l" fontAlgn="b"/>
-                      <a:r>
-                        <a:rPr lang="de-DE" sz="1100" b="0" i="0" u="none" strike="noStrike">
-                          <a:solidFill>
-                            <a:srgbClr val="000000"/>
-                          </a:solidFill>
-                          <a:effectLst/>
-                          <a:latin typeface="Calibri" panose="020F0502020204030204" pitchFamily="34" charset="0"/>
-                        </a:rPr>
-                        <a:t>Umfrage Banner</a:t>
-                      </a:r>
-                    </a:p>
-                  </a:txBody>
-                  <a:tcPr marL="9525" marR="9525" marT="9525" marB="0" anchor="b">
-                    <a:lnL>
-                      <a:noFill/>
-                    </a:lnL>
-                    <a:lnR>
-                      <a:noFill/>
-                    </a:lnR>
-                    <a:lnT w="6350" cap="flat" cmpd="sng" algn="ctr">
-                      <a:solidFill>
-                        <a:srgbClr val="8EA9DB"/>
-                      </a:solidFill>
-                      <a:prstDash val="solid"/>
-                      <a:round/>
-                      <a:headEnd type="none" w="med" len="med"/>
-                      <a:tailEnd type="none" w="med" len="med"/>
-                    </a:lnT>
-                    <a:lnB w="6350" cap="flat" cmpd="sng" algn="ctr">
-                      <a:solidFill>
-                        <a:srgbClr val="8EA9DB"/>
-                      </a:solidFill>
-                      <a:prstDash val="solid"/>
-                      <a:round/>
-                      <a:headEnd type="none" w="med" len="med"/>
-                      <a:tailEnd type="none" w="med" len="med"/>
-                    </a:lnB>
-                    <a:solidFill>
-                      <a:srgbClr val="D9E1F2"/>
-                    </a:solidFill>
-                  </a:tcPr>
-                </a:tc>
-                <a:tc>
-                  <a:txBody>
-                    <a:bodyPr/>
-                    <a:lstStyle/>
-                    <a:p>
-                      <a:pPr algn="l" fontAlgn="b"/>
-                      <a:r>
-                        <a:rPr lang="de-DE" sz="1100" b="0" i="0" u="none" strike="noStrike">
-                          <a:solidFill>
-                            <a:srgbClr val="000000"/>
-                          </a:solidFill>
-                          <a:effectLst/>
-                          <a:latin typeface="Calibri" panose="020F0502020204030204" pitchFamily="34" charset="0"/>
-                        </a:rPr>
-                        <a:t>4</a:t>
-                      </a:r>
-                    </a:p>
-                  </a:txBody>
-                  <a:tcPr marL="9525" marR="9525" marT="9525" marB="0" anchor="b">
-                    <a:lnL>
-                      <a:noFill/>
-                    </a:lnL>
-                    <a:lnR>
-                      <a:noFill/>
-                    </a:lnR>
-                    <a:lnT w="6350" cap="flat" cmpd="sng" algn="ctr">
-                      <a:solidFill>
-                        <a:srgbClr val="8EA9DB"/>
-                      </a:solidFill>
-                      <a:prstDash val="solid"/>
-                      <a:round/>
-                      <a:headEnd type="none" w="med" len="med"/>
-                      <a:tailEnd type="none" w="med" len="med"/>
-                    </a:lnT>
-                    <a:lnB w="6350" cap="flat" cmpd="sng" algn="ctr">
-                      <a:solidFill>
-                        <a:srgbClr val="8EA9DB"/>
-                      </a:solidFill>
-                      <a:prstDash val="solid"/>
-                      <a:round/>
-                      <a:headEnd type="none" w="med" len="med"/>
-                      <a:tailEnd type="none" w="med" len="med"/>
-                    </a:lnB>
-                    <a:solidFill>
-                      <a:srgbClr val="D9E1F2"/>
-                    </a:solidFill>
-                  </a:tcPr>
-                </a:tc>
-                <a:tc>
-                  <a:txBody>
-                    <a:bodyPr/>
-                    <a:lstStyle/>
-                    <a:p>
-                      <a:pPr algn="l" fontAlgn="b"/>
-                      <a:r>
-                        <a:rPr lang="de-DE" sz="1100" b="0" i="0" u="none" strike="noStrike">
-                          <a:solidFill>
-                            <a:srgbClr val="000000"/>
-                          </a:solidFill>
-                          <a:effectLst/>
-                          <a:latin typeface="Calibri" panose="020F0502020204030204" pitchFamily="34" charset="0"/>
-                        </a:rPr>
-                        <a:t>16</a:t>
-                      </a:r>
-                    </a:p>
-                  </a:txBody>
-                  <a:tcPr marL="9525" marR="9525" marT="9525" marB="0" anchor="b">
-                    <a:lnL>
-                      <a:noFill/>
-                    </a:lnL>
-                    <a:lnR>
-                      <a:noFill/>
-                    </a:lnR>
-                    <a:lnT w="6350" cap="flat" cmpd="sng" algn="ctr">
-                      <a:solidFill>
-                        <a:srgbClr val="8EA9DB"/>
-                      </a:solidFill>
-                      <a:prstDash val="solid"/>
-                      <a:round/>
-                      <a:headEnd type="none" w="med" len="med"/>
-                      <a:tailEnd type="none" w="med" len="med"/>
-                    </a:lnT>
-                    <a:lnB w="6350" cap="flat" cmpd="sng" algn="ctr">
-                      <a:solidFill>
-                        <a:srgbClr val="8EA9DB"/>
-                      </a:solidFill>
-                      <a:prstDash val="solid"/>
-                      <a:round/>
-                      <a:headEnd type="none" w="med" len="med"/>
-                      <a:tailEnd type="none" w="med" len="med"/>
-                    </a:lnB>
-                    <a:solidFill>
-                      <a:srgbClr val="D9E1F2"/>
-                    </a:solidFill>
-                  </a:tcPr>
-                </a:tc>
-                <a:tc>
-                  <a:txBody>
-                    <a:bodyPr/>
-                    <a:lstStyle/>
-                    <a:p>
-                      <a:pPr algn="l" fontAlgn="b"/>
-                      <a:endParaRPr lang="de-DE" sz="1100" b="0" i="0" u="none" strike="noStrike">
-                        <a:solidFill>
-                          <a:srgbClr val="000000"/>
-                        </a:solidFill>
-                        <a:effectLst/>
-                        <a:latin typeface="Calibri" panose="020F0502020204030204" pitchFamily="34" charset="0"/>
-                      </a:endParaRPr>
-                    </a:p>
-                  </a:txBody>
-                  <a:tcPr marL="9525" marR="9525" marT="9525" marB="0" anchor="b">
-                    <a:lnL>
-                      <a:noFill/>
-                    </a:lnL>
-                    <a:lnR w="6350" cap="flat" cmpd="sng" algn="ctr">
-                      <a:solidFill>
-                        <a:srgbClr val="8EA9DB"/>
-                      </a:solidFill>
-                      <a:prstDash val="solid"/>
-                      <a:round/>
-                      <a:headEnd type="none" w="med" len="med"/>
-                      <a:tailEnd type="none" w="med" len="med"/>
-                    </a:lnR>
-                    <a:lnT w="6350" cap="flat" cmpd="sng" algn="ctr">
-                      <a:solidFill>
-                        <a:srgbClr val="8EA9DB"/>
-                      </a:solidFill>
-                      <a:prstDash val="solid"/>
-                      <a:round/>
-                      <a:headEnd type="none" w="med" len="med"/>
-                      <a:tailEnd type="none" w="med" len="med"/>
-                    </a:lnT>
-                    <a:lnB w="6350" cap="flat" cmpd="sng" algn="ctr">
-                      <a:solidFill>
-                        <a:srgbClr val="8EA9DB"/>
-                      </a:solidFill>
-                      <a:prstDash val="solid"/>
-                      <a:round/>
-                      <a:headEnd type="none" w="med" len="med"/>
-                      <a:tailEnd type="none" w="med" len="med"/>
-                    </a:lnB>
-                    <a:solidFill>
-                      <a:srgbClr val="D9E1F2"/>
-                    </a:solidFill>
-                  </a:tcPr>
-                </a:tc>
-                <a:extLst>
-                  <a:ext uri="{0D108BD9-81ED-4DB2-BD59-A6C34878D82A}">
-                    <a16:rowId xmlns:a16="http://schemas.microsoft.com/office/drawing/2014/main" val="3529109841"/>
-                  </a:ext>
-                </a:extLst>
-              </a:tr>
-              <a:tr h="264796">
-                <a:tc>
-                  <a:txBody>
-                    <a:bodyPr/>
-                    <a:lstStyle/>
-                    <a:p>
-                      <a:pPr algn="r" fontAlgn="b"/>
-                      <a:r>
-                        <a:rPr lang="de-DE" sz="1100" b="0" i="0" u="none" strike="noStrike">
-                          <a:solidFill>
-                            <a:srgbClr val="000000"/>
-                          </a:solidFill>
-                          <a:effectLst/>
-                          <a:latin typeface="Calibri" panose="020F0502020204030204" pitchFamily="34" charset="0"/>
-                        </a:rPr>
-                        <a:t>10</a:t>
-                      </a:r>
-                    </a:p>
-                  </a:txBody>
-                  <a:tcPr marL="9525" marR="9525" marT="9525" marB="0" anchor="b">
-                    <a:lnL w="6350" cap="flat" cmpd="sng" algn="ctr">
-                      <a:solidFill>
-                        <a:srgbClr val="8EA9DB"/>
-                      </a:solidFill>
-                      <a:prstDash val="solid"/>
-                      <a:round/>
-                      <a:headEnd type="none" w="med" len="med"/>
-                      <a:tailEnd type="none" w="med" len="med"/>
-                    </a:lnL>
-                    <a:lnR>
-                      <a:noFill/>
-                    </a:lnR>
-                    <a:lnT w="6350" cap="flat" cmpd="sng" algn="ctr">
-                      <a:solidFill>
-                        <a:srgbClr val="8EA9DB"/>
-                      </a:solidFill>
-                      <a:prstDash val="solid"/>
-                      <a:round/>
-                      <a:headEnd type="none" w="med" len="med"/>
-                      <a:tailEnd type="none" w="med" len="med"/>
-                    </a:lnT>
-                    <a:lnB w="6350" cap="flat" cmpd="sng" algn="ctr">
-                      <a:solidFill>
-                        <a:srgbClr val="8EA9DB"/>
-                      </a:solidFill>
-                      <a:prstDash val="solid"/>
-                      <a:round/>
-                      <a:headEnd type="none" w="med" len="med"/>
-                      <a:tailEnd type="none" w="med" len="med"/>
-                    </a:lnB>
-                  </a:tcPr>
-                </a:tc>
-                <a:tc>
-                  <a:txBody>
-                    <a:bodyPr/>
-                    <a:lstStyle/>
-                    <a:p>
-                      <a:pPr algn="l" fontAlgn="b"/>
-                      <a:r>
-                        <a:rPr lang="de-DE" sz="1100" b="0" i="0" u="none" strike="noStrike">
-                          <a:solidFill>
-                            <a:srgbClr val="000000"/>
-                          </a:solidFill>
-                          <a:effectLst/>
-                          <a:latin typeface="Calibri" panose="020F0502020204030204" pitchFamily="34" charset="0"/>
-                        </a:rPr>
-                        <a:t>Wochentagwechselfunktionalität</a:t>
-                      </a:r>
-                    </a:p>
-                  </a:txBody>
-                  <a:tcPr marL="9525" marR="9525" marT="9525" marB="0" anchor="b">
-                    <a:lnL>
-                      <a:noFill/>
-                    </a:lnL>
-                    <a:lnR>
-                      <a:noFill/>
-                    </a:lnR>
-                    <a:lnT w="6350" cap="flat" cmpd="sng" algn="ctr">
-                      <a:solidFill>
-                        <a:srgbClr val="8EA9DB"/>
-                      </a:solidFill>
-                      <a:prstDash val="solid"/>
-                      <a:round/>
-                      <a:headEnd type="none" w="med" len="med"/>
-                      <a:tailEnd type="none" w="med" len="med"/>
-                    </a:lnT>
-                    <a:lnB w="6350" cap="flat" cmpd="sng" algn="ctr">
-                      <a:solidFill>
-                        <a:srgbClr val="8EA9DB"/>
-                      </a:solidFill>
-                      <a:prstDash val="solid"/>
-                      <a:round/>
-                      <a:headEnd type="none" w="med" len="med"/>
-                      <a:tailEnd type="none" w="med" len="med"/>
-                    </a:lnB>
-                  </a:tcPr>
-                </a:tc>
-                <a:tc>
-                  <a:txBody>
-                    <a:bodyPr/>
-                    <a:lstStyle/>
-                    <a:p>
-                      <a:pPr algn="l" fontAlgn="b"/>
-                      <a:r>
-                        <a:rPr lang="de-DE" sz="1100" b="0" i="0" u="none" strike="noStrike">
-                          <a:solidFill>
-                            <a:srgbClr val="000000"/>
-                          </a:solidFill>
-                          <a:effectLst/>
-                          <a:latin typeface="Calibri" panose="020F0502020204030204" pitchFamily="34" charset="0"/>
-                        </a:rPr>
-                        <a:t>4</a:t>
-                      </a:r>
-                    </a:p>
-                  </a:txBody>
-                  <a:tcPr marL="9525" marR="9525" marT="9525" marB="0" anchor="b">
-                    <a:lnL>
-                      <a:noFill/>
-                    </a:lnL>
-                    <a:lnR>
-                      <a:noFill/>
-                    </a:lnR>
-                    <a:lnT w="6350" cap="flat" cmpd="sng" algn="ctr">
-                      <a:solidFill>
-                        <a:srgbClr val="8EA9DB"/>
-                      </a:solidFill>
-                      <a:prstDash val="solid"/>
-                      <a:round/>
-                      <a:headEnd type="none" w="med" len="med"/>
-                      <a:tailEnd type="none" w="med" len="med"/>
-                    </a:lnT>
-                    <a:lnB w="6350" cap="flat" cmpd="sng" algn="ctr">
-                      <a:solidFill>
-                        <a:srgbClr val="8EA9DB"/>
-                      </a:solidFill>
-                      <a:prstDash val="solid"/>
-                      <a:round/>
-                      <a:headEnd type="none" w="med" len="med"/>
-                      <a:tailEnd type="none" w="med" len="med"/>
-                    </a:lnB>
-                  </a:tcPr>
-                </a:tc>
-                <a:tc>
-                  <a:txBody>
-                    <a:bodyPr/>
-                    <a:lstStyle/>
-                    <a:p>
-                      <a:pPr algn="l" fontAlgn="b"/>
-                      <a:endParaRPr lang="de-DE" sz="1100" b="0" i="0" u="none" strike="noStrike">
-                        <a:solidFill>
-                          <a:srgbClr val="000000"/>
-                        </a:solidFill>
-                        <a:effectLst/>
-                        <a:latin typeface="Calibri" panose="020F0502020204030204" pitchFamily="34" charset="0"/>
-                      </a:endParaRPr>
-                    </a:p>
-                  </a:txBody>
-                  <a:tcPr marL="9525" marR="9525" marT="9525" marB="0" anchor="b">
-                    <a:lnL>
-                      <a:noFill/>
-                    </a:lnL>
-                    <a:lnR>
-                      <a:noFill/>
-                    </a:lnR>
-                    <a:lnT w="6350" cap="flat" cmpd="sng" algn="ctr">
-                      <a:solidFill>
-                        <a:srgbClr val="8EA9DB"/>
-                      </a:solidFill>
-                      <a:prstDash val="solid"/>
-                      <a:round/>
-                      <a:headEnd type="none" w="med" len="med"/>
-                      <a:tailEnd type="none" w="med" len="med"/>
-                    </a:lnT>
-                    <a:lnB w="6350" cap="flat" cmpd="sng" algn="ctr">
-                      <a:solidFill>
-                        <a:srgbClr val="8EA9DB"/>
-                      </a:solidFill>
-                      <a:prstDash val="solid"/>
-                      <a:round/>
-                      <a:headEnd type="none" w="med" len="med"/>
-                      <a:tailEnd type="none" w="med" len="med"/>
-                    </a:lnB>
-                  </a:tcPr>
-                </a:tc>
-                <a:tc>
-                  <a:txBody>
-                    <a:bodyPr/>
-                    <a:lstStyle/>
-                    <a:p>
-                      <a:pPr algn="l" fontAlgn="b"/>
-                      <a:endParaRPr lang="de-DE" sz="1100" b="0" i="0" u="none" strike="noStrike">
-                        <a:solidFill>
-                          <a:srgbClr val="000000"/>
-                        </a:solidFill>
-                        <a:effectLst/>
-                        <a:latin typeface="Calibri" panose="020F0502020204030204" pitchFamily="34" charset="0"/>
-                      </a:endParaRPr>
-                    </a:p>
-                  </a:txBody>
-                  <a:tcPr marL="9525" marR="9525" marT="9525" marB="0" anchor="b">
-                    <a:lnL>
-                      <a:noFill/>
-                    </a:lnL>
-                    <a:lnR w="6350" cap="flat" cmpd="sng" algn="ctr">
-                      <a:solidFill>
-                        <a:srgbClr val="8EA9DB"/>
-                      </a:solidFill>
-                      <a:prstDash val="solid"/>
-                      <a:round/>
-                      <a:headEnd type="none" w="med" len="med"/>
-                      <a:tailEnd type="none" w="med" len="med"/>
-                    </a:lnR>
-                    <a:lnT w="6350" cap="flat" cmpd="sng" algn="ctr">
-                      <a:solidFill>
-                        <a:srgbClr val="8EA9DB"/>
-                      </a:solidFill>
-                      <a:prstDash val="solid"/>
-                      <a:round/>
-                      <a:headEnd type="none" w="med" len="med"/>
-                      <a:tailEnd type="none" w="med" len="med"/>
-                    </a:lnT>
-                    <a:lnB w="6350" cap="flat" cmpd="sng" algn="ctr">
-                      <a:solidFill>
-                        <a:srgbClr val="8EA9DB"/>
-                      </a:solidFill>
-                      <a:prstDash val="solid"/>
-                      <a:round/>
-                      <a:headEnd type="none" w="med" len="med"/>
-                      <a:tailEnd type="none" w="med" len="med"/>
-                    </a:lnB>
-                  </a:tcPr>
-                </a:tc>
-                <a:extLst>
-                  <a:ext uri="{0D108BD9-81ED-4DB2-BD59-A6C34878D82A}">
-                    <a16:rowId xmlns:a16="http://schemas.microsoft.com/office/drawing/2014/main" val="3348067701"/>
-                  </a:ext>
-                </a:extLst>
-              </a:tr>
-              <a:tr h="264796">
-                <a:tc>
-                  <a:txBody>
-                    <a:bodyPr/>
-                    <a:lstStyle/>
-                    <a:p>
-                      <a:pPr algn="r" fontAlgn="b"/>
-                      <a:r>
-                        <a:rPr lang="de-DE" sz="1100" b="0" i="0" u="none" strike="noStrike">
-                          <a:solidFill>
-                            <a:srgbClr val="000000"/>
-                          </a:solidFill>
-                          <a:effectLst/>
-                          <a:latin typeface="Calibri" panose="020F0502020204030204" pitchFamily="34" charset="0"/>
-                        </a:rPr>
-                        <a:t>11</a:t>
-                      </a:r>
-                    </a:p>
-                  </a:txBody>
-                  <a:tcPr marL="9525" marR="9525" marT="9525" marB="0" anchor="b">
-                    <a:lnL w="6350" cap="flat" cmpd="sng" algn="ctr">
-                      <a:solidFill>
-                        <a:srgbClr val="8EA9DB"/>
-                      </a:solidFill>
-                      <a:prstDash val="solid"/>
-                      <a:round/>
-                      <a:headEnd type="none" w="med" len="med"/>
-                      <a:tailEnd type="none" w="med" len="med"/>
-                    </a:lnL>
-                    <a:lnR>
-                      <a:noFill/>
-                    </a:lnR>
-                    <a:lnT w="6350" cap="flat" cmpd="sng" algn="ctr">
-                      <a:solidFill>
-                        <a:srgbClr val="8EA9DB"/>
-                      </a:solidFill>
-                      <a:prstDash val="solid"/>
-                      <a:round/>
-                      <a:headEnd type="none" w="med" len="med"/>
-                      <a:tailEnd type="none" w="med" len="med"/>
-                    </a:lnT>
-                    <a:lnB w="6350" cap="flat" cmpd="sng" algn="ctr">
-                      <a:solidFill>
-                        <a:srgbClr val="8EA9DB"/>
-                      </a:solidFill>
-                      <a:prstDash val="solid"/>
-                      <a:round/>
-                      <a:headEnd type="none" w="med" len="med"/>
-                      <a:tailEnd type="none" w="med" len="med"/>
-                    </a:lnB>
-                    <a:solidFill>
-                      <a:srgbClr val="D9E1F2"/>
-                    </a:solidFill>
-                  </a:tcPr>
-                </a:tc>
-                <a:tc>
-                  <a:txBody>
-                    <a:bodyPr/>
-                    <a:lstStyle/>
-                    <a:p>
-                      <a:pPr algn="l" fontAlgn="b"/>
-                      <a:r>
-                        <a:rPr lang="de-DE" sz="1100" b="0" i="0" u="none" strike="noStrike">
-                          <a:solidFill>
-                            <a:srgbClr val="000000"/>
-                          </a:solidFill>
-                          <a:effectLst/>
-                          <a:latin typeface="Calibri" panose="020F0502020204030204" pitchFamily="34" charset="0"/>
-                        </a:rPr>
-                        <a:t>Umfrage reinladen</a:t>
-                      </a:r>
-                    </a:p>
-                  </a:txBody>
-                  <a:tcPr marL="9525" marR="9525" marT="9525" marB="0" anchor="b">
-                    <a:lnL>
-                      <a:noFill/>
-                    </a:lnL>
-                    <a:lnR>
-                      <a:noFill/>
-                    </a:lnR>
-                    <a:lnT w="6350" cap="flat" cmpd="sng" algn="ctr">
-                      <a:solidFill>
-                        <a:srgbClr val="8EA9DB"/>
-                      </a:solidFill>
-                      <a:prstDash val="solid"/>
-                      <a:round/>
-                      <a:headEnd type="none" w="med" len="med"/>
-                      <a:tailEnd type="none" w="med" len="med"/>
-                    </a:lnT>
-                    <a:lnB w="6350" cap="flat" cmpd="sng" algn="ctr">
-                      <a:solidFill>
-                        <a:srgbClr val="8EA9DB"/>
-                      </a:solidFill>
-                      <a:prstDash val="solid"/>
-                      <a:round/>
-                      <a:headEnd type="none" w="med" len="med"/>
-                      <a:tailEnd type="none" w="med" len="med"/>
-                    </a:lnB>
-                    <a:solidFill>
-                      <a:srgbClr val="D9E1F2"/>
-                    </a:solidFill>
-                  </a:tcPr>
-                </a:tc>
-                <a:tc>
-                  <a:txBody>
-                    <a:bodyPr/>
-                    <a:lstStyle/>
-                    <a:p>
-                      <a:pPr algn="l" fontAlgn="b"/>
-                      <a:r>
-                        <a:rPr lang="de-DE" sz="1100" b="0" i="0" u="none" strike="noStrike">
-                          <a:solidFill>
-                            <a:srgbClr val="000000"/>
-                          </a:solidFill>
-                          <a:effectLst/>
-                          <a:latin typeface="Calibri" panose="020F0502020204030204" pitchFamily="34" charset="0"/>
-                        </a:rPr>
-                        <a:t>4</a:t>
-                      </a:r>
-                    </a:p>
-                  </a:txBody>
-                  <a:tcPr marL="9525" marR="9525" marT="9525" marB="0" anchor="b">
-                    <a:lnL>
-                      <a:noFill/>
-                    </a:lnL>
-                    <a:lnR>
-                      <a:noFill/>
-                    </a:lnR>
-                    <a:lnT w="6350" cap="flat" cmpd="sng" algn="ctr">
-                      <a:solidFill>
-                        <a:srgbClr val="8EA9DB"/>
-                      </a:solidFill>
-                      <a:prstDash val="solid"/>
-                      <a:round/>
-                      <a:headEnd type="none" w="med" len="med"/>
-                      <a:tailEnd type="none" w="med" len="med"/>
-                    </a:lnT>
-                    <a:lnB w="6350" cap="flat" cmpd="sng" algn="ctr">
-                      <a:solidFill>
-                        <a:srgbClr val="8EA9DB"/>
-                      </a:solidFill>
-                      <a:prstDash val="solid"/>
-                      <a:round/>
-                      <a:headEnd type="none" w="med" len="med"/>
-                      <a:tailEnd type="none" w="med" len="med"/>
-                    </a:lnB>
-                    <a:solidFill>
-                      <a:srgbClr val="D9E1F2"/>
-                    </a:solidFill>
-                  </a:tcPr>
-                </a:tc>
-                <a:tc>
-                  <a:txBody>
-                    <a:bodyPr/>
-                    <a:lstStyle/>
-                    <a:p>
-                      <a:pPr algn="l" fontAlgn="b"/>
-                      <a:endParaRPr lang="de-DE" sz="1100" b="0" i="0" u="none" strike="noStrike">
-                        <a:solidFill>
-                          <a:srgbClr val="000000"/>
-                        </a:solidFill>
-                        <a:effectLst/>
-                        <a:latin typeface="Calibri" panose="020F0502020204030204" pitchFamily="34" charset="0"/>
-                      </a:endParaRPr>
-                    </a:p>
-                  </a:txBody>
-                  <a:tcPr marL="9525" marR="9525" marT="9525" marB="0" anchor="b">
-                    <a:lnL>
-                      <a:noFill/>
-                    </a:lnL>
-                    <a:lnR>
-                      <a:noFill/>
-                    </a:lnR>
-                    <a:lnT w="6350" cap="flat" cmpd="sng" algn="ctr">
-                      <a:solidFill>
-                        <a:srgbClr val="8EA9DB"/>
-                      </a:solidFill>
-                      <a:prstDash val="solid"/>
-                      <a:round/>
-                      <a:headEnd type="none" w="med" len="med"/>
-                      <a:tailEnd type="none" w="med" len="med"/>
-                    </a:lnT>
-                    <a:lnB w="6350" cap="flat" cmpd="sng" algn="ctr">
-                      <a:solidFill>
-                        <a:srgbClr val="8EA9DB"/>
-                      </a:solidFill>
-                      <a:prstDash val="solid"/>
-                      <a:round/>
-                      <a:headEnd type="none" w="med" len="med"/>
-                      <a:tailEnd type="none" w="med" len="med"/>
-                    </a:lnB>
-                    <a:solidFill>
-                      <a:srgbClr val="D9E1F2"/>
-                    </a:solidFill>
-                  </a:tcPr>
-                </a:tc>
-                <a:tc>
-                  <a:txBody>
-                    <a:bodyPr/>
-                    <a:lstStyle/>
-                    <a:p>
-                      <a:pPr algn="l" fontAlgn="b"/>
-                      <a:endParaRPr lang="de-DE" sz="1100" b="0" i="0" u="none" strike="noStrike">
-                        <a:solidFill>
-                          <a:srgbClr val="000000"/>
-                        </a:solidFill>
-                        <a:effectLst/>
-                        <a:latin typeface="Calibri" panose="020F0502020204030204" pitchFamily="34" charset="0"/>
-                      </a:endParaRPr>
-                    </a:p>
-                  </a:txBody>
-                  <a:tcPr marL="9525" marR="9525" marT="9525" marB="0" anchor="b">
-                    <a:lnL>
-                      <a:noFill/>
-                    </a:lnL>
-                    <a:lnR w="6350" cap="flat" cmpd="sng" algn="ctr">
-                      <a:solidFill>
-                        <a:srgbClr val="8EA9DB"/>
-                      </a:solidFill>
-                      <a:prstDash val="solid"/>
-                      <a:round/>
-                      <a:headEnd type="none" w="med" len="med"/>
-                      <a:tailEnd type="none" w="med" len="med"/>
-                    </a:lnR>
-                    <a:lnT w="6350" cap="flat" cmpd="sng" algn="ctr">
-                      <a:solidFill>
-                        <a:srgbClr val="8EA9DB"/>
-                      </a:solidFill>
-                      <a:prstDash val="solid"/>
-                      <a:round/>
-                      <a:headEnd type="none" w="med" len="med"/>
-                      <a:tailEnd type="none" w="med" len="med"/>
-                    </a:lnT>
-                    <a:lnB w="6350" cap="flat" cmpd="sng" algn="ctr">
-                      <a:solidFill>
-                        <a:srgbClr val="8EA9DB"/>
-                      </a:solidFill>
-                      <a:prstDash val="solid"/>
-                      <a:round/>
-                      <a:headEnd type="none" w="med" len="med"/>
-                      <a:tailEnd type="none" w="med" len="med"/>
-                    </a:lnB>
-                    <a:solidFill>
-                      <a:srgbClr val="D9E1F2"/>
-                    </a:solidFill>
-                  </a:tcPr>
-                </a:tc>
-                <a:extLst>
-                  <a:ext uri="{0D108BD9-81ED-4DB2-BD59-A6C34878D82A}">
-                    <a16:rowId xmlns:a16="http://schemas.microsoft.com/office/drawing/2014/main" val="3992778046"/>
-                  </a:ext>
-                </a:extLst>
-              </a:tr>
-              <a:tr h="264796">
-                <a:tc>
-                  <a:txBody>
-                    <a:bodyPr/>
-                    <a:lstStyle/>
-                    <a:p>
-                      <a:pPr algn="r" fontAlgn="b"/>
-                      <a:r>
-                        <a:rPr lang="de-DE" sz="1100" b="0" i="0" u="none" strike="noStrike">
-                          <a:solidFill>
-                            <a:srgbClr val="000000"/>
-                          </a:solidFill>
-                          <a:effectLst/>
-                          <a:latin typeface="Calibri" panose="020F0502020204030204" pitchFamily="34" charset="0"/>
-                        </a:rPr>
-                        <a:t>12</a:t>
-                      </a:r>
-                    </a:p>
-                  </a:txBody>
-                  <a:tcPr marL="9525" marR="9525" marT="9525" marB="0" anchor="b">
-                    <a:lnL w="6350" cap="flat" cmpd="sng" algn="ctr">
-                      <a:solidFill>
-                        <a:srgbClr val="8EA9DB"/>
-                      </a:solidFill>
-                      <a:prstDash val="solid"/>
-                      <a:round/>
-                      <a:headEnd type="none" w="med" len="med"/>
-                      <a:tailEnd type="none" w="med" len="med"/>
-                    </a:lnL>
-                    <a:lnR>
-                      <a:noFill/>
-                    </a:lnR>
-                    <a:lnT w="6350" cap="flat" cmpd="sng" algn="ctr">
-                      <a:solidFill>
-                        <a:srgbClr val="8EA9DB"/>
-                      </a:solidFill>
-                      <a:prstDash val="solid"/>
-                      <a:round/>
-                      <a:headEnd type="none" w="med" len="med"/>
-                      <a:tailEnd type="none" w="med" len="med"/>
-                    </a:lnT>
-                    <a:lnB w="6350" cap="flat" cmpd="sng" algn="ctr">
-                      <a:solidFill>
-                        <a:srgbClr val="8EA9DB"/>
-                      </a:solidFill>
-                      <a:prstDash val="solid"/>
-                      <a:round/>
-                      <a:headEnd type="none" w="med" len="med"/>
-                      <a:tailEnd type="none" w="med" len="med"/>
-                    </a:lnB>
-                  </a:tcPr>
-                </a:tc>
-                <a:tc>
-                  <a:txBody>
-                    <a:bodyPr/>
-                    <a:lstStyle/>
-                    <a:p>
-                      <a:pPr algn="l" fontAlgn="b"/>
-                      <a:r>
-                        <a:rPr lang="de-DE" sz="1100" b="0" i="0" u="none" strike="noStrike">
-                          <a:solidFill>
-                            <a:srgbClr val="000000"/>
-                          </a:solidFill>
-                          <a:effectLst/>
-                          <a:latin typeface="Calibri" panose="020F0502020204030204" pitchFamily="34" charset="0"/>
-                        </a:rPr>
-                        <a:t>Push Notification (Android)</a:t>
-                      </a:r>
-                    </a:p>
-                  </a:txBody>
-                  <a:tcPr marL="9525" marR="9525" marT="9525" marB="0" anchor="b">
-                    <a:lnL>
-                      <a:noFill/>
-                    </a:lnL>
-                    <a:lnR>
-                      <a:noFill/>
-                    </a:lnR>
-                    <a:lnT w="6350" cap="flat" cmpd="sng" algn="ctr">
-                      <a:solidFill>
-                        <a:srgbClr val="8EA9DB"/>
-                      </a:solidFill>
-                      <a:prstDash val="solid"/>
-                      <a:round/>
-                      <a:headEnd type="none" w="med" len="med"/>
-                      <a:tailEnd type="none" w="med" len="med"/>
-                    </a:lnT>
-                    <a:lnB w="6350" cap="flat" cmpd="sng" algn="ctr">
-                      <a:solidFill>
-                        <a:srgbClr val="8EA9DB"/>
-                      </a:solidFill>
-                      <a:prstDash val="solid"/>
-                      <a:round/>
-                      <a:headEnd type="none" w="med" len="med"/>
-                      <a:tailEnd type="none" w="med" len="med"/>
-                    </a:lnB>
-                  </a:tcPr>
-                </a:tc>
-                <a:tc>
-                  <a:txBody>
-                    <a:bodyPr/>
-                    <a:lstStyle/>
-                    <a:p>
-                      <a:pPr algn="l" fontAlgn="b"/>
-                      <a:r>
-                        <a:rPr lang="de-DE" sz="1100" b="0" i="0" u="none" strike="noStrike">
-                          <a:solidFill>
-                            <a:srgbClr val="000000"/>
-                          </a:solidFill>
-                          <a:effectLst/>
-                          <a:latin typeface="Calibri" panose="020F0502020204030204" pitchFamily="34" charset="0"/>
-                        </a:rPr>
-                        <a:t>6 15 16</a:t>
-                      </a:r>
-                    </a:p>
-                  </a:txBody>
-                  <a:tcPr marL="9525" marR="9525" marT="9525" marB="0" anchor="b">
-                    <a:lnL>
-                      <a:noFill/>
-                    </a:lnL>
-                    <a:lnR>
-                      <a:noFill/>
-                    </a:lnR>
-                    <a:lnT w="6350" cap="flat" cmpd="sng" algn="ctr">
-                      <a:solidFill>
-                        <a:srgbClr val="8EA9DB"/>
-                      </a:solidFill>
-                      <a:prstDash val="solid"/>
-                      <a:round/>
-                      <a:headEnd type="none" w="med" len="med"/>
-                      <a:tailEnd type="none" w="med" len="med"/>
-                    </a:lnT>
-                    <a:lnB w="6350" cap="flat" cmpd="sng" algn="ctr">
-                      <a:solidFill>
-                        <a:srgbClr val="8EA9DB"/>
-                      </a:solidFill>
-                      <a:prstDash val="solid"/>
-                      <a:round/>
-                      <a:headEnd type="none" w="med" len="med"/>
-                      <a:tailEnd type="none" w="med" len="med"/>
-                    </a:lnB>
-                  </a:tcPr>
-                </a:tc>
-                <a:tc>
-                  <a:txBody>
-                    <a:bodyPr/>
-                    <a:lstStyle/>
-                    <a:p>
-                      <a:pPr algn="l" fontAlgn="b"/>
-                      <a:endParaRPr lang="de-DE" sz="1100" b="0" i="0" u="none" strike="noStrike">
-                        <a:solidFill>
-                          <a:srgbClr val="000000"/>
-                        </a:solidFill>
-                        <a:effectLst/>
-                        <a:latin typeface="Calibri" panose="020F0502020204030204" pitchFamily="34" charset="0"/>
-                      </a:endParaRPr>
-                    </a:p>
-                  </a:txBody>
-                  <a:tcPr marL="9525" marR="9525" marT="9525" marB="0" anchor="b">
-                    <a:lnL>
-                      <a:noFill/>
-                    </a:lnL>
-                    <a:lnR>
-                      <a:noFill/>
-                    </a:lnR>
-                    <a:lnT w="6350" cap="flat" cmpd="sng" algn="ctr">
-                      <a:solidFill>
-                        <a:srgbClr val="8EA9DB"/>
-                      </a:solidFill>
-                      <a:prstDash val="solid"/>
-                      <a:round/>
-                      <a:headEnd type="none" w="med" len="med"/>
-                      <a:tailEnd type="none" w="med" len="med"/>
-                    </a:lnT>
-                    <a:lnB w="6350" cap="flat" cmpd="sng" algn="ctr">
-                      <a:solidFill>
-                        <a:srgbClr val="8EA9DB"/>
-                      </a:solidFill>
-                      <a:prstDash val="solid"/>
-                      <a:round/>
-                      <a:headEnd type="none" w="med" len="med"/>
-                      <a:tailEnd type="none" w="med" len="med"/>
-                    </a:lnB>
-                  </a:tcPr>
-                </a:tc>
-                <a:tc>
-                  <a:txBody>
-                    <a:bodyPr/>
-                    <a:lstStyle/>
-                    <a:p>
-                      <a:pPr algn="l" fontAlgn="b"/>
-                      <a:endParaRPr lang="de-DE" sz="1100" b="0" i="0" u="none" strike="noStrike">
-                        <a:solidFill>
-                          <a:srgbClr val="000000"/>
-                        </a:solidFill>
-                        <a:effectLst/>
-                        <a:latin typeface="Calibri" panose="020F0502020204030204" pitchFamily="34" charset="0"/>
-                      </a:endParaRPr>
-                    </a:p>
-                  </a:txBody>
-                  <a:tcPr marL="9525" marR="9525" marT="9525" marB="0" anchor="b">
-                    <a:lnL>
-                      <a:noFill/>
-                    </a:lnL>
-                    <a:lnR w="6350" cap="flat" cmpd="sng" algn="ctr">
-                      <a:solidFill>
-                        <a:srgbClr val="8EA9DB"/>
-                      </a:solidFill>
-                      <a:prstDash val="solid"/>
-                      <a:round/>
-                      <a:headEnd type="none" w="med" len="med"/>
-                      <a:tailEnd type="none" w="med" len="med"/>
-                    </a:lnR>
-                    <a:lnT w="6350" cap="flat" cmpd="sng" algn="ctr">
-                      <a:solidFill>
-                        <a:srgbClr val="8EA9DB"/>
-                      </a:solidFill>
-                      <a:prstDash val="solid"/>
-                      <a:round/>
-                      <a:headEnd type="none" w="med" len="med"/>
-                      <a:tailEnd type="none" w="med" len="med"/>
-                    </a:lnT>
-                    <a:lnB w="6350" cap="flat" cmpd="sng" algn="ctr">
-                      <a:solidFill>
-                        <a:srgbClr val="8EA9DB"/>
-                      </a:solidFill>
-                      <a:prstDash val="solid"/>
-                      <a:round/>
-                      <a:headEnd type="none" w="med" len="med"/>
-                      <a:tailEnd type="none" w="med" len="med"/>
-                    </a:lnB>
-                  </a:tcPr>
-                </a:tc>
-                <a:extLst>
-                  <a:ext uri="{0D108BD9-81ED-4DB2-BD59-A6C34878D82A}">
-                    <a16:rowId xmlns:a16="http://schemas.microsoft.com/office/drawing/2014/main" val="2137676354"/>
-                  </a:ext>
-                </a:extLst>
-              </a:tr>
-              <a:tr h="264796">
-                <a:tc>
-                  <a:txBody>
-                    <a:bodyPr/>
-                    <a:lstStyle/>
-                    <a:p>
-                      <a:pPr algn="r" fontAlgn="b"/>
-                      <a:r>
-                        <a:rPr lang="de-DE" sz="1100" b="0" i="0" u="none" strike="noStrike">
-                          <a:solidFill>
-                            <a:srgbClr val="000000"/>
-                          </a:solidFill>
-                          <a:effectLst/>
-                          <a:latin typeface="Calibri" panose="020F0502020204030204" pitchFamily="34" charset="0"/>
-                        </a:rPr>
-                        <a:t>13</a:t>
-                      </a:r>
-                    </a:p>
-                  </a:txBody>
-                  <a:tcPr marL="9525" marR="9525" marT="9525" marB="0" anchor="b">
-                    <a:lnL w="6350" cap="flat" cmpd="sng" algn="ctr">
-                      <a:solidFill>
-                        <a:srgbClr val="8EA9DB"/>
-                      </a:solidFill>
-                      <a:prstDash val="solid"/>
-                      <a:round/>
-                      <a:headEnd type="none" w="med" len="med"/>
-                      <a:tailEnd type="none" w="med" len="med"/>
-                    </a:lnL>
-                    <a:lnR>
-                      <a:noFill/>
-                    </a:lnR>
-                    <a:lnT w="6350" cap="flat" cmpd="sng" algn="ctr">
-                      <a:solidFill>
-                        <a:srgbClr val="8EA9DB"/>
-                      </a:solidFill>
-                      <a:prstDash val="solid"/>
-                      <a:round/>
-                      <a:headEnd type="none" w="med" len="med"/>
-                      <a:tailEnd type="none" w="med" len="med"/>
-                    </a:lnT>
-                    <a:lnB w="6350" cap="flat" cmpd="sng" algn="ctr">
-                      <a:solidFill>
-                        <a:srgbClr val="8EA9DB"/>
-                      </a:solidFill>
-                      <a:prstDash val="solid"/>
-                      <a:round/>
-                      <a:headEnd type="none" w="med" len="med"/>
-                      <a:tailEnd type="none" w="med" len="med"/>
-                    </a:lnB>
-                    <a:solidFill>
-                      <a:srgbClr val="D9E1F2"/>
-                    </a:solidFill>
-                  </a:tcPr>
-                </a:tc>
-                <a:tc>
-                  <a:txBody>
-                    <a:bodyPr/>
-                    <a:lstStyle/>
-                    <a:p>
-                      <a:pPr algn="l" fontAlgn="b"/>
-                      <a:r>
-                        <a:rPr lang="de-DE" sz="1100" b="0" i="0" u="none" strike="noStrike">
-                          <a:solidFill>
-                            <a:srgbClr val="000000"/>
-                          </a:solidFill>
-                          <a:effectLst/>
-                          <a:latin typeface="Calibri" panose="020F0502020204030204" pitchFamily="34" charset="0"/>
-                        </a:rPr>
-                        <a:t>Offline Sync (nur Design cachen)</a:t>
-                      </a:r>
-                    </a:p>
-                  </a:txBody>
-                  <a:tcPr marL="9525" marR="9525" marT="9525" marB="0" anchor="b">
-                    <a:lnL>
-                      <a:noFill/>
-                    </a:lnL>
-                    <a:lnR>
-                      <a:noFill/>
-                    </a:lnR>
-                    <a:lnT w="6350" cap="flat" cmpd="sng" algn="ctr">
-                      <a:solidFill>
-                        <a:srgbClr val="8EA9DB"/>
-                      </a:solidFill>
-                      <a:prstDash val="solid"/>
-                      <a:round/>
-                      <a:headEnd type="none" w="med" len="med"/>
-                      <a:tailEnd type="none" w="med" len="med"/>
-                    </a:lnT>
-                    <a:lnB w="6350" cap="flat" cmpd="sng" algn="ctr">
-                      <a:solidFill>
-                        <a:srgbClr val="8EA9DB"/>
-                      </a:solidFill>
-                      <a:prstDash val="solid"/>
-                      <a:round/>
-                      <a:headEnd type="none" w="med" len="med"/>
-                      <a:tailEnd type="none" w="med" len="med"/>
-                    </a:lnB>
-                    <a:solidFill>
-                      <a:srgbClr val="D9E1F2"/>
-                    </a:solidFill>
-                  </a:tcPr>
-                </a:tc>
-                <a:tc>
-                  <a:txBody>
-                    <a:bodyPr/>
-                    <a:lstStyle/>
-                    <a:p>
-                      <a:pPr algn="l" fontAlgn="b"/>
-                      <a:r>
-                        <a:rPr lang="de-DE" sz="1100" b="0" i="0" u="none" strike="noStrike">
-                          <a:solidFill>
-                            <a:srgbClr val="000000"/>
-                          </a:solidFill>
-                          <a:effectLst/>
-                          <a:latin typeface="Calibri" panose="020F0502020204030204" pitchFamily="34" charset="0"/>
-                        </a:rPr>
-                        <a:t>4</a:t>
-                      </a:r>
-                    </a:p>
-                  </a:txBody>
-                  <a:tcPr marL="9525" marR="9525" marT="9525" marB="0" anchor="b">
-                    <a:lnL>
-                      <a:noFill/>
-                    </a:lnL>
-                    <a:lnR>
-                      <a:noFill/>
-                    </a:lnR>
-                    <a:lnT w="6350" cap="flat" cmpd="sng" algn="ctr">
-                      <a:solidFill>
-                        <a:srgbClr val="8EA9DB"/>
-                      </a:solidFill>
-                      <a:prstDash val="solid"/>
-                      <a:round/>
-                      <a:headEnd type="none" w="med" len="med"/>
-                      <a:tailEnd type="none" w="med" len="med"/>
-                    </a:lnT>
-                    <a:lnB w="6350" cap="flat" cmpd="sng" algn="ctr">
-                      <a:solidFill>
-                        <a:srgbClr val="8EA9DB"/>
-                      </a:solidFill>
-                      <a:prstDash val="solid"/>
-                      <a:round/>
-                      <a:headEnd type="none" w="med" len="med"/>
-                      <a:tailEnd type="none" w="med" len="med"/>
-                    </a:lnB>
-                    <a:solidFill>
-                      <a:srgbClr val="D9E1F2"/>
-                    </a:solidFill>
-                  </a:tcPr>
-                </a:tc>
-                <a:tc>
-                  <a:txBody>
-                    <a:bodyPr/>
-                    <a:lstStyle/>
-                    <a:p>
-                      <a:pPr algn="l" fontAlgn="b"/>
-                      <a:r>
-                        <a:rPr lang="de-DE" sz="1100" b="0" i="0" u="none" strike="noStrike">
-                          <a:solidFill>
-                            <a:srgbClr val="000000"/>
-                          </a:solidFill>
-                          <a:effectLst/>
-                          <a:latin typeface="Calibri" panose="020F0502020204030204" pitchFamily="34" charset="0"/>
-                        </a:rPr>
-                        <a:t>16</a:t>
-                      </a:r>
-                    </a:p>
-                  </a:txBody>
-                  <a:tcPr marL="9525" marR="9525" marT="9525" marB="0" anchor="b">
-                    <a:lnL>
-                      <a:noFill/>
-                    </a:lnL>
-                    <a:lnR>
-                      <a:noFill/>
-                    </a:lnR>
-                    <a:lnT w="6350" cap="flat" cmpd="sng" algn="ctr">
-                      <a:solidFill>
-                        <a:srgbClr val="8EA9DB"/>
-                      </a:solidFill>
-                      <a:prstDash val="solid"/>
-                      <a:round/>
-                      <a:headEnd type="none" w="med" len="med"/>
-                      <a:tailEnd type="none" w="med" len="med"/>
-                    </a:lnT>
-                    <a:lnB w="6350" cap="flat" cmpd="sng" algn="ctr">
-                      <a:solidFill>
-                        <a:srgbClr val="8EA9DB"/>
-                      </a:solidFill>
-                      <a:prstDash val="solid"/>
-                      <a:round/>
-                      <a:headEnd type="none" w="med" len="med"/>
-                      <a:tailEnd type="none" w="med" len="med"/>
-                    </a:lnB>
-                    <a:solidFill>
-                      <a:srgbClr val="D9E1F2"/>
-                    </a:solidFill>
-                  </a:tcPr>
-                </a:tc>
-                <a:tc>
-                  <a:txBody>
-                    <a:bodyPr/>
-                    <a:lstStyle/>
-                    <a:p>
-                      <a:pPr algn="l" fontAlgn="b"/>
-                      <a:endParaRPr lang="de-DE" sz="1100" b="0" i="0" u="none" strike="noStrike">
-                        <a:solidFill>
-                          <a:srgbClr val="000000"/>
-                        </a:solidFill>
-                        <a:effectLst/>
-                        <a:latin typeface="Calibri" panose="020F0502020204030204" pitchFamily="34" charset="0"/>
-                      </a:endParaRPr>
-                    </a:p>
-                  </a:txBody>
-                  <a:tcPr marL="9525" marR="9525" marT="9525" marB="0" anchor="b">
-                    <a:lnL>
-                      <a:noFill/>
-                    </a:lnL>
-                    <a:lnR w="6350" cap="flat" cmpd="sng" algn="ctr">
-                      <a:solidFill>
-                        <a:srgbClr val="8EA9DB"/>
-                      </a:solidFill>
-                      <a:prstDash val="solid"/>
-                      <a:round/>
-                      <a:headEnd type="none" w="med" len="med"/>
-                      <a:tailEnd type="none" w="med" len="med"/>
-                    </a:lnR>
-                    <a:lnT w="6350" cap="flat" cmpd="sng" algn="ctr">
-                      <a:solidFill>
-                        <a:srgbClr val="8EA9DB"/>
-                      </a:solidFill>
-                      <a:prstDash val="solid"/>
-                      <a:round/>
-                      <a:headEnd type="none" w="med" len="med"/>
-                      <a:tailEnd type="none" w="med" len="med"/>
-                    </a:lnT>
-                    <a:lnB w="6350" cap="flat" cmpd="sng" algn="ctr">
-                      <a:solidFill>
-                        <a:srgbClr val="8EA9DB"/>
-                      </a:solidFill>
-                      <a:prstDash val="solid"/>
-                      <a:round/>
-                      <a:headEnd type="none" w="med" len="med"/>
-                      <a:tailEnd type="none" w="med" len="med"/>
-                    </a:lnB>
-                    <a:solidFill>
-                      <a:srgbClr val="D9E1F2"/>
-                    </a:solidFill>
-                  </a:tcPr>
-                </a:tc>
-                <a:extLst>
-                  <a:ext uri="{0D108BD9-81ED-4DB2-BD59-A6C34878D82A}">
-                    <a16:rowId xmlns:a16="http://schemas.microsoft.com/office/drawing/2014/main" val="3671847581"/>
-                  </a:ext>
-                </a:extLst>
-              </a:tr>
-              <a:tr h="264796">
-                <a:tc>
-                  <a:txBody>
-                    <a:bodyPr/>
-                    <a:lstStyle/>
-                    <a:p>
-                      <a:pPr algn="r" fontAlgn="b"/>
-                      <a:r>
-                        <a:rPr lang="de-DE" sz="1100" b="0" i="0" u="none" strike="noStrike">
-                          <a:solidFill>
-                            <a:srgbClr val="000000"/>
-                          </a:solidFill>
-                          <a:effectLst/>
-                          <a:latin typeface="Calibri" panose="020F0502020204030204" pitchFamily="34" charset="0"/>
-                        </a:rPr>
-                        <a:t>14</a:t>
-                      </a:r>
-                    </a:p>
-                  </a:txBody>
-                  <a:tcPr marL="9525" marR="9525" marT="9525" marB="0" anchor="b">
-                    <a:lnL w="6350" cap="flat" cmpd="sng" algn="ctr">
-                      <a:solidFill>
-                        <a:srgbClr val="8EA9DB"/>
-                      </a:solidFill>
-                      <a:prstDash val="solid"/>
-                      <a:round/>
-                      <a:headEnd type="none" w="med" len="med"/>
-                      <a:tailEnd type="none" w="med" len="med"/>
-                    </a:lnL>
-                    <a:lnR>
-                      <a:noFill/>
-                    </a:lnR>
-                    <a:lnT w="6350" cap="flat" cmpd="sng" algn="ctr">
-                      <a:solidFill>
-                        <a:srgbClr val="8EA9DB"/>
-                      </a:solidFill>
-                      <a:prstDash val="solid"/>
-                      <a:round/>
-                      <a:headEnd type="none" w="med" len="med"/>
-                      <a:tailEnd type="none" w="med" len="med"/>
-                    </a:lnT>
-                    <a:lnB w="6350" cap="flat" cmpd="sng" algn="ctr">
-                      <a:solidFill>
-                        <a:srgbClr val="8EA9DB"/>
-                      </a:solidFill>
-                      <a:prstDash val="solid"/>
-                      <a:round/>
-                      <a:headEnd type="none" w="med" len="med"/>
-                      <a:tailEnd type="none" w="med" len="med"/>
-                    </a:lnB>
-                  </a:tcPr>
-                </a:tc>
-                <a:tc>
-                  <a:txBody>
-                    <a:bodyPr/>
-                    <a:lstStyle/>
-                    <a:p>
-                      <a:pPr algn="l" fontAlgn="b"/>
-                      <a:r>
-                        <a:rPr lang="de-DE" sz="1100" b="0" i="0" u="none" strike="noStrike">
-                          <a:solidFill>
-                            <a:srgbClr val="000000"/>
-                          </a:solidFill>
-                          <a:effectLst/>
-                          <a:latin typeface="Calibri" panose="020F0502020204030204" pitchFamily="34" charset="0"/>
-                        </a:rPr>
-                        <a:t>Kantine wechseln</a:t>
-                      </a:r>
-                    </a:p>
-                  </a:txBody>
-                  <a:tcPr marL="9525" marR="9525" marT="9525" marB="0" anchor="b">
-                    <a:lnL>
-                      <a:noFill/>
-                    </a:lnL>
-                    <a:lnR>
-                      <a:noFill/>
-                    </a:lnR>
-                    <a:lnT w="6350" cap="flat" cmpd="sng" algn="ctr">
-                      <a:solidFill>
-                        <a:srgbClr val="8EA9DB"/>
-                      </a:solidFill>
-                      <a:prstDash val="solid"/>
-                      <a:round/>
-                      <a:headEnd type="none" w="med" len="med"/>
-                      <a:tailEnd type="none" w="med" len="med"/>
-                    </a:lnT>
-                    <a:lnB w="6350" cap="flat" cmpd="sng" algn="ctr">
-                      <a:solidFill>
-                        <a:srgbClr val="8EA9DB"/>
-                      </a:solidFill>
-                      <a:prstDash val="solid"/>
-                      <a:round/>
-                      <a:headEnd type="none" w="med" len="med"/>
-                      <a:tailEnd type="none" w="med" len="med"/>
-                    </a:lnB>
-                  </a:tcPr>
-                </a:tc>
-                <a:tc>
-                  <a:txBody>
-                    <a:bodyPr/>
-                    <a:lstStyle/>
-                    <a:p>
-                      <a:pPr algn="l" fontAlgn="b"/>
-                      <a:r>
-                        <a:rPr lang="de-DE" sz="1100" b="0" i="0" u="none" strike="noStrike">
-                          <a:solidFill>
-                            <a:srgbClr val="000000"/>
-                          </a:solidFill>
-                          <a:effectLst/>
-                          <a:latin typeface="Calibri" panose="020F0502020204030204" pitchFamily="34" charset="0"/>
-                        </a:rPr>
-                        <a:t>7</a:t>
-                      </a:r>
-                    </a:p>
-                  </a:txBody>
-                  <a:tcPr marL="9525" marR="9525" marT="9525" marB="0" anchor="b">
-                    <a:lnL>
-                      <a:noFill/>
-                    </a:lnL>
-                    <a:lnR>
-                      <a:noFill/>
-                    </a:lnR>
-                    <a:lnT w="6350" cap="flat" cmpd="sng" algn="ctr">
-                      <a:solidFill>
-                        <a:srgbClr val="8EA9DB"/>
-                      </a:solidFill>
-                      <a:prstDash val="solid"/>
-                      <a:round/>
-                      <a:headEnd type="none" w="med" len="med"/>
-                      <a:tailEnd type="none" w="med" len="med"/>
-                    </a:lnT>
-                    <a:lnB w="6350" cap="flat" cmpd="sng" algn="ctr">
-                      <a:solidFill>
-                        <a:srgbClr val="8EA9DB"/>
-                      </a:solidFill>
-                      <a:prstDash val="solid"/>
-                      <a:round/>
-                      <a:headEnd type="none" w="med" len="med"/>
-                      <a:tailEnd type="none" w="med" len="med"/>
-                    </a:lnB>
-                  </a:tcPr>
-                </a:tc>
-                <a:tc>
-                  <a:txBody>
-                    <a:bodyPr/>
-                    <a:lstStyle/>
-                    <a:p>
-                      <a:pPr algn="l" fontAlgn="b"/>
-                      <a:endParaRPr lang="de-DE" sz="1100" b="0" i="0" u="none" strike="noStrike">
-                        <a:solidFill>
-                          <a:srgbClr val="000000"/>
-                        </a:solidFill>
-                        <a:effectLst/>
-                        <a:latin typeface="Calibri" panose="020F0502020204030204" pitchFamily="34" charset="0"/>
-                      </a:endParaRPr>
-                    </a:p>
-                  </a:txBody>
-                  <a:tcPr marL="9525" marR="9525" marT="9525" marB="0" anchor="b">
-                    <a:lnL>
-                      <a:noFill/>
-                    </a:lnL>
-                    <a:lnR>
-                      <a:noFill/>
-                    </a:lnR>
-                    <a:lnT w="6350" cap="flat" cmpd="sng" algn="ctr">
-                      <a:solidFill>
-                        <a:srgbClr val="8EA9DB"/>
-                      </a:solidFill>
-                      <a:prstDash val="solid"/>
-                      <a:round/>
-                      <a:headEnd type="none" w="med" len="med"/>
-                      <a:tailEnd type="none" w="med" len="med"/>
-                    </a:lnT>
-                    <a:lnB w="6350" cap="flat" cmpd="sng" algn="ctr">
-                      <a:solidFill>
-                        <a:srgbClr val="8EA9DB"/>
-                      </a:solidFill>
-                      <a:prstDash val="solid"/>
-                      <a:round/>
-                      <a:headEnd type="none" w="med" len="med"/>
-                      <a:tailEnd type="none" w="med" len="med"/>
-                    </a:lnB>
-                  </a:tcPr>
-                </a:tc>
-                <a:tc>
-                  <a:txBody>
-                    <a:bodyPr/>
-                    <a:lstStyle/>
-                    <a:p>
-                      <a:pPr algn="l" fontAlgn="b"/>
-                      <a:endParaRPr lang="de-DE" sz="1100" b="0" i="0" u="none" strike="noStrike">
-                        <a:solidFill>
-                          <a:srgbClr val="000000"/>
-                        </a:solidFill>
-                        <a:effectLst/>
-                        <a:latin typeface="Calibri" panose="020F0502020204030204" pitchFamily="34" charset="0"/>
-                      </a:endParaRPr>
-                    </a:p>
-                  </a:txBody>
-                  <a:tcPr marL="9525" marR="9525" marT="9525" marB="0" anchor="b">
-                    <a:lnL>
-                      <a:noFill/>
-                    </a:lnL>
-                    <a:lnR w="6350" cap="flat" cmpd="sng" algn="ctr">
-                      <a:solidFill>
-                        <a:srgbClr val="8EA9DB"/>
-                      </a:solidFill>
-                      <a:prstDash val="solid"/>
-                      <a:round/>
-                      <a:headEnd type="none" w="med" len="med"/>
-                      <a:tailEnd type="none" w="med" len="med"/>
-                    </a:lnR>
-                    <a:lnT w="6350" cap="flat" cmpd="sng" algn="ctr">
-                      <a:solidFill>
-                        <a:srgbClr val="8EA9DB"/>
-                      </a:solidFill>
-                      <a:prstDash val="solid"/>
-                      <a:round/>
-                      <a:headEnd type="none" w="med" len="med"/>
-                      <a:tailEnd type="none" w="med" len="med"/>
-                    </a:lnT>
-                    <a:lnB w="6350" cap="flat" cmpd="sng" algn="ctr">
-                      <a:solidFill>
-                        <a:srgbClr val="8EA9DB"/>
-                      </a:solidFill>
-                      <a:prstDash val="solid"/>
-                      <a:round/>
-                      <a:headEnd type="none" w="med" len="med"/>
-                      <a:tailEnd type="none" w="med" len="med"/>
-                    </a:lnB>
-                  </a:tcPr>
-                </a:tc>
-                <a:extLst>
-                  <a:ext uri="{0D108BD9-81ED-4DB2-BD59-A6C34878D82A}">
-                    <a16:rowId xmlns:a16="http://schemas.microsoft.com/office/drawing/2014/main" val="26935653"/>
-                  </a:ext>
-                </a:extLst>
-              </a:tr>
-              <a:tr h="264796">
-                <a:tc>
-                  <a:txBody>
-                    <a:bodyPr/>
-                    <a:lstStyle/>
-                    <a:p>
-                      <a:pPr algn="r" fontAlgn="b"/>
-                      <a:r>
-                        <a:rPr lang="de-DE" sz="1100" b="0" i="0" u="none" strike="noStrike">
-                          <a:solidFill>
-                            <a:srgbClr val="000000"/>
-                          </a:solidFill>
-                          <a:effectLst/>
-                          <a:latin typeface="Calibri" panose="020F0502020204030204" pitchFamily="34" charset="0"/>
-                        </a:rPr>
-                        <a:t>15</a:t>
-                      </a:r>
-                    </a:p>
-                  </a:txBody>
-                  <a:tcPr marL="9525" marR="9525" marT="9525" marB="0" anchor="b">
-                    <a:lnL w="6350" cap="flat" cmpd="sng" algn="ctr">
-                      <a:solidFill>
-                        <a:srgbClr val="8EA9DB"/>
-                      </a:solidFill>
-                      <a:prstDash val="solid"/>
-                      <a:round/>
-                      <a:headEnd type="none" w="med" len="med"/>
-                      <a:tailEnd type="none" w="med" len="med"/>
-                    </a:lnL>
-                    <a:lnR>
-                      <a:noFill/>
-                    </a:lnR>
-                    <a:lnT w="6350" cap="flat" cmpd="sng" algn="ctr">
-                      <a:solidFill>
-                        <a:srgbClr val="8EA9DB"/>
-                      </a:solidFill>
-                      <a:prstDash val="solid"/>
-                      <a:round/>
-                      <a:headEnd type="none" w="med" len="med"/>
-                      <a:tailEnd type="none" w="med" len="med"/>
-                    </a:lnT>
-                    <a:lnB w="6350" cap="flat" cmpd="sng" algn="ctr">
-                      <a:solidFill>
-                        <a:srgbClr val="8EA9DB"/>
-                      </a:solidFill>
-                      <a:prstDash val="solid"/>
-                      <a:round/>
-                      <a:headEnd type="none" w="med" len="med"/>
-                      <a:tailEnd type="none" w="med" len="med"/>
-                    </a:lnB>
-                    <a:solidFill>
-                      <a:srgbClr val="D9E1F2"/>
-                    </a:solidFill>
-                  </a:tcPr>
-                </a:tc>
-                <a:tc>
-                  <a:txBody>
-                    <a:bodyPr/>
-                    <a:lstStyle/>
-                    <a:p>
-                      <a:pPr algn="l" fontAlgn="b"/>
-                      <a:r>
-                        <a:rPr lang="de-DE" sz="1100" b="0" i="0" u="none" strike="noStrike">
-                          <a:solidFill>
-                            <a:srgbClr val="000000"/>
-                          </a:solidFill>
-                          <a:effectLst/>
-                          <a:latin typeface="Calibri" panose="020F0502020204030204" pitchFamily="34" charset="0"/>
-                        </a:rPr>
-                        <a:t>Triggerfunktion Teilen</a:t>
-                      </a:r>
-                    </a:p>
-                  </a:txBody>
-                  <a:tcPr marL="9525" marR="9525" marT="9525" marB="0" anchor="b">
-                    <a:lnL>
-                      <a:noFill/>
-                    </a:lnL>
-                    <a:lnR>
-                      <a:noFill/>
-                    </a:lnR>
-                    <a:lnT w="6350" cap="flat" cmpd="sng" algn="ctr">
-                      <a:solidFill>
-                        <a:srgbClr val="8EA9DB"/>
-                      </a:solidFill>
-                      <a:prstDash val="solid"/>
-                      <a:round/>
-                      <a:headEnd type="none" w="med" len="med"/>
-                      <a:tailEnd type="none" w="med" len="med"/>
-                    </a:lnT>
-                    <a:lnB w="6350" cap="flat" cmpd="sng" algn="ctr">
-                      <a:solidFill>
-                        <a:srgbClr val="8EA9DB"/>
-                      </a:solidFill>
-                      <a:prstDash val="solid"/>
-                      <a:round/>
-                      <a:headEnd type="none" w="med" len="med"/>
-                      <a:tailEnd type="none" w="med" len="med"/>
-                    </a:lnB>
-                    <a:solidFill>
-                      <a:srgbClr val="D9E1F2"/>
-                    </a:solidFill>
-                  </a:tcPr>
-                </a:tc>
-                <a:tc>
-                  <a:txBody>
-                    <a:bodyPr/>
-                    <a:lstStyle/>
-                    <a:p>
-                      <a:pPr algn="l" fontAlgn="b"/>
-                      <a:r>
-                        <a:rPr lang="de-DE" sz="1100" b="0" i="0" u="none" strike="noStrike">
-                          <a:solidFill>
-                            <a:srgbClr val="000000"/>
-                          </a:solidFill>
-                          <a:effectLst/>
-                          <a:latin typeface="Calibri" panose="020F0502020204030204" pitchFamily="34" charset="0"/>
-                        </a:rPr>
-                        <a:t>8</a:t>
-                      </a:r>
-                    </a:p>
-                  </a:txBody>
-                  <a:tcPr marL="9525" marR="9525" marT="9525" marB="0" anchor="b">
-                    <a:lnL>
-                      <a:noFill/>
-                    </a:lnL>
-                    <a:lnR>
-                      <a:noFill/>
-                    </a:lnR>
-                    <a:lnT w="6350" cap="flat" cmpd="sng" algn="ctr">
-                      <a:solidFill>
-                        <a:srgbClr val="8EA9DB"/>
-                      </a:solidFill>
-                      <a:prstDash val="solid"/>
-                      <a:round/>
-                      <a:headEnd type="none" w="med" len="med"/>
-                      <a:tailEnd type="none" w="med" len="med"/>
-                    </a:lnT>
-                    <a:lnB w="6350" cap="flat" cmpd="sng" algn="ctr">
-                      <a:solidFill>
-                        <a:srgbClr val="8EA9DB"/>
-                      </a:solidFill>
-                      <a:prstDash val="solid"/>
-                      <a:round/>
-                      <a:headEnd type="none" w="med" len="med"/>
-                      <a:tailEnd type="none" w="med" len="med"/>
-                    </a:lnB>
-                    <a:solidFill>
-                      <a:srgbClr val="D9E1F2"/>
-                    </a:solidFill>
-                  </a:tcPr>
-                </a:tc>
-                <a:tc>
-                  <a:txBody>
-                    <a:bodyPr/>
-                    <a:lstStyle/>
-                    <a:p>
-                      <a:pPr algn="l" fontAlgn="b"/>
-                      <a:r>
-                        <a:rPr lang="de-DE" sz="1100" b="0" i="0" u="none" strike="noStrike">
-                          <a:solidFill>
-                            <a:srgbClr val="000000"/>
-                          </a:solidFill>
-                          <a:effectLst/>
-                          <a:latin typeface="Calibri" panose="020F0502020204030204" pitchFamily="34" charset="0"/>
-                        </a:rPr>
-                        <a:t>12</a:t>
-                      </a:r>
-                    </a:p>
-                  </a:txBody>
-                  <a:tcPr marL="9525" marR="9525" marT="9525" marB="0" anchor="b">
-                    <a:lnL>
-                      <a:noFill/>
-                    </a:lnL>
-                    <a:lnR>
-                      <a:noFill/>
-                    </a:lnR>
-                    <a:lnT w="6350" cap="flat" cmpd="sng" algn="ctr">
-                      <a:solidFill>
-                        <a:srgbClr val="8EA9DB"/>
-                      </a:solidFill>
-                      <a:prstDash val="solid"/>
-                      <a:round/>
-                      <a:headEnd type="none" w="med" len="med"/>
-                      <a:tailEnd type="none" w="med" len="med"/>
-                    </a:lnT>
-                    <a:lnB w="6350" cap="flat" cmpd="sng" algn="ctr">
-                      <a:solidFill>
-                        <a:srgbClr val="8EA9DB"/>
-                      </a:solidFill>
-                      <a:prstDash val="solid"/>
-                      <a:round/>
-                      <a:headEnd type="none" w="med" len="med"/>
-                      <a:tailEnd type="none" w="med" len="med"/>
-                    </a:lnB>
-                    <a:solidFill>
-                      <a:srgbClr val="D9E1F2"/>
-                    </a:solidFill>
-                  </a:tcPr>
-                </a:tc>
-                <a:tc>
-                  <a:txBody>
-                    <a:bodyPr/>
-                    <a:lstStyle/>
-                    <a:p>
-                      <a:pPr algn="l" fontAlgn="b"/>
-                      <a:endParaRPr lang="de-DE" sz="1100" b="0" i="0" u="none" strike="noStrike">
-                        <a:solidFill>
-                          <a:srgbClr val="000000"/>
-                        </a:solidFill>
-                        <a:effectLst/>
-                        <a:latin typeface="Calibri" panose="020F0502020204030204" pitchFamily="34" charset="0"/>
-                      </a:endParaRPr>
-                    </a:p>
-                  </a:txBody>
-                  <a:tcPr marL="9525" marR="9525" marT="9525" marB="0" anchor="b">
-                    <a:lnL>
-                      <a:noFill/>
-                    </a:lnL>
-                    <a:lnR w="6350" cap="flat" cmpd="sng" algn="ctr">
-                      <a:solidFill>
-                        <a:srgbClr val="8EA9DB"/>
-                      </a:solidFill>
-                      <a:prstDash val="solid"/>
-                      <a:round/>
-                      <a:headEnd type="none" w="med" len="med"/>
-                      <a:tailEnd type="none" w="med" len="med"/>
-                    </a:lnR>
-                    <a:lnT w="6350" cap="flat" cmpd="sng" algn="ctr">
-                      <a:solidFill>
-                        <a:srgbClr val="8EA9DB"/>
-                      </a:solidFill>
-                      <a:prstDash val="solid"/>
-                      <a:round/>
-                      <a:headEnd type="none" w="med" len="med"/>
-                      <a:tailEnd type="none" w="med" len="med"/>
-                    </a:lnT>
-                    <a:lnB w="6350" cap="flat" cmpd="sng" algn="ctr">
-                      <a:solidFill>
-                        <a:srgbClr val="8EA9DB"/>
-                      </a:solidFill>
-                      <a:prstDash val="solid"/>
-                      <a:round/>
-                      <a:headEnd type="none" w="med" len="med"/>
-                      <a:tailEnd type="none" w="med" len="med"/>
-                    </a:lnB>
-                    <a:solidFill>
-                      <a:srgbClr val="D9E1F2"/>
-                    </a:solidFill>
-                  </a:tcPr>
-                </a:tc>
-                <a:extLst>
-                  <a:ext uri="{0D108BD9-81ED-4DB2-BD59-A6C34878D82A}">
-                    <a16:rowId xmlns:a16="http://schemas.microsoft.com/office/drawing/2014/main" val="1381794202"/>
-                  </a:ext>
-                </a:extLst>
-              </a:tr>
-              <a:tr h="264796">
-                <a:tc>
-                  <a:txBody>
-                    <a:bodyPr/>
-                    <a:lstStyle/>
-                    <a:p>
-                      <a:pPr algn="r" fontAlgn="b"/>
-                      <a:r>
-                        <a:rPr lang="de-DE" sz="1100" b="0" i="0" u="none" strike="noStrike">
-                          <a:solidFill>
-                            <a:srgbClr val="000000"/>
-                          </a:solidFill>
-                          <a:effectLst/>
-                          <a:latin typeface="Calibri" panose="020F0502020204030204" pitchFamily="34" charset="0"/>
-                        </a:rPr>
-                        <a:t>16</a:t>
-                      </a:r>
-                    </a:p>
-                  </a:txBody>
-                  <a:tcPr marL="9525" marR="9525" marT="9525" marB="0" anchor="b">
-                    <a:lnL w="6350" cap="flat" cmpd="sng" algn="ctr">
-                      <a:solidFill>
-                        <a:srgbClr val="8EA9DB"/>
-                      </a:solidFill>
-                      <a:prstDash val="solid"/>
-                      <a:round/>
-                      <a:headEnd type="none" w="med" len="med"/>
-                      <a:tailEnd type="none" w="med" len="med"/>
-                    </a:lnL>
-                    <a:lnR>
-                      <a:noFill/>
-                    </a:lnR>
-                    <a:lnT w="6350" cap="flat" cmpd="sng" algn="ctr">
-                      <a:solidFill>
-                        <a:srgbClr val="8EA9DB"/>
-                      </a:solidFill>
-                      <a:prstDash val="solid"/>
-                      <a:round/>
-                      <a:headEnd type="none" w="med" len="med"/>
-                      <a:tailEnd type="none" w="med" len="med"/>
-                    </a:lnT>
-                    <a:lnB w="6350" cap="flat" cmpd="sng" algn="ctr">
-                      <a:solidFill>
-                        <a:srgbClr val="8EA9DB"/>
-                      </a:solidFill>
-                      <a:prstDash val="solid"/>
-                      <a:round/>
-                      <a:headEnd type="none" w="med" len="med"/>
-                      <a:tailEnd type="none" w="med" len="med"/>
-                    </a:lnB>
-                  </a:tcPr>
-                </a:tc>
-                <a:tc>
-                  <a:txBody>
-                    <a:bodyPr/>
-                    <a:lstStyle/>
-                    <a:p>
-                      <a:pPr algn="l" fontAlgn="b"/>
-                      <a:r>
-                        <a:rPr lang="de-DE" sz="1100" b="0" i="0" u="none" strike="noStrike">
-                          <a:solidFill>
-                            <a:srgbClr val="000000"/>
-                          </a:solidFill>
-                          <a:effectLst/>
-                          <a:latin typeface="Calibri" panose="020F0502020204030204" pitchFamily="34" charset="0"/>
-                        </a:rPr>
-                        <a:t>Triggerfunktion Umfrage (offline nicht verfügbar)</a:t>
-                      </a:r>
-                    </a:p>
-                  </a:txBody>
-                  <a:tcPr marL="9525" marR="9525" marT="9525" marB="0" anchor="b">
-                    <a:lnL>
-                      <a:noFill/>
-                    </a:lnL>
-                    <a:lnR>
-                      <a:noFill/>
-                    </a:lnR>
-                    <a:lnT w="6350" cap="flat" cmpd="sng" algn="ctr">
-                      <a:solidFill>
-                        <a:srgbClr val="8EA9DB"/>
-                      </a:solidFill>
-                      <a:prstDash val="solid"/>
-                      <a:round/>
-                      <a:headEnd type="none" w="med" len="med"/>
-                      <a:tailEnd type="none" w="med" len="med"/>
-                    </a:lnT>
-                    <a:lnB w="6350" cap="flat" cmpd="sng" algn="ctr">
-                      <a:solidFill>
-                        <a:srgbClr val="8EA9DB"/>
-                      </a:solidFill>
-                      <a:prstDash val="solid"/>
-                      <a:round/>
-                      <a:headEnd type="none" w="med" len="med"/>
-                      <a:tailEnd type="none" w="med" len="med"/>
-                    </a:lnB>
-                  </a:tcPr>
-                </a:tc>
-                <a:tc>
-                  <a:txBody>
-                    <a:bodyPr/>
-                    <a:lstStyle/>
-                    <a:p>
-                      <a:pPr algn="l" fontAlgn="b"/>
-                      <a:r>
-                        <a:rPr lang="de-DE" sz="1100" b="0" i="0" u="none" strike="noStrike">
-                          <a:solidFill>
-                            <a:srgbClr val="000000"/>
-                          </a:solidFill>
-                          <a:effectLst/>
-                          <a:latin typeface="Calibri" panose="020F0502020204030204" pitchFamily="34" charset="0"/>
-                        </a:rPr>
-                        <a:t>9  13</a:t>
-                      </a:r>
-                    </a:p>
-                  </a:txBody>
-                  <a:tcPr marL="9525" marR="9525" marT="9525" marB="0" anchor="b">
-                    <a:lnL>
-                      <a:noFill/>
-                    </a:lnL>
-                    <a:lnR>
-                      <a:noFill/>
-                    </a:lnR>
-                    <a:lnT w="6350" cap="flat" cmpd="sng" algn="ctr">
-                      <a:solidFill>
-                        <a:srgbClr val="8EA9DB"/>
-                      </a:solidFill>
-                      <a:prstDash val="solid"/>
-                      <a:round/>
-                      <a:headEnd type="none" w="med" len="med"/>
-                      <a:tailEnd type="none" w="med" len="med"/>
-                    </a:lnT>
-                    <a:lnB w="6350" cap="flat" cmpd="sng" algn="ctr">
-                      <a:solidFill>
-                        <a:srgbClr val="8EA9DB"/>
-                      </a:solidFill>
-                      <a:prstDash val="solid"/>
-                      <a:round/>
-                      <a:headEnd type="none" w="med" len="med"/>
-                      <a:tailEnd type="none" w="med" len="med"/>
-                    </a:lnB>
-                  </a:tcPr>
-                </a:tc>
-                <a:tc>
-                  <a:txBody>
-                    <a:bodyPr/>
-                    <a:lstStyle/>
-                    <a:p>
-                      <a:pPr algn="l" fontAlgn="b"/>
-                      <a:r>
-                        <a:rPr lang="de-DE" sz="1100" b="0" i="0" u="none" strike="noStrike">
-                          <a:solidFill>
-                            <a:srgbClr val="000000"/>
-                          </a:solidFill>
-                          <a:effectLst/>
-                          <a:latin typeface="Calibri" panose="020F0502020204030204" pitchFamily="34" charset="0"/>
-                        </a:rPr>
-                        <a:t>12</a:t>
-                      </a:r>
-                    </a:p>
-                  </a:txBody>
-                  <a:tcPr marL="9525" marR="9525" marT="9525" marB="0" anchor="b">
-                    <a:lnL>
-                      <a:noFill/>
-                    </a:lnL>
-                    <a:lnR>
-                      <a:noFill/>
-                    </a:lnR>
-                    <a:lnT w="6350" cap="flat" cmpd="sng" algn="ctr">
-                      <a:solidFill>
-                        <a:srgbClr val="8EA9DB"/>
-                      </a:solidFill>
-                      <a:prstDash val="solid"/>
-                      <a:round/>
-                      <a:headEnd type="none" w="med" len="med"/>
-                      <a:tailEnd type="none" w="med" len="med"/>
-                    </a:lnT>
-                    <a:lnB w="6350" cap="flat" cmpd="sng" algn="ctr">
-                      <a:solidFill>
-                        <a:srgbClr val="8EA9DB"/>
-                      </a:solidFill>
-                      <a:prstDash val="solid"/>
-                      <a:round/>
-                      <a:headEnd type="none" w="med" len="med"/>
-                      <a:tailEnd type="none" w="med" len="med"/>
-                    </a:lnB>
-                  </a:tcPr>
-                </a:tc>
-                <a:tc>
-                  <a:txBody>
-                    <a:bodyPr/>
-                    <a:lstStyle/>
-                    <a:p>
-                      <a:pPr algn="l" fontAlgn="b"/>
-                      <a:endParaRPr lang="de-DE" sz="1100" b="0" i="0" u="none" strike="noStrike" dirty="0">
-                        <a:solidFill>
-                          <a:srgbClr val="000000"/>
-                        </a:solidFill>
-                        <a:effectLst/>
-                        <a:latin typeface="Calibri" panose="020F0502020204030204" pitchFamily="34" charset="0"/>
-                      </a:endParaRPr>
-                    </a:p>
-                  </a:txBody>
-                  <a:tcPr marL="9525" marR="9525" marT="9525" marB="0" anchor="b">
-                    <a:lnL>
-                      <a:noFill/>
-                    </a:lnL>
-                    <a:lnR w="6350" cap="flat" cmpd="sng" algn="ctr">
-                      <a:solidFill>
-                        <a:srgbClr val="8EA9DB"/>
-                      </a:solidFill>
-                      <a:prstDash val="solid"/>
-                      <a:round/>
-                      <a:headEnd type="none" w="med" len="med"/>
-                      <a:tailEnd type="none" w="med" len="med"/>
-                    </a:lnR>
-                    <a:lnT w="6350" cap="flat" cmpd="sng" algn="ctr">
-                      <a:solidFill>
-                        <a:srgbClr val="8EA9DB"/>
-                      </a:solidFill>
-                      <a:prstDash val="solid"/>
-                      <a:round/>
-                      <a:headEnd type="none" w="med" len="med"/>
-                      <a:tailEnd type="none" w="med" len="med"/>
-                    </a:lnT>
-                    <a:lnB w="6350" cap="flat" cmpd="sng" algn="ctr">
-                      <a:solidFill>
-                        <a:srgbClr val="8EA9DB"/>
-                      </a:solidFill>
-                      <a:prstDash val="solid"/>
-                      <a:round/>
-                      <a:headEnd type="none" w="med" len="med"/>
-                      <a:tailEnd type="none" w="med" len="med"/>
-                    </a:lnB>
-                  </a:tcPr>
-                </a:tc>
-                <a:extLst>
-                  <a:ext uri="{0D108BD9-81ED-4DB2-BD59-A6C34878D82A}">
-                    <a16:rowId xmlns:a16="http://schemas.microsoft.com/office/drawing/2014/main" val="1493324918"/>
-                  </a:ext>
-                </a:extLst>
-              </a:tr>
-            </a:tbl>
-          </a:graphicData>
-        </a:graphic>
-      </p:graphicFrame>
-    </p:spTree>
-    <p:extLst>
-      <p:ext uri="{BB962C8B-B14F-4D97-AF65-F5344CB8AC3E}">
-        <p14:creationId xmlns:p14="http://schemas.microsoft.com/office/powerpoint/2010/main" val="293057406"/>
+        <p14:creationId xmlns:p14="http://schemas.microsoft.com/office/powerpoint/2010/main" val="2315294091"/>
       </p:ext>
     </p:extLst>
   </p:cSld>

</xml_diff>